<commit_message>
11.29 SRS 1.2 수정
</commit_message>
<xml_diff>
--- a/SRS/1.2/4팀_일정추천앱_UC_Spec_1.2.pptx
+++ b/SRS/1.2/4팀_일정추천앱_UC_Spec_1.2.pptx
@@ -8498,7 +8498,7 @@
           <p:nvPr>
             <p:extLst>
               <p:ext uri="{D42A27DB-BD31-4B8C-83A1-F6EECF244321}">
-                <p14:modId xmlns:p14="http://schemas.microsoft.com/office/powerpoint/2010/main" val="3441276127"/>
+                <p14:modId xmlns:p14="http://schemas.microsoft.com/office/powerpoint/2010/main" val="636070116"/>
               </p:ext>
             </p:extLst>
           </p:nvPr>
@@ -9913,7 +9913,7 @@
                           <a:effectLst/>
                           <a:latin typeface="맑은 고딕 (본문)"/>
                         </a:rPr>
-                        <a:t>새 모임 등록하기 버튼</a:t>
+                        <a:t>새 모임 등록하기</a:t>
                       </a:r>
                       <a:r>
                         <a:rPr lang="en-US" altLang="ko-KR" sz="1100" b="0" kern="100" dirty="0">
@@ -9923,7 +9923,7 @@
                           <a:effectLst/>
                           <a:latin typeface="맑은 고딕 (본문)"/>
                         </a:rPr>
-                        <a:t>’</a:t>
+                        <a:t>’ </a:t>
                       </a:r>
                       <a:r>
                         <a:rPr lang="ko-KR" altLang="en-US" sz="1100" b="0" kern="100" dirty="0">
@@ -9933,7 +9933,7 @@
                           <a:effectLst/>
                           <a:latin typeface="맑은 고딕 (본문)"/>
                         </a:rPr>
-                        <a:t>을 클릭한다</a:t>
+                        <a:t>버튼을 클릭한다</a:t>
                       </a:r>
                       <a:r>
                         <a:rPr lang="en-US" altLang="ko-KR" sz="1100" b="0" kern="100" dirty="0">
@@ -10012,7 +10012,7 @@
                           <a:effectLst/>
                           <a:latin typeface="맑은 고딕 (본문)"/>
                         </a:rPr>
-                        <a:t>모임 구성원을 입력하고 </a:t>
+                        <a:t>모임 구성원을 입력</a:t>
                       </a:r>
                       <a:r>
                         <a:rPr lang="ko-KR" altLang="en-US" sz="1100" b="0" kern="100" baseline="0" dirty="0">
@@ -10022,7 +10022,7 @@
                           <a:effectLst/>
                           <a:latin typeface="맑은 고딕 (본문)"/>
                         </a:rPr>
-                        <a:t>모임 사전 알림을 설정할 수 있는 화면을 출력한다</a:t>
+                        <a:t>할 수 있는 화면을 출력한다</a:t>
                       </a:r>
                       <a:r>
                         <a:rPr lang="en-US" altLang="ko-KR" sz="1100" b="0" kern="100" baseline="0" dirty="0">
@@ -10150,7 +10150,7 @@
                           <a:ea typeface="+mn-ea"/>
                           <a:cs typeface="+mn-cs"/>
                         </a:rPr>
-                        <a:t>’</a:t>
+                        <a:t>’ </a:t>
                       </a:r>
                       <a:r>
                         <a:rPr lang="ko-KR" altLang="en-US" sz="1100" b="0" i="0" u="none" strike="noStrike" kern="1200" dirty="0">
@@ -10198,7 +10198,7 @@
                           <a:ea typeface="+mn-ea"/>
                           <a:cs typeface="+mn-cs"/>
                         </a:rPr>
-                        <a:t>’</a:t>
+                        <a:t>’ </a:t>
                       </a:r>
                       <a:r>
                         <a:rPr lang="ko-KR" altLang="en-US" sz="1100" b="0" i="0" u="none" strike="noStrike" kern="1200" dirty="0">
@@ -10251,9 +10251,9 @@
                         </a:rPr>
                         <a:t>초기 모임 구성원 초대 </a:t>
                       </a:r>
-                      <a:endParaRPr lang="en-US" altLang="ko-KR" sz="1100" b="0" i="0" u="none" strike="noStrike" kern="1200" dirty="0">
+                      <a:endParaRPr lang="en-US" altLang="ko-KR" sz="1100" b="0" i="0" u="none" strike="noStrike" kern="1200" baseline="0" dirty="0">
                         <a:solidFill>
-                          <a:srgbClr val="FF0000"/>
+                          <a:schemeClr val="tx1"/>
                         </a:solidFill>
                         <a:effectLst/>
                         <a:latin typeface="맑은 고딕 (본문)"/>
@@ -10262,7 +10262,23 @@
                       </a:endParaRPr>
                     </a:p>
                     <a:p>
-                      <a:pPr marL="648000" lvl="1" rtl="0" fontAlgn="base"/>
+                      <a:pPr marL="648000" marR="0" lvl="1" indent="0" algn="l" defTabSz="914400" rtl="0" eaLnBrk="1" fontAlgn="base" latinLnBrk="1" hangingPunct="1">
+                        <a:lnSpc>
+                          <a:spcPct val="100000"/>
+                        </a:lnSpc>
+                        <a:spcBef>
+                          <a:spcPts val="0"/>
+                        </a:spcBef>
+                        <a:spcAft>
+                          <a:spcPts val="0"/>
+                        </a:spcAft>
+                        <a:buClrTx/>
+                        <a:buSzTx/>
+                        <a:buFontTx/>
+                        <a:buNone/>
+                        <a:tabLst/>
+                        <a:defRPr/>
+                      </a:pPr>
                       <a:r>
                         <a:rPr lang="ko-KR" altLang="en-US" sz="1100" b="0" i="0" u="none" strike="noStrike" kern="1200" baseline="0" dirty="0">
                           <a:solidFill>
@@ -10273,7 +10289,7 @@
                           <a:ea typeface="+mn-ea"/>
                           <a:cs typeface="+mn-cs"/>
                         </a:rPr>
-                        <a:t>사용자는 </a:t>
+                        <a:t>사용자는 모임에 추가하고자 하는 회원의 아이디를 </a:t>
                       </a:r>
                       <a:r>
                         <a:rPr lang="en-US" altLang="ko-KR" sz="1100" b="0" i="0" u="none" strike="noStrike" kern="1200" baseline="0" dirty="0">
@@ -10309,7 +10325,7 @@
                           <a:ea typeface="+mn-ea"/>
                           <a:cs typeface="+mn-cs"/>
                         </a:rPr>
-                        <a:t>’</a:t>
+                        <a:t>’ </a:t>
                       </a:r>
                       <a:r>
                         <a:rPr lang="ko-KR" altLang="en-US" sz="1100" b="0" i="0" u="none" strike="noStrike" kern="1200" baseline="0" dirty="0">
@@ -10321,7 +10337,7 @@
                           <a:ea typeface="+mn-ea"/>
                           <a:cs typeface="+mn-cs"/>
                         </a:rPr>
-                        <a:t>칸 상단에 있는 </a:t>
+                        <a:t>칸에 입력하고</a:t>
                       </a:r>
                       <a:r>
                         <a:rPr lang="en-US" altLang="ko-KR" sz="1100" b="0" i="0" u="none" strike="noStrike" kern="1200" baseline="0" dirty="0">
@@ -10333,6 +10349,30 @@
                           <a:ea typeface="+mn-ea"/>
                           <a:cs typeface="+mn-cs"/>
                         </a:rPr>
+                        <a:t>, </a:t>
+                      </a:r>
+                      <a:r>
+                        <a:rPr lang="ko-KR" altLang="en-US" sz="1100" b="0" i="0" u="none" strike="noStrike" kern="1200" baseline="0" dirty="0">
+                          <a:solidFill>
+                            <a:schemeClr val="tx1"/>
+                          </a:solidFill>
+                          <a:effectLst/>
+                          <a:latin typeface="맑은 고딕 (본문)"/>
+                          <a:ea typeface="+mn-ea"/>
+                          <a:cs typeface="+mn-cs"/>
+                        </a:rPr>
+                        <a:t>해당 칸 우측에 있는 </a:t>
+                      </a:r>
+                      <a:r>
+                        <a:rPr lang="en-US" altLang="ko-KR" sz="1100" b="0" i="0" u="none" strike="noStrike" kern="1200" baseline="0" dirty="0">
+                          <a:solidFill>
+                            <a:schemeClr val="tx1"/>
+                          </a:solidFill>
+                          <a:effectLst/>
+                          <a:latin typeface="맑은 고딕 (본문)"/>
+                          <a:ea typeface="+mn-ea"/>
+                          <a:cs typeface="+mn-cs"/>
+                        </a:rPr>
                         <a:t>‘</a:t>
                       </a:r>
                       <a:r>
@@ -10357,7 +10397,7 @@
                           <a:ea typeface="+mn-ea"/>
                           <a:cs typeface="+mn-cs"/>
                         </a:rPr>
-                        <a:t>’</a:t>
+                        <a:t>’ </a:t>
                       </a:r>
                       <a:r>
                         <a:rPr lang="ko-KR" altLang="en-US" sz="1100" b="0" i="0" u="none" strike="noStrike" kern="1200" baseline="0" dirty="0">
@@ -10381,11 +10421,8 @@
                           <a:ea typeface="+mn-ea"/>
                           <a:cs typeface="+mn-cs"/>
                         </a:rPr>
-                        <a:t>.</a:t>
-                      </a:r>
-                    </a:p>
-                    <a:p>
-                      <a:pPr marL="648000" lvl="1" rtl="0" fontAlgn="base"/>
+                        <a:t>. </a:t>
+                      </a:r>
                       <a:r>
                         <a:rPr lang="ko-KR" altLang="en-US" sz="1100" b="0" i="0" u="none" strike="noStrike" kern="1200" baseline="0" dirty="0">
                           <a:solidFill>
@@ -10396,7 +10433,7 @@
                           <a:ea typeface="+mn-ea"/>
                           <a:cs typeface="+mn-cs"/>
                         </a:rPr>
-                        <a:t>시스템은 시스템에 등록된 회원을 검색할 수 있는 화면을 출력한다</a:t>
+                        <a:t>시스템은 입력 받은 아이디와 일치하는 회원을 모임 구성원으로 등록하고</a:t>
                       </a:r>
                       <a:r>
                         <a:rPr lang="en-US" altLang="ko-KR" sz="1100" b="0" i="0" u="none" strike="noStrike" kern="1200" baseline="0" dirty="0">
@@ -10408,248 +10445,32 @@
                           <a:ea typeface="+mn-ea"/>
                           <a:cs typeface="+mn-cs"/>
                         </a:rPr>
+                        <a:t>, </a:t>
+                      </a:r>
+                      <a:r>
+                        <a:rPr lang="ko-KR" altLang="en-US" sz="1100" b="0" i="0" u="none" strike="noStrike" kern="1200" baseline="0" dirty="0">
+                          <a:solidFill>
+                            <a:schemeClr val="tx1"/>
+                          </a:solidFill>
+                          <a:effectLst/>
+                          <a:latin typeface="맑은 고딕 (본문)"/>
+                          <a:ea typeface="+mn-ea"/>
+                          <a:cs typeface="+mn-cs"/>
+                        </a:rPr>
+                        <a:t>해당 회원의 이름을 화면에 출력한다</a:t>
+                      </a:r>
+                      <a:r>
+                        <a:rPr lang="en-US" altLang="ko-KR" sz="1100" b="0" i="0" u="none" strike="noStrike" kern="1200" baseline="0" dirty="0">
+                          <a:solidFill>
+                            <a:schemeClr val="tx1"/>
+                          </a:solidFill>
+                          <a:effectLst/>
+                          <a:latin typeface="맑은 고딕 (본문)"/>
+                          <a:ea typeface="+mn-ea"/>
+                          <a:cs typeface="+mn-cs"/>
+                        </a:rPr>
                         <a:t>. </a:t>
                       </a:r>
-                      <a:r>
-                        <a:rPr lang="ko-KR" altLang="en-US" sz="1100" b="0" i="0" u="none" strike="noStrike" kern="1200" baseline="0" dirty="0">
-                          <a:solidFill>
-                            <a:schemeClr val="tx1"/>
-                          </a:solidFill>
-                          <a:effectLst/>
-                          <a:latin typeface="맑은 고딕 (본문)"/>
-                          <a:ea typeface="+mn-ea"/>
-                          <a:cs typeface="+mn-cs"/>
-                        </a:rPr>
-                        <a:t>사용자는 모임에 추가하고자 하는 회원의 이름을 검색 화면에 입력한다</a:t>
-                      </a:r>
-                      <a:r>
-                        <a:rPr lang="en-US" altLang="ko-KR" sz="1100" b="0" i="0" u="none" strike="noStrike" kern="1200" baseline="0" dirty="0">
-                          <a:solidFill>
-                            <a:schemeClr val="tx1"/>
-                          </a:solidFill>
-                          <a:effectLst/>
-                          <a:latin typeface="맑은 고딕 (본문)"/>
-                          <a:ea typeface="+mn-ea"/>
-                          <a:cs typeface="+mn-cs"/>
-                        </a:rPr>
-                        <a:t>. </a:t>
-                      </a:r>
-                      <a:r>
-                        <a:rPr lang="ko-KR" altLang="en-US" sz="1100" b="0" i="0" u="none" strike="noStrike" kern="1200" baseline="0" dirty="0">
-                          <a:solidFill>
-                            <a:schemeClr val="tx1"/>
-                          </a:solidFill>
-                          <a:effectLst/>
-                          <a:latin typeface="맑은 고딕 (본문)"/>
-                          <a:ea typeface="+mn-ea"/>
-                          <a:cs typeface="+mn-cs"/>
-                        </a:rPr>
-                        <a:t>시스템은 입력 받은 이름과 일치하는 회원들의 이름과 정보</a:t>
-                      </a:r>
-                      <a:r>
-                        <a:rPr lang="en-US" altLang="ko-KR" sz="1100" b="0" i="0" u="none" strike="noStrike" kern="1200" baseline="0" dirty="0">
-                          <a:solidFill>
-                            <a:schemeClr val="tx1"/>
-                          </a:solidFill>
-                          <a:effectLst/>
-                          <a:latin typeface="맑은 고딕 (본문)"/>
-                          <a:ea typeface="+mn-ea"/>
-                          <a:cs typeface="+mn-cs"/>
-                        </a:rPr>
-                        <a:t>(</a:t>
-                      </a:r>
-                      <a:r>
-                        <a:rPr lang="ko-KR" altLang="en-US" sz="1100" b="0" i="0" u="none" strike="noStrike" kern="1200" baseline="0" dirty="0">
-                          <a:solidFill>
-                            <a:schemeClr val="tx1"/>
-                          </a:solidFill>
-                          <a:effectLst/>
-                          <a:latin typeface="맑은 고딕 (본문)"/>
-                          <a:ea typeface="+mn-ea"/>
-                          <a:cs typeface="+mn-cs"/>
-                        </a:rPr>
-                        <a:t>아이디</a:t>
-                      </a:r>
-                      <a:r>
-                        <a:rPr lang="en-US" altLang="ko-KR" sz="1100" b="0" i="0" u="none" strike="noStrike" kern="1200" baseline="0" dirty="0">
-                          <a:solidFill>
-                            <a:schemeClr val="tx1"/>
-                          </a:solidFill>
-                          <a:effectLst/>
-                          <a:latin typeface="맑은 고딕 (본문)"/>
-                          <a:ea typeface="+mn-ea"/>
-                          <a:cs typeface="+mn-cs"/>
-                        </a:rPr>
-                        <a:t>, </a:t>
-                      </a:r>
-                      <a:r>
-                        <a:rPr lang="ko-KR" altLang="en-US" sz="1100" b="0" i="0" u="none" strike="noStrike" kern="1200" baseline="0" dirty="0">
-                          <a:solidFill>
-                            <a:schemeClr val="tx1"/>
-                          </a:solidFill>
-                          <a:effectLst/>
-                          <a:latin typeface="맑은 고딕 (본문)"/>
-                          <a:ea typeface="+mn-ea"/>
-                          <a:cs typeface="+mn-cs"/>
-                        </a:rPr>
-                        <a:t>나이</a:t>
-                      </a:r>
-                      <a:r>
-                        <a:rPr lang="en-US" altLang="ko-KR" sz="1100" b="0" i="0" u="none" strike="noStrike" kern="1200" baseline="0" dirty="0">
-                          <a:solidFill>
-                            <a:schemeClr val="tx1"/>
-                          </a:solidFill>
-                          <a:effectLst/>
-                          <a:latin typeface="맑은 고딕 (본문)"/>
-                          <a:ea typeface="+mn-ea"/>
-                          <a:cs typeface="+mn-cs"/>
-                        </a:rPr>
-                        <a:t>, </a:t>
-                      </a:r>
-                      <a:r>
-                        <a:rPr lang="ko-KR" altLang="en-US" sz="1100" b="0" i="0" u="none" strike="noStrike" kern="1200" baseline="0" dirty="0">
-                          <a:solidFill>
-                            <a:schemeClr val="tx1"/>
-                          </a:solidFill>
-                          <a:effectLst/>
-                          <a:latin typeface="맑은 고딕 (본문)"/>
-                          <a:ea typeface="+mn-ea"/>
-                          <a:cs typeface="+mn-cs"/>
-                        </a:rPr>
-                        <a:t>학과</a:t>
-                      </a:r>
-                      <a:r>
-                        <a:rPr lang="en-US" altLang="ko-KR" sz="1100" b="0" i="0" u="none" strike="noStrike" kern="1200" baseline="0" dirty="0">
-                          <a:solidFill>
-                            <a:schemeClr val="tx1"/>
-                          </a:solidFill>
-                          <a:effectLst/>
-                          <a:latin typeface="맑은 고딕 (본문)"/>
-                          <a:ea typeface="+mn-ea"/>
-                          <a:cs typeface="+mn-cs"/>
-                        </a:rPr>
-                        <a:t>)</a:t>
-                      </a:r>
-                      <a:r>
-                        <a:rPr lang="ko-KR" altLang="en-US" sz="1100" b="0" i="0" u="none" strike="noStrike" kern="1200" baseline="0" dirty="0">
-                          <a:solidFill>
-                            <a:schemeClr val="tx1"/>
-                          </a:solidFill>
-                          <a:effectLst/>
-                          <a:latin typeface="맑은 고딕 (본문)"/>
-                          <a:ea typeface="+mn-ea"/>
-                          <a:cs typeface="+mn-cs"/>
-                        </a:rPr>
-                        <a:t>를 화면에 </a:t>
-                      </a:r>
-                      <a:r>
-                        <a:rPr lang="ko-KR" altLang="en-US" sz="1100" b="0" i="0" u="none" strike="noStrike" kern="1200" baseline="0" dirty="0" err="1">
-                          <a:solidFill>
-                            <a:schemeClr val="tx1"/>
-                          </a:solidFill>
-                          <a:effectLst/>
-                          <a:latin typeface="맑은 고딕 (본문)"/>
-                          <a:ea typeface="+mn-ea"/>
-                          <a:cs typeface="+mn-cs"/>
-                        </a:rPr>
-                        <a:t>리스트업한다</a:t>
-                      </a:r>
-                      <a:r>
-                        <a:rPr lang="en-US" altLang="ko-KR" sz="1100" b="0" i="0" u="none" strike="noStrike" kern="1200" baseline="0" dirty="0">
-                          <a:solidFill>
-                            <a:schemeClr val="tx1"/>
-                          </a:solidFill>
-                          <a:effectLst/>
-                          <a:latin typeface="맑은 고딕 (본문)"/>
-                          <a:ea typeface="+mn-ea"/>
-                          <a:cs typeface="+mn-cs"/>
-                        </a:rPr>
-                        <a:t>. </a:t>
-                      </a:r>
-                    </a:p>
-                    <a:p>
-                      <a:pPr marL="648000" lvl="1" rtl="0" fontAlgn="base"/>
-                      <a:r>
-                        <a:rPr lang="ko-KR" altLang="en-US" sz="1100" b="0" i="0" u="none" strike="noStrike" kern="1200" baseline="0" dirty="0">
-                          <a:solidFill>
-                            <a:schemeClr val="tx1"/>
-                          </a:solidFill>
-                          <a:effectLst/>
-                          <a:latin typeface="맑은 고딕 (본문)"/>
-                          <a:ea typeface="+mn-ea"/>
-                          <a:cs typeface="+mn-cs"/>
-                        </a:rPr>
-                        <a:t>사용자는 추가하고자 하는 회원을 선택한 후 </a:t>
-                      </a:r>
-                      <a:r>
-                        <a:rPr lang="en-US" altLang="ko-KR" sz="1100" b="0" i="0" u="none" strike="noStrike" kern="1200" baseline="0" dirty="0">
-                          <a:solidFill>
-                            <a:schemeClr val="tx1"/>
-                          </a:solidFill>
-                          <a:effectLst/>
-                          <a:latin typeface="맑은 고딕 (본문)"/>
-                          <a:ea typeface="+mn-ea"/>
-                          <a:cs typeface="+mn-cs"/>
-                        </a:rPr>
-                        <a:t>‘</a:t>
-                      </a:r>
-                      <a:r>
-                        <a:rPr lang="ko-KR" altLang="en-US" sz="1100" b="0" i="0" u="none" strike="noStrike" kern="1200" baseline="0" dirty="0">
-                          <a:solidFill>
-                            <a:schemeClr val="tx1"/>
-                          </a:solidFill>
-                          <a:effectLst/>
-                          <a:latin typeface="맑은 고딕 (본문)"/>
-                          <a:ea typeface="+mn-ea"/>
-                          <a:cs typeface="+mn-cs"/>
-                        </a:rPr>
-                        <a:t>완료</a:t>
-                      </a:r>
-                      <a:r>
-                        <a:rPr lang="en-US" altLang="ko-KR" sz="1100" b="0" i="0" u="none" strike="noStrike" kern="1200" baseline="0" dirty="0">
-                          <a:solidFill>
-                            <a:schemeClr val="tx1"/>
-                          </a:solidFill>
-                          <a:effectLst/>
-                          <a:latin typeface="맑은 고딕 (본문)"/>
-                          <a:ea typeface="+mn-ea"/>
-                          <a:cs typeface="+mn-cs"/>
-                        </a:rPr>
-                        <a:t>’</a:t>
-                      </a:r>
-                      <a:r>
-                        <a:rPr lang="ko-KR" altLang="en-US" sz="1100" b="0" i="0" u="none" strike="noStrike" kern="1200" baseline="0" dirty="0">
-                          <a:solidFill>
-                            <a:schemeClr val="tx1"/>
-                          </a:solidFill>
-                          <a:effectLst/>
-                          <a:latin typeface="맑은 고딕 (본문)"/>
-                          <a:ea typeface="+mn-ea"/>
-                          <a:cs typeface="+mn-cs"/>
-                        </a:rPr>
-                        <a:t>버튼을 클릭한다</a:t>
-                      </a:r>
-                      <a:r>
-                        <a:rPr lang="en-US" altLang="ko-KR" sz="1100" b="0" i="0" u="none" strike="noStrike" kern="1200" baseline="0" dirty="0">
-                          <a:solidFill>
-                            <a:schemeClr val="tx1"/>
-                          </a:solidFill>
-                          <a:effectLst/>
-                          <a:latin typeface="맑은 고딕 (본문)"/>
-                          <a:ea typeface="+mn-ea"/>
-                          <a:cs typeface="+mn-cs"/>
-                        </a:rPr>
-                        <a:t>.</a:t>
-                      </a:r>
-                      <a:endParaRPr lang="en-US" altLang="ko-KR" sz="1100" b="0" i="0" u="none" strike="noStrike" kern="1200" dirty="0">
-                        <a:solidFill>
-                          <a:srgbClr val="FF0000"/>
-                        </a:solidFill>
-                        <a:effectLst/>
-                        <a:latin typeface="맑은 고딕 (본문)"/>
-                        <a:ea typeface="+mn-ea"/>
-                        <a:cs typeface="+mn-cs"/>
-                      </a:endParaRPr>
                     </a:p>
                     <a:p>
                       <a:pPr lvl="1" rtl="0" fontAlgn="base"/>
@@ -11313,14 +11134,14 @@
           <p:nvPr>
             <p:extLst>
               <p:ext uri="{D42A27DB-BD31-4B8C-83A1-F6EECF244321}">
-                <p14:modId xmlns:p14="http://schemas.microsoft.com/office/powerpoint/2010/main" val="1016534193"/>
+                <p14:modId xmlns:p14="http://schemas.microsoft.com/office/powerpoint/2010/main" val="1690547815"/>
               </p:ext>
             </p:extLst>
           </p:nvPr>
         </p:nvGraphicFramePr>
         <p:xfrm>
           <a:off x="526356" y="1200957"/>
-          <a:ext cx="8091287" cy="4756722"/>
+          <a:ext cx="8091287" cy="4924362"/>
         </p:xfrm>
         <a:graphic>
           <a:graphicData uri="http://schemas.openxmlformats.org/drawingml/2006/table">
@@ -11585,7 +11406,7 @@
                           <a:ea typeface="+mn-ea"/>
                           <a:cs typeface="+mn-cs"/>
                         </a:rPr>
-                        <a:t> 하는 모임의 오른쪽에 있는 </a:t>
+                        <a:t> 하는 모임의 우측에 있는 </a:t>
                       </a:r>
                       <a:r>
                         <a:rPr lang="en-US" altLang="ko-KR" sz="1100" b="0" i="0" u="none" strike="noStrike" kern="1200" baseline="0" dirty="0">
@@ -11719,7 +11540,7 @@
                           <a:latin typeface="+mn-ea"/>
                           <a:ea typeface="+mn-ea"/>
                         </a:rPr>
-                        <a:t>모임 구성원을 입력하고 </a:t>
+                        <a:t>모임 구성원을 입력</a:t>
                       </a:r>
                       <a:r>
                         <a:rPr lang="ko-KR" altLang="en-US" sz="1100" b="0" kern="100" baseline="0" dirty="0">
@@ -11730,29 +11551,7 @@
                           <a:latin typeface="+mn-ea"/>
                           <a:ea typeface="+mn-ea"/>
                         </a:rPr>
-                        <a:t>모임 사전 알림을</a:t>
-                      </a:r>
-                      <a:r>
-                        <a:rPr lang="en-US" altLang="ko-KR" sz="1100" b="0" kern="100" baseline="0" dirty="0">
-                          <a:solidFill>
-                            <a:schemeClr val="tx1"/>
-                          </a:solidFill>
-                          <a:effectLst/>
-                          <a:latin typeface="+mn-ea"/>
-                          <a:ea typeface="+mn-ea"/>
-                        </a:rPr>
-                        <a:t> </a:t>
-                      </a:r>
-                      <a:r>
-                        <a:rPr lang="ko-KR" altLang="en-US" sz="1100" b="0" kern="100" baseline="0" dirty="0">
-                          <a:solidFill>
-                            <a:schemeClr val="tx1"/>
-                          </a:solidFill>
-                          <a:effectLst/>
-                          <a:latin typeface="+mn-ea"/>
-                          <a:ea typeface="+mn-ea"/>
-                        </a:rPr>
-                        <a:t>설정할 수 있는 화면을 출력한다</a:t>
+                        <a:t>할 수 있는 화면을 출력한다</a:t>
                       </a:r>
                       <a:r>
                         <a:rPr lang="en-US" altLang="ko-KR" sz="1100" b="0" kern="100" baseline="0" dirty="0">
@@ -12014,7 +11813,7 @@
                           <a:ea typeface="+mn-ea"/>
                           <a:cs typeface="+mn-cs"/>
                         </a:rPr>
-                        <a:t>새로운 모임 구성원 추가 및 기존 구성원 추방 </a:t>
+                        <a:t>모임 구성원 추가</a:t>
                       </a:r>
                       <a:endParaRPr lang="en-US" altLang="ko-KR" sz="1100" b="0" i="0" u="none" strike="noStrike" kern="1200" dirty="0">
                         <a:solidFill>
@@ -12027,18 +11826,20 @@
                       </a:endParaRPr>
                     </a:p>
                     <a:p>
-                      <a:pPr marL="648000" rtl="0" fontAlgn="base"/>
+                      <a:pPr marL="648000" lvl="1" indent="0" rtl="0" fontAlgn="base">
+                        <a:buNone/>
+                      </a:pPr>
                       <a:r>
                         <a:rPr lang="ko-KR" altLang="en-US" sz="1100" b="0" i="0" u="none" strike="noStrike" kern="1200" baseline="0" dirty="0">
                           <a:solidFill>
                             <a:schemeClr val="tx1"/>
                           </a:solidFill>
                           <a:effectLst/>
-                          <a:latin typeface="+mn-ea"/>
+                          <a:latin typeface="맑은 고딕 (본문)"/>
                           <a:ea typeface="+mn-ea"/>
                           <a:cs typeface="+mn-cs"/>
                         </a:rPr>
-                        <a:t>사용자는 </a:t>
+                        <a:t>사용자는 모임에 새로 추가하고자 하는 회원의 아이디를 </a:t>
                       </a:r>
                       <a:r>
                         <a:rPr lang="en-US" altLang="ko-KR" sz="1100" b="0" i="0" u="none" strike="noStrike" kern="1200" baseline="0" dirty="0">
@@ -12046,7 +11847,7 @@
                             <a:schemeClr val="tx1"/>
                           </a:solidFill>
                           <a:effectLst/>
-                          <a:latin typeface="+mn-ea"/>
+                          <a:latin typeface="맑은 고딕 (본문)"/>
                           <a:ea typeface="+mn-ea"/>
                           <a:cs typeface="+mn-cs"/>
                         </a:rPr>
@@ -12058,7 +11859,7 @@
                             <a:schemeClr val="tx1"/>
                           </a:solidFill>
                           <a:effectLst/>
-                          <a:latin typeface="+mn-ea"/>
+                          <a:latin typeface="맑은 고딕 (본문)"/>
                           <a:ea typeface="+mn-ea"/>
                           <a:cs typeface="+mn-cs"/>
                         </a:rPr>
@@ -12070,11 +11871,11 @@
                             <a:schemeClr val="tx1"/>
                           </a:solidFill>
                           <a:effectLst/>
-                          <a:latin typeface="+mn-ea"/>
+                          <a:latin typeface="맑은 고딕 (본문)"/>
                           <a:ea typeface="+mn-ea"/>
                           <a:cs typeface="+mn-cs"/>
                         </a:rPr>
-                        <a:t>’</a:t>
+                        <a:t>’ </a:t>
                       </a:r>
                       <a:r>
                         <a:rPr lang="ko-KR" altLang="en-US" sz="1100" b="0" i="0" u="none" strike="noStrike" kern="1200" baseline="0" dirty="0">
@@ -12082,11 +11883,11 @@
                             <a:schemeClr val="tx1"/>
                           </a:solidFill>
                           <a:effectLst/>
-                          <a:latin typeface="+mn-ea"/>
+                          <a:latin typeface="맑은 고딕 (본문)"/>
                           <a:ea typeface="+mn-ea"/>
                           <a:cs typeface="+mn-cs"/>
                         </a:rPr>
-                        <a:t>칸 상단에 있는 </a:t>
+                        <a:t>칸에 입력하고</a:t>
                       </a:r>
                       <a:r>
                         <a:rPr lang="en-US" altLang="ko-KR" sz="1100" b="0" i="0" u="none" strike="noStrike" kern="1200" baseline="0" dirty="0">
@@ -12094,10 +11895,34 @@
                             <a:schemeClr val="tx1"/>
                           </a:solidFill>
                           <a:effectLst/>
-                          <a:latin typeface="+mn-ea"/>
+                          <a:latin typeface="맑은 고딕 (본문)"/>
                           <a:ea typeface="+mn-ea"/>
                           <a:cs typeface="+mn-cs"/>
                         </a:rPr>
+                        <a:t>. </a:t>
+                      </a:r>
+                      <a:r>
+                        <a:rPr lang="ko-KR" altLang="en-US" sz="1100" b="0" i="0" u="none" strike="noStrike" kern="1200" baseline="0" dirty="0">
+                          <a:solidFill>
+                            <a:schemeClr val="tx1"/>
+                          </a:solidFill>
+                          <a:effectLst/>
+                          <a:latin typeface="맑은 고딕 (본문)"/>
+                          <a:ea typeface="+mn-ea"/>
+                          <a:cs typeface="+mn-cs"/>
+                        </a:rPr>
+                        <a:t>해당 칸 우측에 있는 </a:t>
+                      </a:r>
+                      <a:r>
+                        <a:rPr lang="en-US" altLang="ko-KR" sz="1100" b="0" i="0" u="none" strike="noStrike" kern="1200" baseline="0" dirty="0">
+                          <a:solidFill>
+                            <a:schemeClr val="tx1"/>
+                          </a:solidFill>
+                          <a:effectLst/>
+                          <a:latin typeface="맑은 고딕 (본문)"/>
+                          <a:ea typeface="+mn-ea"/>
+                          <a:cs typeface="+mn-cs"/>
+                        </a:rPr>
                         <a:t>‘</a:t>
                       </a:r>
                       <a:r>
@@ -12106,11 +11931,11 @@
                             <a:schemeClr val="tx1"/>
                           </a:solidFill>
                           <a:effectLst/>
-                          <a:latin typeface="+mn-ea"/>
+                          <a:latin typeface="맑은 고딕 (본문)"/>
                           <a:ea typeface="+mn-ea"/>
                           <a:cs typeface="+mn-cs"/>
                         </a:rPr>
-                        <a:t>구성원 추가</a:t>
+                        <a:t>구성원      추가</a:t>
                       </a:r>
                       <a:r>
                         <a:rPr lang="en-US" altLang="ko-KR" sz="1100" b="0" i="0" u="none" strike="noStrike" kern="1200" baseline="0" dirty="0">
@@ -12118,11 +11943,11 @@
                             <a:schemeClr val="tx1"/>
                           </a:solidFill>
                           <a:effectLst/>
-                          <a:latin typeface="+mn-ea"/>
+                          <a:latin typeface="맑은 고딕 (본문)"/>
                           <a:ea typeface="+mn-ea"/>
                           <a:cs typeface="+mn-cs"/>
                         </a:rPr>
-                        <a:t>’</a:t>
+                        <a:t>’ </a:t>
                       </a:r>
                       <a:r>
                         <a:rPr lang="ko-KR" altLang="en-US" sz="1100" b="0" i="0" u="none" strike="noStrike" kern="1200" baseline="0" dirty="0">
@@ -12130,7 +11955,7 @@
                             <a:schemeClr val="tx1"/>
                           </a:solidFill>
                           <a:effectLst/>
-                          <a:latin typeface="+mn-ea"/>
+                          <a:latin typeface="맑은 고딕 (본문)"/>
                           <a:ea typeface="+mn-ea"/>
                           <a:cs typeface="+mn-cs"/>
                         </a:rPr>
@@ -12142,26 +11967,23 @@
                             <a:schemeClr val="tx1"/>
                           </a:solidFill>
                           <a:effectLst/>
-                          <a:latin typeface="+mn-ea"/>
+                          <a:latin typeface="맑은 고딕 (본문)"/>
                           <a:ea typeface="+mn-ea"/>
                           <a:cs typeface="+mn-cs"/>
                         </a:rPr>
-                        <a:t>.</a:t>
-                      </a:r>
-                    </a:p>
-                    <a:p>
-                      <a:pPr marL="648000" rtl="0" fontAlgn="base"/>
+                        <a:t>. </a:t>
+                      </a:r>
                       <a:r>
                         <a:rPr lang="ko-KR" altLang="en-US" sz="1100" b="0" i="0" u="none" strike="noStrike" kern="1200" baseline="0" dirty="0">
                           <a:solidFill>
                             <a:schemeClr val="tx1"/>
                           </a:solidFill>
                           <a:effectLst/>
-                          <a:latin typeface="+mn-ea"/>
+                          <a:latin typeface="맑은 고딕 (본문)"/>
                           <a:ea typeface="+mn-ea"/>
                           <a:cs typeface="+mn-cs"/>
                         </a:rPr>
-                        <a:t>시스템은 시스템에 등록된 회원을 검색할 수 있는 화면을 출력한다</a:t>
+                        <a:t>시스템은 입력 받은 아이디와 일치하는 회원을 모임 구성원으로 등록하고</a:t>
                       </a:r>
                       <a:r>
                         <a:rPr lang="en-US" altLang="ko-KR" sz="1100" b="0" i="0" u="none" strike="noStrike" kern="1200" baseline="0" dirty="0">
@@ -12169,26 +11991,23 @@
                             <a:schemeClr val="tx1"/>
                           </a:solidFill>
                           <a:effectLst/>
-                          <a:latin typeface="+mn-ea"/>
+                          <a:latin typeface="맑은 고딕 (본문)"/>
                           <a:ea typeface="+mn-ea"/>
                           <a:cs typeface="+mn-cs"/>
                         </a:rPr>
-                        <a:t>.</a:t>
-                      </a:r>
-                    </a:p>
-                    <a:p>
-                      <a:pPr marL="648000" rtl="0" fontAlgn="base"/>
+                        <a:t>, </a:t>
+                      </a:r>
                       <a:r>
                         <a:rPr lang="ko-KR" altLang="en-US" sz="1100" b="0" i="0" u="none" strike="noStrike" kern="1200" baseline="0" dirty="0">
                           <a:solidFill>
                             <a:schemeClr val="tx1"/>
                           </a:solidFill>
                           <a:effectLst/>
-                          <a:latin typeface="+mn-ea"/>
+                          <a:latin typeface="맑은 고딕 (본문)"/>
                           <a:ea typeface="+mn-ea"/>
                           <a:cs typeface="+mn-cs"/>
                         </a:rPr>
-                        <a:t>사용자는 모임에 추가하고자 하는 회원의 이름을 검색 화면에 입력한다</a:t>
+                        <a:t>해당 회원의 이름을 화면에 출력한다</a:t>
                       </a:r>
                       <a:r>
                         <a:rPr lang="en-US" altLang="ko-KR" sz="1100" b="0" i="0" u="none" strike="noStrike" kern="1200" baseline="0" dirty="0">
@@ -12196,282 +12015,21 @@
                             <a:schemeClr val="tx1"/>
                           </a:solidFill>
                           <a:effectLst/>
-                          <a:latin typeface="+mn-ea"/>
+                          <a:latin typeface="맑은 고딕 (본문)"/>
                           <a:ea typeface="+mn-ea"/>
                           <a:cs typeface="+mn-cs"/>
                         </a:rPr>
-                        <a:t>.</a:t>
-                      </a:r>
-                    </a:p>
-                    <a:p>
-                      <a:pPr marL="648000" rtl="0" fontAlgn="base"/>
-                      <a:r>
-                        <a:rPr lang="ko-KR" altLang="en-US" sz="1100" b="0" i="0" u="none" strike="noStrike" kern="1200" baseline="0" dirty="0">
-                          <a:solidFill>
-                            <a:schemeClr val="tx1"/>
-                          </a:solidFill>
-                          <a:effectLst/>
-                          <a:latin typeface="+mn-ea"/>
-                          <a:ea typeface="+mn-ea"/>
-                          <a:cs typeface="+mn-cs"/>
-                        </a:rPr>
-                        <a:t>시스템은 입력 받은 이름과 일치하는 회원들의 이름과 정보</a:t>
-                      </a:r>
-                      <a:r>
-                        <a:rPr lang="en-US" altLang="ko-KR" sz="1100" b="0" i="0" u="none" strike="noStrike" kern="1200" baseline="0" dirty="0">
-                          <a:solidFill>
-                            <a:schemeClr val="tx1"/>
-                          </a:solidFill>
-                          <a:effectLst/>
-                          <a:latin typeface="+mn-ea"/>
-                          <a:ea typeface="+mn-ea"/>
-                          <a:cs typeface="+mn-cs"/>
-                        </a:rPr>
-                        <a:t>(</a:t>
-                      </a:r>
-                      <a:r>
-                        <a:rPr lang="ko-KR" altLang="en-US" sz="1100" b="0" i="0" u="none" strike="noStrike" kern="1200" baseline="0" dirty="0">
-                          <a:solidFill>
-                            <a:schemeClr val="tx1"/>
-                          </a:solidFill>
-                          <a:effectLst/>
-                          <a:latin typeface="+mn-ea"/>
-                          <a:ea typeface="+mn-ea"/>
-                          <a:cs typeface="+mn-cs"/>
-                        </a:rPr>
-                        <a:t>아이디</a:t>
-                      </a:r>
-                      <a:r>
-                        <a:rPr lang="en-US" altLang="ko-KR" sz="1100" b="0" i="0" u="none" strike="noStrike" kern="1200" baseline="0" dirty="0">
-                          <a:solidFill>
-                            <a:schemeClr val="tx1"/>
-                          </a:solidFill>
-                          <a:effectLst/>
-                          <a:latin typeface="+mn-ea"/>
-                          <a:ea typeface="+mn-ea"/>
-                          <a:cs typeface="+mn-cs"/>
-                        </a:rPr>
-                        <a:t>, </a:t>
-                      </a:r>
-                      <a:r>
-                        <a:rPr lang="ko-KR" altLang="en-US" sz="1100" b="0" i="0" u="none" strike="noStrike" kern="1200" baseline="0" dirty="0">
-                          <a:solidFill>
-                            <a:schemeClr val="tx1"/>
-                          </a:solidFill>
-                          <a:effectLst/>
-                          <a:latin typeface="+mn-ea"/>
-                          <a:ea typeface="+mn-ea"/>
-                          <a:cs typeface="+mn-cs"/>
-                        </a:rPr>
-                        <a:t>나이</a:t>
-                      </a:r>
-                      <a:r>
-                        <a:rPr lang="en-US" altLang="ko-KR" sz="1100" b="0" i="0" u="none" strike="noStrike" kern="1200" baseline="0" dirty="0">
-                          <a:solidFill>
-                            <a:schemeClr val="tx1"/>
-                          </a:solidFill>
-                          <a:effectLst/>
-                          <a:latin typeface="+mn-ea"/>
-                          <a:ea typeface="+mn-ea"/>
-                          <a:cs typeface="+mn-cs"/>
-                        </a:rPr>
-                        <a:t>, </a:t>
-                      </a:r>
-                      <a:r>
-                        <a:rPr lang="ko-KR" altLang="en-US" sz="1100" b="0" i="0" u="none" strike="noStrike" kern="1200" baseline="0" dirty="0">
-                          <a:solidFill>
-                            <a:schemeClr val="tx1"/>
-                          </a:solidFill>
-                          <a:effectLst/>
-                          <a:latin typeface="+mn-ea"/>
-                          <a:ea typeface="+mn-ea"/>
-                          <a:cs typeface="+mn-cs"/>
-                        </a:rPr>
-                        <a:t>학과</a:t>
-                      </a:r>
-                      <a:r>
-                        <a:rPr lang="en-US" altLang="ko-KR" sz="1100" b="0" i="0" u="none" strike="noStrike" kern="1200" baseline="0" dirty="0">
-                          <a:solidFill>
-                            <a:schemeClr val="tx1"/>
-                          </a:solidFill>
-                          <a:effectLst/>
-                          <a:latin typeface="+mn-ea"/>
-                          <a:ea typeface="+mn-ea"/>
-                          <a:cs typeface="+mn-cs"/>
-                        </a:rPr>
-                        <a:t>)</a:t>
-                      </a:r>
-                      <a:r>
-                        <a:rPr lang="ko-KR" altLang="en-US" sz="1100" b="0" i="0" u="none" strike="noStrike" kern="1200" baseline="0" dirty="0">
-                          <a:solidFill>
-                            <a:schemeClr val="tx1"/>
-                          </a:solidFill>
-                          <a:effectLst/>
-                          <a:latin typeface="+mn-ea"/>
-                          <a:ea typeface="+mn-ea"/>
-                          <a:cs typeface="+mn-cs"/>
-                        </a:rPr>
-                        <a:t>를 화면에 </a:t>
-                      </a:r>
-                      <a:r>
-                        <a:rPr lang="ko-KR" altLang="en-US" sz="1100" b="0" i="0" u="none" strike="noStrike" kern="1200" baseline="0" dirty="0" err="1">
-                          <a:solidFill>
-                            <a:schemeClr val="tx1"/>
-                          </a:solidFill>
-                          <a:effectLst/>
-                          <a:latin typeface="+mn-ea"/>
-                          <a:ea typeface="+mn-ea"/>
-                          <a:cs typeface="+mn-cs"/>
-                        </a:rPr>
-                        <a:t>리스트업한다</a:t>
-                      </a:r>
-                      <a:r>
-                        <a:rPr lang="en-US" altLang="ko-KR" sz="1100" b="0" i="0" u="none" strike="noStrike" kern="1200" baseline="0" dirty="0">
-                          <a:solidFill>
-                            <a:schemeClr val="tx1"/>
-                          </a:solidFill>
-                          <a:effectLst/>
-                          <a:latin typeface="+mn-ea"/>
-                          <a:ea typeface="+mn-ea"/>
-                          <a:cs typeface="+mn-cs"/>
-                        </a:rPr>
-                        <a:t>.</a:t>
-                      </a:r>
-                    </a:p>
-                    <a:p>
-                      <a:pPr marL="648000" rtl="0" fontAlgn="base"/>
-                      <a:r>
-                        <a:rPr lang="ko-KR" altLang="en-US" sz="1100" b="0" i="0" u="none" strike="noStrike" kern="1200" baseline="0" dirty="0">
-                          <a:solidFill>
-                            <a:schemeClr val="tx1"/>
-                          </a:solidFill>
-                          <a:effectLst/>
-                          <a:latin typeface="+mn-ea"/>
-                          <a:ea typeface="+mn-ea"/>
-                          <a:cs typeface="+mn-cs"/>
-                        </a:rPr>
-                        <a:t>사용자는 추가하고자 하는 회원을 선택하거나 기존 회원 중 추방을 원하는 회원 옆의 </a:t>
-                      </a:r>
-                      <a:r>
-                        <a:rPr lang="en-US" altLang="ko-KR" sz="1100" b="0" i="0" u="none" strike="noStrike" kern="1200" baseline="0" dirty="0">
-                          <a:solidFill>
-                            <a:schemeClr val="tx1"/>
-                          </a:solidFill>
-                          <a:effectLst/>
-                          <a:latin typeface="+mn-ea"/>
-                          <a:ea typeface="+mn-ea"/>
-                          <a:cs typeface="+mn-cs"/>
-                        </a:rPr>
-                        <a:t>‘</a:t>
-                      </a:r>
-                      <a:r>
-                        <a:rPr lang="ko-KR" altLang="en-US" sz="1100" b="0" i="0" u="none" strike="noStrike" kern="1200" baseline="0" dirty="0">
-                          <a:solidFill>
-                            <a:schemeClr val="tx1"/>
-                          </a:solidFill>
-                          <a:effectLst/>
-                          <a:latin typeface="+mn-ea"/>
-                          <a:ea typeface="+mn-ea"/>
-                          <a:cs typeface="+mn-cs"/>
-                        </a:rPr>
-                        <a:t>추방</a:t>
-                      </a:r>
-                      <a:r>
-                        <a:rPr lang="en-US" altLang="ko-KR" sz="1100" b="0" i="0" u="none" strike="noStrike" kern="1200" baseline="0" dirty="0">
-                          <a:solidFill>
-                            <a:schemeClr val="tx1"/>
-                          </a:solidFill>
-                          <a:effectLst/>
-                          <a:latin typeface="+mn-ea"/>
-                          <a:ea typeface="+mn-ea"/>
-                          <a:cs typeface="+mn-cs"/>
-                        </a:rPr>
-                        <a:t>’</a:t>
-                      </a:r>
-                      <a:r>
-                        <a:rPr lang="ko-KR" altLang="en-US" sz="1100" b="0" i="0" u="none" strike="noStrike" kern="1200" baseline="0" dirty="0">
-                          <a:solidFill>
-                            <a:schemeClr val="tx1"/>
-                          </a:solidFill>
-                          <a:effectLst/>
-                          <a:latin typeface="+mn-ea"/>
-                          <a:ea typeface="+mn-ea"/>
-                          <a:cs typeface="+mn-cs"/>
-                        </a:rPr>
-                        <a:t>칸을 선택한 후 </a:t>
-                      </a:r>
-                      <a:r>
-                        <a:rPr lang="en-US" altLang="ko-KR" sz="1100" b="0" i="0" u="none" strike="noStrike" kern="1200" baseline="0" dirty="0">
-                          <a:solidFill>
-                            <a:schemeClr val="tx1"/>
-                          </a:solidFill>
-                          <a:effectLst/>
-                          <a:latin typeface="+mn-ea"/>
-                          <a:ea typeface="+mn-ea"/>
-                          <a:cs typeface="+mn-cs"/>
-                        </a:rPr>
-                        <a:t>‘</a:t>
-                      </a:r>
-                      <a:r>
-                        <a:rPr lang="ko-KR" altLang="en-US" sz="1100" b="0" i="0" u="none" strike="noStrike" kern="1200" baseline="0" dirty="0">
-                          <a:solidFill>
-                            <a:schemeClr val="tx1"/>
-                          </a:solidFill>
-                          <a:effectLst/>
-                          <a:latin typeface="+mn-ea"/>
-                          <a:ea typeface="+mn-ea"/>
-                          <a:cs typeface="+mn-cs"/>
-                        </a:rPr>
-                        <a:t>완료</a:t>
-                      </a:r>
-                      <a:r>
-                        <a:rPr lang="en-US" altLang="ko-KR" sz="1100" b="0" i="0" u="none" strike="noStrike" kern="1200" baseline="0" dirty="0">
-                          <a:solidFill>
-                            <a:schemeClr val="tx1"/>
-                          </a:solidFill>
-                          <a:effectLst/>
-                          <a:latin typeface="+mn-ea"/>
-                          <a:ea typeface="+mn-ea"/>
-                          <a:cs typeface="+mn-cs"/>
-                        </a:rPr>
-                        <a:t>’</a:t>
-                      </a:r>
-                      <a:r>
-                        <a:rPr lang="ko-KR" altLang="en-US" sz="1100" b="0" i="0" u="none" strike="noStrike" kern="1200" baseline="0" dirty="0">
-                          <a:solidFill>
-                            <a:schemeClr val="tx1"/>
-                          </a:solidFill>
-                          <a:effectLst/>
-                          <a:latin typeface="+mn-ea"/>
-                          <a:ea typeface="+mn-ea"/>
-                          <a:cs typeface="+mn-cs"/>
-                        </a:rPr>
-                        <a:t>버튼을 클릭한다</a:t>
-                      </a:r>
-                      <a:r>
-                        <a:rPr lang="en-US" altLang="ko-KR" sz="1100" b="0" i="0" u="none" strike="noStrike" kern="1200" baseline="0" dirty="0">
-                          <a:solidFill>
-                            <a:schemeClr val="tx1"/>
-                          </a:solidFill>
-                          <a:effectLst/>
-                          <a:latin typeface="+mn-ea"/>
-                          <a:ea typeface="+mn-ea"/>
-                          <a:cs typeface="+mn-cs"/>
-                        </a:rPr>
-                        <a:t>.</a:t>
-                      </a:r>
-                      <a:r>
-                        <a:rPr lang="en-US" altLang="ko-KR" sz="1100" b="0" i="0" u="none" strike="noStrike" kern="1200" dirty="0">
-                          <a:solidFill>
-                            <a:schemeClr val="dk1"/>
-                          </a:solidFill>
-                          <a:effectLst/>
-                          <a:latin typeface="+mn-ea"/>
-                          <a:ea typeface="+mn-ea"/>
-                          <a:cs typeface="+mn-cs"/>
-                        </a:rPr>
-                        <a:t> </a:t>
-                      </a:r>
+                        <a:t>. </a:t>
+                      </a:r>
+                      <a:endParaRPr lang="en-US" altLang="ko-KR" sz="1100" b="0" i="0" u="none" strike="noStrike" kern="1200" baseline="0" dirty="0">
+                        <a:solidFill>
+                          <a:schemeClr val="tx1"/>
+                        </a:solidFill>
+                        <a:effectLst/>
+                        <a:latin typeface="+mn-ea"/>
+                        <a:ea typeface="+mn-ea"/>
+                        <a:cs typeface="+mn-cs"/>
+                      </a:endParaRPr>
                     </a:p>
                     <a:p>
                       <a:pPr lvl="1" rtl="0" fontAlgn="base"/>
@@ -12486,6 +12044,210 @@
                           <a:cs typeface="+mn-cs"/>
                         </a:rPr>
                         <a:t>3.4 </a:t>
+                      </a:r>
+                      <a:r>
+                        <a:rPr lang="ko-KR" altLang="en-US" sz="1100" b="0" i="0" u="none" strike="noStrike" kern="1200" dirty="0">
+                          <a:solidFill>
+                            <a:schemeClr val="dk1"/>
+                          </a:solidFill>
+                          <a:effectLst/>
+                          <a:latin typeface="+mn-ea"/>
+                          <a:ea typeface="+mn-ea"/>
+                          <a:cs typeface="+mn-cs"/>
+                        </a:rPr>
+                        <a:t>모임 구성원 삭제</a:t>
+                      </a:r>
+                      <a:endParaRPr lang="en-US" altLang="ko-KR" sz="1100" b="0" i="0" u="none" strike="noStrike" kern="1200" dirty="0">
+                        <a:solidFill>
+                          <a:schemeClr val="dk1"/>
+                        </a:solidFill>
+                        <a:effectLst/>
+                        <a:latin typeface="+mn-ea"/>
+                        <a:ea typeface="+mn-ea"/>
+                        <a:cs typeface="+mn-cs"/>
+                      </a:endParaRPr>
+                    </a:p>
+                    <a:p>
+                      <a:pPr lvl="1" rtl="0" fontAlgn="base"/>
+                      <a:r>
+                        <a:rPr lang="en-US" altLang="ko-KR" sz="1100" b="0" i="0" u="none" strike="noStrike" kern="1200" dirty="0">
+                          <a:solidFill>
+                            <a:schemeClr val="dk1"/>
+                          </a:solidFill>
+                          <a:effectLst/>
+                          <a:latin typeface="+mn-ea"/>
+                          <a:ea typeface="+mn-ea"/>
+                          <a:cs typeface="+mn-cs"/>
+                        </a:rPr>
+                        <a:t>    </a:t>
+                      </a:r>
+                      <a:r>
+                        <a:rPr lang="ko-KR" altLang="en-US" sz="1100" b="0" i="0" u="none" strike="noStrike" kern="1200" dirty="0">
+                          <a:solidFill>
+                            <a:schemeClr val="tx1"/>
+                          </a:solidFill>
+                          <a:effectLst/>
+                          <a:latin typeface="+mn-ea"/>
+                          <a:ea typeface="+mn-ea"/>
+                          <a:cs typeface="+mn-cs"/>
+                        </a:rPr>
+                        <a:t>사용자는 화면에 리스트업 된 모임 구성원 이름 중</a:t>
+                      </a:r>
+                      <a:r>
+                        <a:rPr lang="en-US" altLang="ko-KR" sz="1100" b="0" i="0" u="none" strike="noStrike" kern="1200" dirty="0">
+                          <a:solidFill>
+                            <a:schemeClr val="tx1"/>
+                          </a:solidFill>
+                          <a:effectLst/>
+                          <a:latin typeface="+mn-ea"/>
+                          <a:ea typeface="+mn-ea"/>
+                          <a:cs typeface="+mn-cs"/>
+                        </a:rPr>
+                        <a:t>, </a:t>
+                      </a:r>
+                      <a:r>
+                        <a:rPr lang="ko-KR" altLang="en-US" sz="1100" b="0" i="0" u="none" strike="noStrike" kern="1200" dirty="0">
+                          <a:solidFill>
+                            <a:schemeClr val="tx1"/>
+                          </a:solidFill>
+                          <a:effectLst/>
+                          <a:latin typeface="+mn-ea"/>
+                          <a:ea typeface="+mn-ea"/>
+                          <a:cs typeface="+mn-cs"/>
+                        </a:rPr>
+                        <a:t>추방을 원하는 이름 옆 </a:t>
+                      </a:r>
+                      <a:r>
+                        <a:rPr lang="en-US" altLang="ko-KR" sz="1100" b="0" i="0" u="none" strike="noStrike" kern="1200" dirty="0">
+                          <a:solidFill>
+                            <a:schemeClr val="tx1"/>
+                          </a:solidFill>
+                          <a:effectLst/>
+                          <a:latin typeface="+mn-ea"/>
+                          <a:ea typeface="+mn-ea"/>
+                          <a:cs typeface="+mn-cs"/>
+                        </a:rPr>
+                        <a:t>‘X’ </a:t>
+                      </a:r>
+                      <a:r>
+                        <a:rPr lang="ko-KR" altLang="en-US" sz="1100" b="0" i="0" u="none" strike="noStrike" kern="1200" dirty="0">
+                          <a:solidFill>
+                            <a:schemeClr val="tx1"/>
+                          </a:solidFill>
+                          <a:effectLst/>
+                          <a:latin typeface="+mn-ea"/>
+                          <a:ea typeface="+mn-ea"/>
+                          <a:cs typeface="+mn-cs"/>
+                        </a:rPr>
+                        <a:t>버튼을 누른다</a:t>
+                      </a:r>
+                      <a:r>
+                        <a:rPr lang="en-US" altLang="ko-KR" sz="1100" b="0" i="0" u="none" strike="noStrike" kern="1200" dirty="0">
+                          <a:solidFill>
+                            <a:schemeClr val="tx1"/>
+                          </a:solidFill>
+                          <a:effectLst/>
+                          <a:latin typeface="+mn-ea"/>
+                          <a:ea typeface="+mn-ea"/>
+                          <a:cs typeface="+mn-cs"/>
+                        </a:rPr>
+                        <a:t>. </a:t>
+                      </a:r>
+                      <a:r>
+                        <a:rPr lang="ko-KR" altLang="en-US" sz="1100" b="0" i="0" u="none" strike="noStrike" kern="1200" dirty="0">
+                          <a:solidFill>
+                            <a:schemeClr val="tx1"/>
+                          </a:solidFill>
+                          <a:effectLst/>
+                          <a:latin typeface="+mn-ea"/>
+                          <a:ea typeface="+mn-ea"/>
+                          <a:cs typeface="+mn-cs"/>
+                        </a:rPr>
+                        <a:t>시스템은 해당 회원을 </a:t>
+                      </a:r>
+                      <a:endParaRPr lang="en-US" altLang="ko-KR" sz="1100" b="0" i="0" u="none" strike="noStrike" kern="1200" dirty="0">
+                        <a:solidFill>
+                          <a:schemeClr val="tx1"/>
+                        </a:solidFill>
+                        <a:effectLst/>
+                        <a:latin typeface="+mn-ea"/>
+                        <a:ea typeface="+mn-ea"/>
+                        <a:cs typeface="+mn-cs"/>
+                      </a:endParaRPr>
+                    </a:p>
+                    <a:p>
+                      <a:pPr lvl="1" rtl="0" fontAlgn="base"/>
+                      <a:r>
+                        <a:rPr lang="en-US" altLang="ko-KR" sz="1100" b="0" i="0" u="none" strike="noStrike" kern="1200" dirty="0">
+                          <a:solidFill>
+                            <a:schemeClr val="tx1"/>
+                          </a:solidFill>
+                          <a:effectLst/>
+                          <a:latin typeface="+mn-ea"/>
+                          <a:ea typeface="+mn-ea"/>
+                          <a:cs typeface="+mn-cs"/>
+                        </a:rPr>
+                        <a:t>    </a:t>
+                      </a:r>
+                      <a:r>
+                        <a:rPr lang="ko-KR" altLang="en-US" sz="1100" b="0" i="0" u="none" strike="noStrike" kern="1200" dirty="0">
+                          <a:solidFill>
+                            <a:schemeClr val="tx1"/>
+                          </a:solidFill>
+                          <a:effectLst/>
+                          <a:latin typeface="+mn-ea"/>
+                          <a:ea typeface="+mn-ea"/>
+                          <a:cs typeface="+mn-cs"/>
+                        </a:rPr>
+                        <a:t>모임 구성원에서 삭제한 후 그 이름을 화면상에서 없앤다</a:t>
+                      </a:r>
+                      <a:r>
+                        <a:rPr lang="en-US" altLang="ko-KR" sz="1100" b="0" i="0" u="none" strike="noStrike" kern="1200" dirty="0">
+                          <a:solidFill>
+                            <a:schemeClr val="tx1"/>
+                          </a:solidFill>
+                          <a:effectLst/>
+                          <a:latin typeface="+mn-ea"/>
+                          <a:ea typeface="+mn-ea"/>
+                          <a:cs typeface="+mn-cs"/>
+                        </a:rPr>
+                        <a:t>.</a:t>
+                      </a:r>
+                      <a:r>
+                        <a:rPr lang="ko-KR" altLang="en-US" sz="1100" b="0" i="0" u="none" strike="noStrike" kern="1200" dirty="0">
+                          <a:solidFill>
+                            <a:schemeClr val="tx1"/>
+                          </a:solidFill>
+                          <a:effectLst/>
+                          <a:latin typeface="+mn-ea"/>
+                          <a:ea typeface="+mn-ea"/>
+                          <a:cs typeface="+mn-cs"/>
+                        </a:rPr>
+                        <a:t> </a:t>
+                      </a:r>
+                      <a:endParaRPr lang="en-US" altLang="ko-KR" sz="1100" b="0" i="0" u="none" strike="noStrike" kern="1200" dirty="0">
+                        <a:solidFill>
+                          <a:schemeClr val="tx1"/>
+                        </a:solidFill>
+                        <a:effectLst/>
+                        <a:latin typeface="+mn-ea"/>
+                        <a:ea typeface="+mn-ea"/>
+                        <a:cs typeface="+mn-cs"/>
+                      </a:endParaRPr>
+                    </a:p>
+                    <a:p>
+                      <a:pPr lvl="1" rtl="0" fontAlgn="base"/>
+                      <a:r>
+                        <a:rPr lang="en-US" altLang="ko-KR" sz="1100" b="0" i="0" u="none" strike="noStrike" kern="1200" dirty="0">
+                          <a:solidFill>
+                            <a:schemeClr val="dk1"/>
+                          </a:solidFill>
+                          <a:effectLst/>
+                          <a:latin typeface="+mn-ea"/>
+                          <a:ea typeface="+mn-ea"/>
+                          <a:cs typeface="+mn-cs"/>
+                        </a:rPr>
+                        <a:t>3.5 </a:t>
                       </a:r>
                       <a:r>
                         <a:rPr lang="ko-KR" altLang="en-US" sz="1100" b="0" i="0" u="none" strike="noStrike" kern="1200" dirty="0">
@@ -12550,7 +12312,7 @@
                           <a:ea typeface="+mn-ea"/>
                           <a:cs typeface="+mn-cs"/>
                         </a:rPr>
-                        <a:t>수정완료</a:t>
+                        <a:t>등록</a:t>
                       </a:r>
                       <a:r>
                         <a:rPr lang="en-US" altLang="ko-KR" sz="1100" b="0" i="0" u="none" strike="noStrike" kern="1200" dirty="0">
@@ -12639,7 +12401,7 @@
                           <a:ea typeface="+mn-ea"/>
                           <a:cs typeface="+mn-cs"/>
                         </a:rPr>
-                        <a:t>.’</a:t>
+                        <a:t>’</a:t>
                       </a:r>
                       <a:r>
                         <a:rPr lang="ko-KR" altLang="en-US" sz="1100" b="0" i="0" u="none" strike="noStrike" kern="1200" dirty="0">
@@ -13350,6 +13112,11 @@
                         </a:rPr>
                         <a:t>.</a:t>
                       </a:r>
+                    </a:p>
+                    <a:p>
+                      <a:pPr marL="648000" indent="0" rtl="0" fontAlgn="base">
+                        <a:buNone/>
+                      </a:pPr>
                       <a:endParaRPr lang="en-US" altLang="ko-KR" sz="1100" b="0" i="0" u="none" strike="noStrike" kern="1200" dirty="0">
                         <a:solidFill>
                           <a:srgbClr val="FF0000"/>
@@ -16400,7 +16167,7 @@
           <p:nvPr>
             <p:extLst>
               <p:ext uri="{D42A27DB-BD31-4B8C-83A1-F6EECF244321}">
-                <p14:modId xmlns:p14="http://schemas.microsoft.com/office/powerpoint/2010/main" val="3412093765"/>
+                <p14:modId xmlns:p14="http://schemas.microsoft.com/office/powerpoint/2010/main" val="2033503706"/>
               </p:ext>
             </p:extLst>
           </p:nvPr>
@@ -17550,7 +17317,7 @@
                           </a:solidFill>
                           <a:effectLst/>
                         </a:rPr>
-                        <a:t>모임 일정 생성＇ 버튼을 클릭한다</a:t>
+                        <a:t>일정 생성</a:t>
                       </a:r>
                       <a:r>
                         <a:rPr lang="en-US" altLang="ko-KR" sz="1100" b="0" kern="100" dirty="0">
@@ -17559,6 +17326,24 @@
                           </a:solidFill>
                           <a:effectLst/>
                         </a:rPr>
+                        <a:t>’</a:t>
+                      </a:r>
+                      <a:r>
+                        <a:rPr lang="ko-KR" altLang="en-US" sz="1100" b="0" kern="100" dirty="0">
+                          <a:solidFill>
+                            <a:schemeClr val="tx1"/>
+                          </a:solidFill>
+                          <a:effectLst/>
+                        </a:rPr>
+                        <a:t> 버튼을 클릭한다</a:t>
+                      </a:r>
+                      <a:r>
+                        <a:rPr lang="en-US" altLang="ko-KR" sz="1100" b="0" kern="100" dirty="0">
+                          <a:solidFill>
+                            <a:schemeClr val="tx1"/>
+                          </a:solidFill>
+                          <a:effectLst/>
+                        </a:rPr>
                         <a:t>. </a:t>
                       </a:r>
                       <a:r>
@@ -17586,7 +17371,25 @@
                           </a:solidFill>
                           <a:effectLst/>
                         </a:rPr>
-                        <a:t>모임 일정 등록＇ 화면으로 넘어가며</a:t>
+                        <a:t>모임 일정 등록</a:t>
+                      </a:r>
+                      <a:r>
+                        <a:rPr lang="en-US" altLang="ko-KR" sz="1100" b="0" kern="100" dirty="0">
+                          <a:solidFill>
+                            <a:schemeClr val="tx1"/>
+                          </a:solidFill>
+                          <a:effectLst/>
+                        </a:rPr>
+                        <a:t>’</a:t>
+                      </a:r>
+                      <a:r>
+                        <a:rPr lang="ko-KR" altLang="en-US" sz="1100" b="0" kern="100" dirty="0">
+                          <a:solidFill>
+                            <a:schemeClr val="tx1"/>
+                          </a:solidFill>
+                          <a:effectLst/>
+                        </a:rPr>
+                        <a:t> 페이지로 넘어가며</a:t>
                       </a:r>
                       <a:r>
                         <a:rPr lang="en-US" altLang="ko-KR" sz="1100" b="0" kern="100" dirty="0">
@@ -17676,31 +17479,163 @@
                         <a:rPr lang="ko-KR" altLang="en-US" sz="1100" b="0" kern="100" dirty="0">
                           <a:effectLst/>
                         </a:rPr>
-                        <a:t>사용자는  </a:t>
+                        <a:t>사용자는 화면 하단의 일정 생성 버튼을 클릭한다</a:t>
                       </a:r>
                       <a:r>
                         <a:rPr lang="en-US" altLang="ko-KR" sz="1100" b="0" kern="100" dirty="0">
                           <a:effectLst/>
                         </a:rPr>
+                        <a:t>. </a:t>
+                      </a:r>
+                      <a:r>
+                        <a:rPr lang="ko-KR" altLang="en-US" sz="1100" b="0" kern="100" dirty="0">
+                          <a:effectLst/>
+                        </a:rPr>
+                        <a:t>시스템은 모임 </a:t>
+                      </a:r>
+                      <a:r>
+                        <a:rPr lang="ko-KR" altLang="en-US" sz="1100" b="0" kern="100" dirty="0" err="1">
+                          <a:effectLst/>
+                        </a:rPr>
+                        <a:t>일정명</a:t>
+                      </a:r>
+                      <a:r>
+                        <a:rPr lang="en-US" altLang="ko-KR" sz="1100" b="0" kern="100" dirty="0">
+                          <a:effectLst/>
+                        </a:rPr>
+                        <a:t>, </a:t>
+                      </a:r>
+                      <a:r>
+                        <a:rPr lang="ko-KR" altLang="en-US" sz="1100" b="0" kern="100" dirty="0">
+                          <a:effectLst/>
+                        </a:rPr>
+                        <a:t>모임 활동 계획</a:t>
+                      </a:r>
+                      <a:r>
+                        <a:rPr lang="en-US" altLang="ko-KR" sz="1100" b="0" kern="100" dirty="0">
+                          <a:effectLst/>
+                        </a:rPr>
+                        <a:t>, </a:t>
+                      </a:r>
+                      <a:r>
+                        <a:rPr lang="ko-KR" altLang="en-US" sz="1100" b="0" kern="100" dirty="0">
+                          <a:effectLst/>
+                        </a:rPr>
+                        <a:t>모임 일정 기간 및 예상 모임 시간을 입력할 수 있는 화면을 출력한다</a:t>
+                      </a:r>
+                      <a:r>
+                        <a:rPr lang="en-US" altLang="ko-KR" sz="1100" b="0" kern="100" dirty="0">
+                          <a:effectLst/>
+                        </a:rPr>
+                        <a:t>. </a:t>
+                      </a:r>
+                      <a:r>
+                        <a:rPr lang="ko-KR" altLang="en-US" sz="1100" b="0" kern="100" dirty="0">
+                          <a:effectLst/>
+                        </a:rPr>
+                        <a:t>사용자는 모임 </a:t>
+                      </a:r>
+                      <a:r>
+                        <a:rPr lang="ko-KR" altLang="en-US" sz="1100" b="0" kern="100" dirty="0" err="1">
+                          <a:effectLst/>
+                        </a:rPr>
+                        <a:t>일정명</a:t>
+                      </a:r>
+                      <a:r>
+                        <a:rPr lang="en-US" altLang="ko-KR" sz="1100" b="0" kern="100" dirty="0">
+                          <a:effectLst/>
+                        </a:rPr>
+                        <a:t>,</a:t>
+                      </a:r>
+                      <a:r>
+                        <a:rPr lang="ko-KR" altLang="en-US" sz="1100" b="0" kern="100" dirty="0">
+                          <a:effectLst/>
+                        </a:rPr>
+                        <a:t> 모임 활동 계획 및 예상 모임 시간을 입력하고</a:t>
+                      </a:r>
+                      <a:r>
+                        <a:rPr lang="en-US" altLang="ko-KR" sz="1100" b="0" kern="100" dirty="0">
+                          <a:effectLst/>
+                        </a:rPr>
+                        <a:t>, </a:t>
+                      </a:r>
+                      <a:r>
+                        <a:rPr lang="ko-KR" altLang="en-US" sz="1100" b="0" kern="100" dirty="0">
+                          <a:effectLst/>
+                        </a:rPr>
+                        <a:t>모임 일정 기간을 설정한다</a:t>
+                      </a:r>
+                      <a:r>
+                        <a:rPr lang="en-US" altLang="ko-KR" sz="1100" b="0" kern="100" dirty="0">
+                          <a:effectLst/>
+                        </a:rPr>
+                        <a:t>. </a:t>
+                      </a:r>
+                      <a:r>
+                        <a:rPr lang="ko-KR" altLang="en-US" sz="1100" b="0" kern="100" dirty="0">
+                          <a:effectLst/>
+                        </a:rPr>
+                        <a:t>모임 일정 기간의 설정을 원하지 않을 경우</a:t>
+                      </a:r>
+                      <a:r>
+                        <a:rPr lang="en-US" altLang="ko-KR" sz="1100" b="0" kern="100" dirty="0">
+                          <a:effectLst/>
+                        </a:rPr>
+                        <a:t>, ‘</a:t>
+                      </a:r>
+                      <a:r>
+                        <a:rPr lang="ko-KR" altLang="en-US" sz="1100" b="0" kern="100" dirty="0">
+                          <a:effectLst/>
+                        </a:rPr>
+                        <a:t>설정 안 함</a:t>
+                      </a:r>
+                      <a:r>
+                        <a:rPr lang="en-US" altLang="ko-KR" sz="1100" b="0" kern="100" dirty="0">
+                          <a:effectLst/>
+                        </a:rPr>
+                        <a:t>’ </a:t>
+                      </a:r>
+                      <a:r>
+                        <a:rPr lang="ko-KR" altLang="en-US" sz="1100" b="0" kern="100" dirty="0">
+                          <a:effectLst/>
+                        </a:rPr>
+                        <a:t>옆에 위치한 체크박스를 클릭한다</a:t>
+                      </a:r>
+                      <a:r>
+                        <a:rPr lang="en-US" altLang="ko-KR" sz="1100" b="0" kern="100" dirty="0">
+                          <a:effectLst/>
+                        </a:rPr>
+                        <a:t>.</a:t>
+                      </a:r>
+                      <a:r>
+                        <a:rPr lang="ko-KR" altLang="en-US" sz="1100" b="0" kern="100" dirty="0">
+                          <a:effectLst/>
+                        </a:rPr>
+                        <a:t> 사용자는 화면 하단에 </a:t>
+                      </a:r>
+                      <a:r>
+                        <a:rPr lang="en-US" altLang="ko-KR" sz="1100" b="0" kern="100" dirty="0">
+                          <a:effectLst/>
+                        </a:rPr>
                         <a:t>‘</a:t>
                       </a:r>
                       <a:r>
                         <a:rPr lang="ko-KR" altLang="en-US" sz="1100" b="0" kern="100" dirty="0">
                           <a:effectLst/>
                         </a:rPr>
-                        <a:t>일정 생성하기＇ 버튼을 클릭한 뒤</a:t>
+                        <a:t>등록</a:t>
                       </a:r>
                       <a:r>
                         <a:rPr lang="en-US" altLang="ko-KR" sz="1100" b="0" kern="100" dirty="0">
                           <a:effectLst/>
                         </a:rPr>
-                        <a:t>, </a:t>
+                        <a:t>’ </a:t>
                       </a:r>
                       <a:r>
                         <a:rPr lang="ko-KR" altLang="en-US" sz="1100" b="0" kern="100" dirty="0">
                           <a:effectLst/>
                         </a:rPr>
-                        <a:t>모임 일정명과 모임 활동 계획에 대한 간단한 설명을 적고 일정 기간을 입력한 뒤에 등록 버튼을 클릭해서 등록한다</a:t>
+                        <a:t>버튼을 클릭한다</a:t>
                       </a:r>
                       <a:r>
                         <a:rPr lang="en-US" altLang="ko-KR" sz="1100" b="0" kern="100" dirty="0">
@@ -17820,7 +17755,7 @@
                         <a:rPr lang="ko-KR" altLang="en-US" sz="1100" b="0" kern="100" baseline="0" dirty="0">
                           <a:effectLst/>
                         </a:rPr>
-                        <a:t>라는 메시지에 확인 버튼을 누르면</a:t>
+                        <a:t>라는 메시지 확인 버튼을 누르면</a:t>
                       </a:r>
                       <a:r>
                         <a:rPr lang="en-US" altLang="ko-KR" sz="1100" b="0" kern="100" dirty="0">
@@ -18255,14 +18190,14 @@
           <p:nvPr>
             <p:extLst>
               <p:ext uri="{D42A27DB-BD31-4B8C-83A1-F6EECF244321}">
-                <p14:modId xmlns:p14="http://schemas.microsoft.com/office/powerpoint/2010/main" val="1129914274"/>
+                <p14:modId xmlns:p14="http://schemas.microsoft.com/office/powerpoint/2010/main" val="1844155602"/>
               </p:ext>
             </p:extLst>
           </p:nvPr>
         </p:nvGraphicFramePr>
         <p:xfrm>
           <a:off x="251520" y="979752"/>
-          <a:ext cx="8640960" cy="5483580"/>
+          <a:ext cx="8640960" cy="5612237"/>
         </p:xfrm>
         <a:graphic>
           <a:graphicData uri="http://schemas.openxmlformats.org/drawingml/2006/table">
@@ -18467,7 +18402,7 @@
                           </a:solidFill>
                           <a:effectLst/>
                         </a:rPr>
-                        <a:t>사용자는 모임 일정 등록을 통해 생성한 일정 중에 </a:t>
+                        <a:t>사용자는 기존에 생성한 모임 일정 중 </a:t>
                       </a:r>
                       <a:r>
                         <a:rPr lang="en-US" altLang="ko-KR" sz="1100" b="0" kern="100" dirty="0">
@@ -18494,7 +18429,7 @@
                           </a:solidFill>
                           <a:effectLst/>
                         </a:rPr>
-                        <a:t>모임 시간 추천 받기를 원하는 일정을 클릭한다</a:t>
+                        <a:t>시간 및 장소 추천을 아직 받지 않은 일정을 골라</a:t>
                       </a:r>
                       <a:r>
                         <a:rPr lang="en-US" altLang="ko-KR" sz="1100" b="0" kern="100" dirty="0">
@@ -18503,20 +18438,62 @@
                           </a:solidFill>
                           <a:effectLst/>
                         </a:rPr>
-                        <a:t>.</a:t>
-                      </a:r>
-                    </a:p>
-                    <a:p>
-                      <a:pPr marL="648000" indent="0" algn="just" latinLnBrk="1">
-                        <a:lnSpc>
-                          <a:spcPct val="115000"/>
-                        </a:lnSpc>
-                        <a:spcAft>
-                          <a:spcPts val="0"/>
-                        </a:spcAft>
-                        <a:buFontTx/>
-                        <a:buNone/>
-                      </a:pPr>
+                        <a:t>, </a:t>
+                      </a:r>
+                      <a:r>
+                        <a:rPr lang="ko-KR" altLang="en-US" sz="1100" b="0" kern="100" dirty="0">
+                          <a:solidFill>
+                            <a:schemeClr val="tx1"/>
+                          </a:solidFill>
+                          <a:effectLst/>
+                        </a:rPr>
+                        <a:t>해당 일정 옆 </a:t>
+                      </a:r>
+                      <a:r>
+                        <a:rPr lang="en-US" altLang="ko-KR" sz="1100" b="0" kern="100" dirty="0">
+                          <a:solidFill>
+                            <a:schemeClr val="tx1"/>
+                          </a:solidFill>
+                          <a:effectLst/>
+                        </a:rPr>
+                        <a:t>‘</a:t>
+                      </a:r>
+                      <a:r>
+                        <a:rPr lang="ko-KR" altLang="en-US" sz="1100" b="0" kern="100" dirty="0">
+                          <a:solidFill>
+                            <a:schemeClr val="tx1"/>
+                          </a:solidFill>
+                          <a:effectLst/>
+                        </a:rPr>
+                        <a:t>시간 및 장소 추천 받기</a:t>
+                      </a:r>
+                      <a:r>
+                        <a:rPr lang="en-US" altLang="ko-KR" sz="1100" b="0" kern="100" dirty="0">
+                          <a:solidFill>
+                            <a:schemeClr val="tx1"/>
+                          </a:solidFill>
+                          <a:effectLst/>
+                        </a:rPr>
+                        <a:t>’ </a:t>
+                      </a:r>
+                      <a:r>
+                        <a:rPr lang="ko-KR" altLang="en-US" sz="1100" b="0" kern="100" dirty="0">
+                          <a:solidFill>
+                            <a:schemeClr val="tx1"/>
+                          </a:solidFill>
+                          <a:effectLst/>
+                        </a:rPr>
+                        <a:t>버튼을 누른다</a:t>
+                      </a:r>
+                      <a:r>
+                        <a:rPr lang="en-US" altLang="ko-KR" sz="1100" b="0" kern="100" dirty="0">
+                          <a:solidFill>
+                            <a:schemeClr val="tx1"/>
+                          </a:solidFill>
+                          <a:effectLst/>
+                        </a:rPr>
+                        <a:t>. </a:t>
+                      </a:r>
                       <a:r>
                         <a:rPr lang="ko-KR" altLang="en-US" sz="1100" b="0" kern="100" dirty="0">
                           <a:solidFill>
@@ -19385,7 +19362,7 @@
                         <a:rPr lang="ko-KR" altLang="en-US" sz="1100" b="0" kern="100" dirty="0">
                           <a:effectLst/>
                         </a:rPr>
-                        <a:t>장소</a:t>
+                        <a:t>장소 추천</a:t>
                       </a:r>
                       <a:r>
                         <a:rPr lang="en-US" altLang="ko-KR" sz="1100" b="0" kern="100" dirty="0">
@@ -19397,7 +19374,19 @@
                         <a:rPr lang="ko-KR" altLang="en-US" sz="1100" b="0" kern="100" dirty="0">
                           <a:effectLst/>
                         </a:rPr>
-                        <a:t>화면에 달력 표시와 글 목록으로 </a:t>
+                        <a:t>화면에 달력 시각적으로 제시하고</a:t>
+                      </a:r>
+                      <a:r>
+                        <a:rPr lang="en-US" altLang="ko-KR" sz="1100" b="0" kern="100" dirty="0">
+                          <a:effectLst/>
+                        </a:rPr>
+                        <a:t>, </a:t>
+                      </a:r>
+                      <a:r>
+                        <a:rPr lang="ko-KR" altLang="en-US" sz="1100" b="0" kern="100" dirty="0">
+                          <a:effectLst/>
+                        </a:rPr>
+                        <a:t>하단에 글 목록으로 </a:t>
                       </a:r>
                       <a:r>
                         <a:rPr lang="en-US" altLang="ko-KR" sz="1100" b="0" kern="100" dirty="0">
@@ -21438,7 +21427,7 @@
           <p:nvPr>
             <p:extLst>
               <p:ext uri="{D42A27DB-BD31-4B8C-83A1-F6EECF244321}">
-                <p14:modId xmlns:p14="http://schemas.microsoft.com/office/powerpoint/2010/main" val="1787601949"/>
+                <p14:modId xmlns:p14="http://schemas.microsoft.com/office/powerpoint/2010/main" val="1955108289"/>
               </p:ext>
             </p:extLst>
           </p:nvPr>
@@ -23083,7 +23072,7 @@
                           <a:ea typeface="+mn-ea"/>
                           <a:cs typeface="+mn-cs"/>
                         </a:rPr>
-                        <a:t>사용자는 ‘내 일정 관리’ 페이지 상단 좌측에 ‘외부 일정 연동하기’ 버튼을 클릭한다</a:t>
+                        <a:t>사용자는 ‘내 일정 관리’ 페이지 상단 우측에 ‘외부 일정 연동하기’ 버튼을 클릭한다</a:t>
                       </a:r>
                       <a:r>
                         <a:rPr lang="en-US" altLang="ko-KR" sz="1100" b="0" i="0" u="none" strike="noStrike" kern="1200" dirty="0">
@@ -23858,7 +23847,7 @@
           <p:nvPr>
             <p:extLst>
               <p:ext uri="{D42A27DB-BD31-4B8C-83A1-F6EECF244321}">
-                <p14:modId xmlns:p14="http://schemas.microsoft.com/office/powerpoint/2010/main" val="3996827861"/>
+                <p14:modId xmlns:p14="http://schemas.microsoft.com/office/powerpoint/2010/main" val="1185695352"/>
               </p:ext>
             </p:extLst>
           </p:nvPr>
@@ -24868,7 +24857,7 @@
                         <a:rPr lang="ko-KR" altLang="en-US" sz="1100" b="0" kern="100" dirty="0">
                           <a:effectLst/>
                         </a:rPr>
-                        <a:t>장소</a:t>
+                        <a:t>장소 추천</a:t>
                       </a:r>
                       <a:r>
                         <a:rPr lang="en-US" altLang="ko-KR" sz="1100" b="0" kern="100" dirty="0">
@@ -34034,14 +34023,14 @@
           <p:nvPr>
             <p:extLst>
               <p:ext uri="{D42A27DB-BD31-4B8C-83A1-F6EECF244321}">
-                <p14:modId xmlns:p14="http://schemas.microsoft.com/office/powerpoint/2010/main" val="2033687246"/>
+                <p14:modId xmlns:p14="http://schemas.microsoft.com/office/powerpoint/2010/main" val="3573094343"/>
               </p:ext>
             </p:extLst>
           </p:nvPr>
         </p:nvGraphicFramePr>
         <p:xfrm>
           <a:off x="526356" y="1200957"/>
-          <a:ext cx="8091287" cy="4203510"/>
+          <a:ext cx="8091287" cy="4371150"/>
         </p:xfrm>
         <a:graphic>
           <a:graphicData uri="http://schemas.openxmlformats.org/drawingml/2006/table">
@@ -34189,6 +34178,34 @@
                         <a:tabLst/>
                         <a:defRPr/>
                       </a:pPr>
+                      <a:endParaRPr lang="en-US" altLang="ko-KR" sz="1100" b="0" i="0" u="none" strike="noStrike" kern="1200" dirty="0">
+                        <a:solidFill>
+                          <a:schemeClr val="tx1"/>
+                        </a:solidFill>
+                        <a:effectLst/>
+                        <a:latin typeface="+mn-lt"/>
+                        <a:ea typeface="+mn-ea"/>
+                        <a:cs typeface="+mn-cs"/>
+                      </a:endParaRPr>
+                    </a:p>
+                    <a:p>
+                      <a:pPr marL="0" marR="0" lvl="0" indent="0" algn="l" defTabSz="914400" rtl="0" eaLnBrk="1" fontAlgn="base" latinLnBrk="1" hangingPunct="1">
+                        <a:lnSpc>
+                          <a:spcPct val="100000"/>
+                        </a:lnSpc>
+                        <a:spcBef>
+                          <a:spcPts val="0"/>
+                        </a:spcBef>
+                        <a:spcAft>
+                          <a:spcPts val="0"/>
+                        </a:spcAft>
+                        <a:buClrTx/>
+                        <a:buSzTx/>
+                        <a:buFontTx/>
+                        <a:buNone/>
+                        <a:tabLst/>
+                        <a:defRPr/>
+                      </a:pPr>
                       <a:r>
                         <a:rPr lang="en-US" altLang="ko-KR" sz="1100" b="0" i="0" u="none" strike="noStrike" kern="1200" dirty="0">
                           <a:solidFill>
@@ -34265,9 +34282,18 @@
                         </a:rPr>
                         <a:t>일정을 등록하고자 하는 날짜 선택</a:t>
                       </a:r>
+                      <a:endParaRPr lang="en-US" altLang="ko-KR" sz="1100" b="0" i="0" u="none" strike="noStrike" kern="1200" dirty="0">
+                        <a:solidFill>
+                          <a:schemeClr val="tx1"/>
+                        </a:solidFill>
+                        <a:effectLst/>
+                        <a:latin typeface="+mn-lt"/>
+                        <a:ea typeface="+mn-ea"/>
+                        <a:cs typeface="+mn-cs"/>
+                      </a:endParaRPr>
                     </a:p>
                     <a:p>
-                      <a:pPr marL="637200" marR="0" lvl="2" indent="0" algn="l" defTabSz="914400" rtl="0" eaLnBrk="1" fontAlgn="base" latinLnBrk="1" hangingPunct="1">
+                      <a:pPr marL="457200" marR="0" lvl="1" indent="0" algn="l" defTabSz="914400" rtl="0" eaLnBrk="1" fontAlgn="base" latinLnBrk="1" hangingPunct="1">
                         <a:lnSpc>
                           <a:spcPct val="100000"/>
                         </a:lnSpc>
@@ -34294,7 +34320,7 @@
                           <a:ea typeface="+mn-ea"/>
                           <a:cs typeface="+mn-cs"/>
                         </a:rPr>
-                        <a:t>사용자는 개인 일정을 보여주는 달력에서 일정을 추가하고 싶은 날짜를 클릭한다</a:t>
+                        <a:t>사용자는 </a:t>
                       </a:r>
                       <a:r>
                         <a:rPr lang="en-US" altLang="ko-KR" sz="1100" b="0" i="0" u="none" strike="noStrike" kern="1200" dirty="0">
@@ -34306,6 +34332,54 @@
                           <a:ea typeface="+mn-ea"/>
                           <a:cs typeface="+mn-cs"/>
                         </a:rPr>
+                        <a:t>‘</a:t>
+                      </a:r>
+                      <a:r>
+                        <a:rPr lang="ko-KR" altLang="en-US" sz="1100" b="0" i="0" u="none" strike="noStrike" kern="1200" dirty="0">
+                          <a:solidFill>
+                            <a:schemeClr val="tx1"/>
+                          </a:solidFill>
+                          <a:effectLst/>
+                          <a:latin typeface="+mn-lt"/>
+                          <a:ea typeface="+mn-ea"/>
+                          <a:cs typeface="+mn-cs"/>
+                        </a:rPr>
+                        <a:t>내 일정 관리</a:t>
+                      </a:r>
+                      <a:r>
+                        <a:rPr lang="en-US" altLang="ko-KR" sz="1100" b="0" i="0" u="none" strike="noStrike" kern="1200" dirty="0">
+                          <a:solidFill>
+                            <a:schemeClr val="tx1"/>
+                          </a:solidFill>
+                          <a:effectLst/>
+                          <a:latin typeface="+mn-lt"/>
+                          <a:ea typeface="+mn-ea"/>
+                          <a:cs typeface="+mn-cs"/>
+                        </a:rPr>
+                        <a:t>’ </a:t>
+                      </a:r>
+                      <a:r>
+                        <a:rPr lang="ko-KR" altLang="en-US" sz="1100" b="0" i="0" u="none" strike="noStrike" kern="1200" dirty="0">
+                          <a:solidFill>
+                            <a:schemeClr val="tx1"/>
+                          </a:solidFill>
+                          <a:effectLst/>
+                          <a:latin typeface="+mn-lt"/>
+                          <a:ea typeface="+mn-ea"/>
+                          <a:cs typeface="+mn-cs"/>
+                        </a:rPr>
+                        <a:t>페이지 하단의 일정 추가 버튼을 클릭한다</a:t>
+                      </a:r>
+                      <a:r>
+                        <a:rPr lang="en-US" altLang="ko-KR" sz="1100" b="0" i="0" u="none" strike="noStrike" kern="1200" dirty="0">
+                          <a:solidFill>
+                            <a:schemeClr val="tx1"/>
+                          </a:solidFill>
+                          <a:effectLst/>
+                          <a:latin typeface="+mn-lt"/>
+                          <a:ea typeface="+mn-ea"/>
+                          <a:cs typeface="+mn-cs"/>
+                        </a:rPr>
                         <a:t>. </a:t>
                       </a:r>
                       <a:r>
@@ -34318,7 +34392,7 @@
                           <a:ea typeface="+mn-ea"/>
                           <a:cs typeface="+mn-cs"/>
                         </a:rPr>
-                        <a:t>시스템은 달력 하단에 일정 정보 입력창을 출력한다</a:t>
+                        <a:t>시스템은 개인 일정을 보여주는 달력과 일정 정보 입력창을 화면상에 출력한다</a:t>
                       </a:r>
                       <a:r>
                         <a:rPr lang="en-US" altLang="ko-KR" sz="1100" b="0" i="0" u="none" strike="noStrike" kern="1200" dirty="0">
@@ -34330,7 +34404,31 @@
                           <a:ea typeface="+mn-ea"/>
                           <a:cs typeface="+mn-cs"/>
                         </a:rPr>
-                        <a:t>.   </a:t>
+                        <a:t>.</a:t>
+                      </a:r>
+                      <a:r>
+                        <a:rPr lang="ko-KR" altLang="en-US" sz="1100" b="0" i="0" u="none" strike="noStrike" kern="1200" dirty="0">
+                          <a:solidFill>
+                            <a:schemeClr val="tx1"/>
+                          </a:solidFill>
+                          <a:effectLst/>
+                          <a:latin typeface="+mn-lt"/>
+                          <a:ea typeface="+mn-ea"/>
+                          <a:cs typeface="+mn-cs"/>
+                        </a:rPr>
+                        <a:t> 사용자는 일정을 추가하고 싶은 날짜를 달력에서 클릭한다</a:t>
+                      </a:r>
+                      <a:r>
+                        <a:rPr lang="en-US" altLang="ko-KR" sz="1100" b="0" i="0" u="none" strike="noStrike" kern="1200" dirty="0">
+                          <a:solidFill>
+                            <a:schemeClr val="tx1"/>
+                          </a:solidFill>
+                          <a:effectLst/>
+                          <a:latin typeface="+mn-lt"/>
+                          <a:ea typeface="+mn-ea"/>
+                          <a:cs typeface="+mn-cs"/>
+                        </a:rPr>
+                        <a:t>.</a:t>
                       </a:r>
                     </a:p>
                     <a:p>
@@ -36998,7 +37096,7 @@
           <p:nvPr>
             <p:extLst>
               <p:ext uri="{D42A27DB-BD31-4B8C-83A1-F6EECF244321}">
-                <p14:modId xmlns:p14="http://schemas.microsoft.com/office/powerpoint/2010/main" val="2806770221"/>
+                <p14:modId xmlns:p14="http://schemas.microsoft.com/office/powerpoint/2010/main" val="2620544916"/>
               </p:ext>
             </p:extLst>
           </p:nvPr>
@@ -38086,7 +38184,7 @@
                           <a:ea typeface="+mn-ea"/>
                           <a:cs typeface="+mn-cs"/>
                         </a:rPr>
-                        <a:t>      시스템은 일정 등록과 동시에 각 일정에 대한 조정 가능성을 자동 판별하며</a:t>
+                        <a:t> 시스템은 일정 등록과 동시에 각 일정에 대한 조정 가능성을 자동 판별하며</a:t>
                       </a:r>
                       <a:r>
                         <a:rPr lang="en-US" altLang="ko-KR" sz="1100" b="0" i="0" u="none" strike="noStrike" kern="1200" dirty="0">
@@ -38410,7 +38508,7 @@
                           <a:ea typeface="+mn-ea"/>
                           <a:cs typeface="+mn-cs"/>
                         </a:rPr>
-                        <a:t>이하 자세한 내용은 </a:t>
+                        <a:t>구체적인 조정 가능성 판별 기준은 </a:t>
                       </a:r>
                       <a:r>
                         <a:rPr lang="ko-KR" altLang="en-US" sz="1100" b="0" i="0" u="none" strike="noStrike" kern="1200" dirty="0" err="1">

</xml_diff>

<commit_message>
12.01 SRS 1.2 수정
</commit_message>
<xml_diff>
--- a/SRS/1.2/4팀_일정추천앱_UC_Spec_1.2.pptx
+++ b/SRS/1.2/4팀_일정추천앱_UC_Spec_1.2.pptx
@@ -240,7 +240,7 @@
           <a:p>
             <a:fld id="{8CEFE3E5-4A4F-4495-B869-560A55522401}" type="datetimeFigureOut">
               <a:rPr lang="ko-KR" altLang="en-US" smtClean="0"/>
-              <a:t>2019-11-29</a:t>
+              <a:t>2019-12-01</a:t>
             </a:fld>
             <a:endParaRPr lang="ko-KR" altLang="en-US"/>
           </a:p>
@@ -21427,7 +21427,7 @@
           <p:nvPr>
             <p:extLst>
               <p:ext uri="{D42A27DB-BD31-4B8C-83A1-F6EECF244321}">
-                <p14:modId xmlns:p14="http://schemas.microsoft.com/office/powerpoint/2010/main" val="1955108289"/>
+                <p14:modId xmlns:p14="http://schemas.microsoft.com/office/powerpoint/2010/main" val="2758178233"/>
               </p:ext>
             </p:extLst>
           </p:nvPr>
@@ -22703,7 +22703,7 @@
                           </a:solidFill>
                           <a:effectLst/>
                         </a:rPr>
-                        <a:t>직접 일정 등록</a:t>
+                        <a:t>어플 내 일정 등록</a:t>
                       </a:r>
                       <a:r>
                         <a:rPr lang="en-US" altLang="ko-KR" sz="1100" b="0" kern="100" dirty="0">
@@ -34023,14 +34023,14 @@
           <p:nvPr>
             <p:extLst>
               <p:ext uri="{D42A27DB-BD31-4B8C-83A1-F6EECF244321}">
-                <p14:modId xmlns:p14="http://schemas.microsoft.com/office/powerpoint/2010/main" val="3573094343"/>
+                <p14:modId xmlns:p14="http://schemas.microsoft.com/office/powerpoint/2010/main" val="4286514714"/>
               </p:ext>
             </p:extLst>
           </p:nvPr>
         </p:nvGraphicFramePr>
         <p:xfrm>
           <a:off x="526356" y="1200957"/>
-          <a:ext cx="8091287" cy="4371150"/>
+          <a:ext cx="8091287" cy="4706430"/>
         </p:xfrm>
         <a:graphic>
           <a:graphicData uri="http://schemas.openxmlformats.org/drawingml/2006/table">
@@ -34293,7 +34293,7 @@
                       </a:endParaRPr>
                     </a:p>
                     <a:p>
-                      <a:pPr marL="457200" marR="0" lvl="1" indent="0" algn="l" defTabSz="914400" rtl="0" eaLnBrk="1" fontAlgn="base" latinLnBrk="1" hangingPunct="1">
+                      <a:pPr marL="648000" marR="0" lvl="1" indent="0" algn="l" defTabSz="914400" rtl="0" eaLnBrk="1" fontAlgn="base" latinLnBrk="1" hangingPunct="1">
                         <a:lnSpc>
                           <a:spcPct val="100000"/>
                         </a:lnSpc>
@@ -34667,7 +34667,7 @@
                           <a:ea typeface="+mn-ea"/>
                           <a:cs typeface="+mn-cs"/>
                         </a:rPr>
-                        <a:t>조정 가능정도의 경우 불가</a:t>
+                        <a:t>조정 가능 정도의 경우 </a:t>
                       </a:r>
                       <a:r>
                         <a:rPr lang="en-US" altLang="ko-KR" sz="1100" b="0" i="0" u="none" strike="noStrike" kern="1200" dirty="0">
@@ -34679,6 +34679,126 @@
                           <a:ea typeface="+mn-ea"/>
                           <a:cs typeface="+mn-cs"/>
                         </a:rPr>
+                        <a:t>‘</a:t>
+                      </a:r>
+                      <a:r>
+                        <a:rPr lang="ko-KR" altLang="en-US" sz="1100" b="0" i="0" u="none" strike="noStrike" kern="1200" dirty="0">
+                          <a:solidFill>
+                            <a:schemeClr val="tx1"/>
+                          </a:solidFill>
+                          <a:effectLst/>
+                          <a:latin typeface="+mn-lt"/>
+                          <a:ea typeface="+mn-ea"/>
+                          <a:cs typeface="+mn-cs"/>
+                        </a:rPr>
+                        <a:t>불가</a:t>
+                      </a:r>
+                      <a:r>
+                        <a:rPr lang="en-US" altLang="ko-KR" sz="1100" b="0" i="0" u="none" strike="noStrike" kern="1200" dirty="0">
+                          <a:solidFill>
+                            <a:schemeClr val="tx1"/>
+                          </a:solidFill>
+                          <a:effectLst/>
+                          <a:latin typeface="+mn-lt"/>
+                          <a:ea typeface="+mn-ea"/>
+                          <a:cs typeface="+mn-cs"/>
+                        </a:rPr>
+                        <a:t>’, ‘</a:t>
+                      </a:r>
+                      <a:r>
+                        <a:rPr lang="ko-KR" altLang="en-US" sz="1100" b="0" i="0" u="none" strike="noStrike" kern="1200" dirty="0">
+                          <a:solidFill>
+                            <a:schemeClr val="tx1"/>
+                          </a:solidFill>
+                          <a:effectLst/>
+                          <a:latin typeface="+mn-lt"/>
+                          <a:ea typeface="+mn-ea"/>
+                          <a:cs typeface="+mn-cs"/>
+                        </a:rPr>
+                        <a:t>약간 가능</a:t>
+                      </a:r>
+                      <a:r>
+                        <a:rPr lang="en-US" altLang="ko-KR" sz="1100" b="0" i="0" u="none" strike="noStrike" kern="1200" dirty="0">
+                          <a:solidFill>
+                            <a:schemeClr val="tx1"/>
+                          </a:solidFill>
+                          <a:effectLst/>
+                          <a:latin typeface="+mn-lt"/>
+                          <a:ea typeface="+mn-ea"/>
+                          <a:cs typeface="+mn-cs"/>
+                        </a:rPr>
+                        <a:t>’, ‘</a:t>
+                      </a:r>
+                      <a:r>
+                        <a:rPr lang="ko-KR" altLang="en-US" sz="1100" b="0" i="0" u="none" strike="noStrike" kern="1200" dirty="0">
+                          <a:solidFill>
+                            <a:schemeClr val="tx1"/>
+                          </a:solidFill>
+                          <a:effectLst/>
+                          <a:latin typeface="+mn-lt"/>
+                          <a:ea typeface="+mn-ea"/>
+                          <a:cs typeface="+mn-cs"/>
+                        </a:rPr>
+                        <a:t>가능</a:t>
+                      </a:r>
+                      <a:r>
+                        <a:rPr lang="en-US" altLang="ko-KR" sz="1100" b="0" i="0" u="none" strike="noStrike" kern="1200" dirty="0">
+                          <a:solidFill>
+                            <a:schemeClr val="tx1"/>
+                          </a:solidFill>
+                          <a:effectLst/>
+                          <a:latin typeface="+mn-lt"/>
+                          <a:ea typeface="+mn-ea"/>
+                          <a:cs typeface="+mn-cs"/>
+                        </a:rPr>
+                        <a:t>’</a:t>
+                      </a:r>
+                      <a:r>
+                        <a:rPr lang="ko-KR" altLang="en-US" sz="1100" b="0" i="0" u="none" strike="noStrike" kern="1200" dirty="0">
+                          <a:solidFill>
+                            <a:schemeClr val="tx1"/>
+                          </a:solidFill>
+                          <a:effectLst/>
+                          <a:latin typeface="+mn-lt"/>
+                          <a:ea typeface="+mn-ea"/>
+                          <a:cs typeface="+mn-cs"/>
+                        </a:rPr>
+                        <a:t> 중 해당 정도 옆에 위치한 체크박스를 클릭한다</a:t>
+                      </a:r>
+                      <a:r>
+                        <a:rPr lang="en-US" altLang="ko-KR" sz="1100" b="0" i="0" u="none" strike="noStrike" kern="1200" dirty="0">
+                          <a:solidFill>
+                            <a:schemeClr val="tx1"/>
+                          </a:solidFill>
+                          <a:effectLst/>
+                          <a:latin typeface="+mn-lt"/>
+                          <a:ea typeface="+mn-ea"/>
+                          <a:cs typeface="+mn-cs"/>
+                        </a:rPr>
+                        <a:t>.  </a:t>
+                      </a:r>
+                      <a:r>
+                        <a:rPr lang="ko-KR" altLang="en-US" sz="1100" b="0" i="0" u="none" strike="noStrike" kern="1200" dirty="0">
+                          <a:solidFill>
+                            <a:schemeClr val="tx1"/>
+                          </a:solidFill>
+                          <a:effectLst/>
+                          <a:latin typeface="+mn-lt"/>
+                          <a:ea typeface="+mn-ea"/>
+                          <a:cs typeface="+mn-cs"/>
+                        </a:rPr>
+                        <a:t>이 때</a:t>
+                      </a:r>
+                      <a:r>
+                        <a:rPr lang="en-US" altLang="ko-KR" sz="1100" b="0" i="0" u="none" strike="noStrike" kern="1200" dirty="0">
+                          <a:solidFill>
+                            <a:schemeClr val="tx1"/>
+                          </a:solidFill>
+                          <a:effectLst/>
+                          <a:latin typeface="+mn-lt"/>
+                          <a:ea typeface="+mn-ea"/>
+                          <a:cs typeface="+mn-cs"/>
+                        </a:rPr>
                         <a:t>, </a:t>
                       </a:r>
                       <a:r>
@@ -34691,7 +34811,7 @@
                           <a:ea typeface="+mn-ea"/>
                           <a:cs typeface="+mn-cs"/>
                         </a:rPr>
-                        <a:t>약간 가능</a:t>
+                        <a:t>일정 이름과 시간은 필수 기입 정보이다</a:t>
                       </a:r>
                       <a:r>
                         <a:rPr lang="en-US" altLang="ko-KR" sz="1100" b="0" i="0" u="none" strike="noStrike" kern="1200" dirty="0">
@@ -34703,31 +34823,7 @@
                           <a:ea typeface="+mn-ea"/>
                           <a:cs typeface="+mn-cs"/>
                         </a:rPr>
-                        <a:t>, </a:t>
-                      </a:r>
-                      <a:r>
-                        <a:rPr lang="ko-KR" altLang="en-US" sz="1100" b="0" i="0" u="none" strike="noStrike" kern="1200" dirty="0">
-                          <a:solidFill>
-                            <a:schemeClr val="tx1"/>
-                          </a:solidFill>
-                          <a:effectLst/>
-                          <a:latin typeface="+mn-lt"/>
-                          <a:ea typeface="+mn-ea"/>
-                          <a:cs typeface="+mn-cs"/>
-                        </a:rPr>
-                        <a:t>가능 중 해당 정도 옆에 위치한 체크박스를 클릭한다</a:t>
-                      </a:r>
-                      <a:r>
-                        <a:rPr lang="en-US" altLang="ko-KR" sz="1100" b="0" i="0" u="none" strike="noStrike" kern="1200" dirty="0">
-                          <a:solidFill>
-                            <a:schemeClr val="tx1"/>
-                          </a:solidFill>
-                          <a:effectLst/>
-                          <a:latin typeface="+mn-lt"/>
-                          <a:ea typeface="+mn-ea"/>
-                          <a:cs typeface="+mn-cs"/>
-                        </a:rPr>
-                        <a:t>. </a:t>
+                        <a:t>.</a:t>
                       </a:r>
                       <a:endParaRPr lang="ko-KR" altLang="en-US" sz="1100" b="0" i="0" u="none" strike="noStrike" kern="1200" dirty="0">
                         <a:solidFill>
@@ -35564,7 +35660,7 @@
                           <a:ea typeface="+mn-ea"/>
                           <a:cs typeface="+mn-cs"/>
                         </a:rPr>
-                        <a:t>조정 가능정도의 경우 불가</a:t>
+                        <a:t>조정 가능정도의 경우 </a:t>
                       </a:r>
                       <a:r>
                         <a:rPr lang="en-US" altLang="ko-KR" sz="1100" b="0" i="0" u="none" strike="noStrike" kern="1200" dirty="0">
@@ -35576,6 +35672,138 @@
                           <a:ea typeface="+mn-ea"/>
                           <a:cs typeface="+mn-cs"/>
                         </a:rPr>
+                        <a:t>‘</a:t>
+                      </a:r>
+                      <a:r>
+                        <a:rPr lang="ko-KR" altLang="en-US" sz="1100" b="0" i="0" u="none" strike="noStrike" kern="1200" dirty="0">
+                          <a:solidFill>
+                            <a:schemeClr val="tx1"/>
+                          </a:solidFill>
+                          <a:effectLst/>
+                          <a:latin typeface="+mn-lt"/>
+                          <a:ea typeface="+mn-ea"/>
+                          <a:cs typeface="+mn-cs"/>
+                        </a:rPr>
+                        <a:t>불가</a:t>
+                      </a:r>
+                      <a:r>
+                        <a:rPr lang="en-US" altLang="ko-KR" sz="1100" b="0" i="0" u="none" strike="noStrike" kern="1200" dirty="0">
+                          <a:solidFill>
+                            <a:schemeClr val="tx1"/>
+                          </a:solidFill>
+                          <a:effectLst/>
+                          <a:latin typeface="+mn-lt"/>
+                          <a:ea typeface="+mn-ea"/>
+                          <a:cs typeface="+mn-cs"/>
+                        </a:rPr>
+                        <a:t>’, ‘</a:t>
+                      </a:r>
+                      <a:r>
+                        <a:rPr lang="ko-KR" altLang="en-US" sz="1100" b="0" i="0" u="none" strike="noStrike" kern="1200" dirty="0">
+                          <a:solidFill>
+                            <a:schemeClr val="tx1"/>
+                          </a:solidFill>
+                          <a:effectLst/>
+                          <a:latin typeface="+mn-lt"/>
+                          <a:ea typeface="+mn-ea"/>
+                          <a:cs typeface="+mn-cs"/>
+                        </a:rPr>
+                        <a:t>약간 가능</a:t>
+                      </a:r>
+                      <a:r>
+                        <a:rPr lang="en-US" altLang="ko-KR" sz="1100" b="0" i="0" u="none" strike="noStrike" kern="1200" dirty="0">
+                          <a:solidFill>
+                            <a:schemeClr val="tx1"/>
+                          </a:solidFill>
+                          <a:effectLst/>
+                          <a:latin typeface="+mn-lt"/>
+                          <a:ea typeface="+mn-ea"/>
+                          <a:cs typeface="+mn-cs"/>
+                        </a:rPr>
+                        <a:t>’, ‘</a:t>
+                      </a:r>
+                      <a:r>
+                        <a:rPr lang="ko-KR" altLang="en-US" sz="1100" b="0" i="0" u="none" strike="noStrike" kern="1200" dirty="0">
+                          <a:solidFill>
+                            <a:schemeClr val="tx1"/>
+                          </a:solidFill>
+                          <a:effectLst/>
+                          <a:latin typeface="+mn-lt"/>
+                          <a:ea typeface="+mn-ea"/>
+                          <a:cs typeface="+mn-cs"/>
+                        </a:rPr>
+                        <a:t>가능</a:t>
+                      </a:r>
+                      <a:r>
+                        <a:rPr lang="en-US" altLang="ko-KR" sz="1100" b="0" i="0" u="none" strike="noStrike" kern="1200">
+                          <a:solidFill>
+                            <a:schemeClr val="tx1"/>
+                          </a:solidFill>
+                          <a:effectLst/>
+                          <a:latin typeface="+mn-lt"/>
+                          <a:ea typeface="+mn-ea"/>
+                          <a:cs typeface="+mn-cs"/>
+                        </a:rPr>
+                        <a:t>’</a:t>
+                      </a:r>
+                      <a:r>
+                        <a:rPr lang="ko-KR" altLang="en-US" sz="1100" b="0" i="0" u="none" strike="noStrike" kern="1200">
+                          <a:solidFill>
+                            <a:schemeClr val="tx1"/>
+                          </a:solidFill>
+                          <a:effectLst/>
+                          <a:latin typeface="+mn-lt"/>
+                          <a:ea typeface="+mn-ea"/>
+                          <a:cs typeface="+mn-cs"/>
+                        </a:rPr>
+                        <a:t> </a:t>
+                      </a:r>
+                      <a:r>
+                        <a:rPr lang="ko-KR" altLang="en-US" sz="1100" b="0" i="0" u="none" strike="noStrike" kern="1200" dirty="0">
+                          <a:solidFill>
+                            <a:schemeClr val="tx1"/>
+                          </a:solidFill>
+                          <a:effectLst/>
+                          <a:latin typeface="+mn-lt"/>
+                          <a:ea typeface="+mn-ea"/>
+                          <a:cs typeface="+mn-cs"/>
+                        </a:rPr>
+                        <a:t>중 해당 정도 옆에 위치한 체크박스를 클릭한다</a:t>
+                      </a:r>
+                      <a:r>
+                        <a:rPr lang="en-US" altLang="ko-KR" sz="1100" b="0" i="0" u="none" strike="noStrike" kern="1200" dirty="0">
+                          <a:solidFill>
+                            <a:schemeClr val="tx1"/>
+                          </a:solidFill>
+                          <a:effectLst/>
+                          <a:latin typeface="+mn-lt"/>
+                          <a:ea typeface="+mn-ea"/>
+                          <a:cs typeface="+mn-cs"/>
+                        </a:rPr>
+                        <a:t>. </a:t>
+                      </a:r>
+                      <a:r>
+                        <a:rPr lang="ko-KR" altLang="en-US" sz="1100" b="0" i="0" u="none" strike="noStrike" kern="1200" dirty="0">
+                          <a:solidFill>
+                            <a:schemeClr val="tx1"/>
+                          </a:solidFill>
+                          <a:effectLst/>
+                          <a:latin typeface="+mn-lt"/>
+                          <a:ea typeface="+mn-ea"/>
+                          <a:cs typeface="+mn-cs"/>
+                        </a:rPr>
+                        <a:t>이 때</a:t>
+                      </a:r>
+                      <a:r>
+                        <a:rPr lang="en-US" altLang="ko-KR" sz="1100" b="0" i="0" u="none" strike="noStrike" kern="1200" dirty="0">
+                          <a:solidFill>
+                            <a:schemeClr val="tx1"/>
+                          </a:solidFill>
+                          <a:effectLst/>
+                          <a:latin typeface="+mn-lt"/>
+                          <a:ea typeface="+mn-ea"/>
+                          <a:cs typeface="+mn-cs"/>
+                        </a:rPr>
                         <a:t>, </a:t>
                       </a:r>
                       <a:r>
@@ -35588,7 +35816,7 @@
                           <a:ea typeface="+mn-ea"/>
                           <a:cs typeface="+mn-cs"/>
                         </a:rPr>
-                        <a:t>약간 가능</a:t>
+                        <a:t>일정 이름과 시간은 필수 기입 정보이다</a:t>
                       </a:r>
                       <a:r>
                         <a:rPr lang="en-US" altLang="ko-KR" sz="1100" b="0" i="0" u="none" strike="noStrike" kern="1200" dirty="0">
@@ -35600,31 +35828,7 @@
                           <a:ea typeface="+mn-ea"/>
                           <a:cs typeface="+mn-cs"/>
                         </a:rPr>
-                        <a:t>, </a:t>
-                      </a:r>
-                      <a:r>
-                        <a:rPr lang="ko-KR" altLang="en-US" sz="1100" b="0" i="0" u="none" strike="noStrike" kern="1200" dirty="0">
-                          <a:solidFill>
-                            <a:schemeClr val="tx1"/>
-                          </a:solidFill>
-                          <a:effectLst/>
-                          <a:latin typeface="+mn-lt"/>
-                          <a:ea typeface="+mn-ea"/>
-                          <a:cs typeface="+mn-cs"/>
-                        </a:rPr>
-                        <a:t>가능 중 해당 정도 옆에 위치한 체크박스를 클릭한다</a:t>
-                      </a:r>
-                      <a:r>
-                        <a:rPr lang="en-US" altLang="ko-KR" sz="1100" b="0" i="0" u="none" strike="noStrike" kern="1200" dirty="0">
-                          <a:solidFill>
-                            <a:schemeClr val="tx1"/>
-                          </a:solidFill>
-                          <a:effectLst/>
-                          <a:latin typeface="+mn-lt"/>
-                          <a:ea typeface="+mn-ea"/>
-                          <a:cs typeface="+mn-cs"/>
-                        </a:rPr>
-                        <a:t>. </a:t>
+                        <a:t>.</a:t>
                       </a:r>
                       <a:endParaRPr lang="en-US" altLang="ko-KR" sz="1100" b="0" i="0" u="none" strike="noStrike" kern="1200" dirty="0">
                         <a:solidFill>

</xml_diff>

<commit_message>
12.02 SRS 1.2 수정
</commit_message>
<xml_diff>
--- a/SRS/1.2/4팀_일정추천앱_UC_Spec_1.2.pptx
+++ b/SRS/1.2/4팀_일정추천앱_UC_Spec_1.2.pptx
@@ -240,7 +240,7 @@
           <a:p>
             <a:fld id="{8CEFE3E5-4A4F-4495-B869-560A55522401}" type="datetimeFigureOut">
               <a:rPr lang="ko-KR" altLang="en-US" smtClean="0"/>
-              <a:t>2019-12-01</a:t>
+              <a:t>2019-12-02</a:t>
             </a:fld>
             <a:endParaRPr lang="ko-KR" altLang="en-US"/>
           </a:p>
@@ -11134,7 +11134,7 @@
           <p:nvPr>
             <p:extLst>
               <p:ext uri="{D42A27DB-BD31-4B8C-83A1-F6EECF244321}">
-                <p14:modId xmlns:p14="http://schemas.microsoft.com/office/powerpoint/2010/main" val="1690547815"/>
+                <p14:modId xmlns:p14="http://schemas.microsoft.com/office/powerpoint/2010/main" val="4012084986"/>
               </p:ext>
             </p:extLst>
           </p:nvPr>
@@ -12259,20 +12259,17 @@
                           <a:ea typeface="+mn-ea"/>
                           <a:cs typeface="+mn-cs"/>
                         </a:rPr>
-                        <a:t>모임 수정 확정 </a:t>
-                      </a:r>
-                      <a:r>
-                        <a:rPr lang="en-US" altLang="ko-KR" sz="1100" b="0" i="0" u="none" strike="noStrike" kern="1200" dirty="0">
-                          <a:solidFill>
-                            <a:srgbClr val="FF0000"/>
-                          </a:solidFill>
-                          <a:effectLst/>
-                          <a:latin typeface="+mn-ea"/>
-                          <a:ea typeface="+mn-ea"/>
-                          <a:cs typeface="+mn-cs"/>
-                        </a:rPr>
-                        <a:t>(AF3)</a:t>
-                      </a:r>
+                        <a:t>모임 수정 확정</a:t>
+                      </a:r>
+                      <a:endParaRPr lang="en-US" altLang="ko-KR" sz="1100" b="0" i="0" u="none" strike="noStrike" kern="1200" dirty="0">
+                        <a:solidFill>
+                          <a:srgbClr val="FF0000"/>
+                        </a:solidFill>
+                        <a:effectLst/>
+                        <a:latin typeface="+mn-ea"/>
+                        <a:ea typeface="+mn-ea"/>
+                        <a:cs typeface="+mn-cs"/>
+                      </a:endParaRPr>
                     </a:p>
                     <a:p>
                       <a:pPr marL="648000" indent="0" rtl="0" fontAlgn="base">
@@ -12352,8 +12349,22 @@
                       </a:r>
                     </a:p>
                     <a:p>
-                      <a:pPr marL="648000" indent="0" rtl="0" fontAlgn="base">
+                      <a:pPr marL="648000" marR="0" lvl="0" indent="0" algn="l" defTabSz="914400" rtl="0" eaLnBrk="1" fontAlgn="base" latinLnBrk="1" hangingPunct="1">
+                        <a:lnSpc>
+                          <a:spcPct val="100000"/>
+                        </a:lnSpc>
+                        <a:spcBef>
+                          <a:spcPts val="0"/>
+                        </a:spcBef>
+                        <a:spcAft>
+                          <a:spcPts val="0"/>
+                        </a:spcAft>
+                        <a:buClrTx/>
+                        <a:buSzTx/>
+                        <a:buFontTx/>
                         <a:buNone/>
+                        <a:tabLst/>
+                        <a:defRPr/>
                       </a:pPr>
                       <a:r>
                         <a:rPr lang="ko-KR" altLang="en-US" sz="1100" b="0" i="0" u="none" strike="noStrike" kern="1200" dirty="0">
@@ -12377,6 +12388,102 @@
                           <a:ea typeface="+mn-ea"/>
                           <a:cs typeface="+mn-cs"/>
                         </a:rPr>
+                        <a:t>“</a:t>
+                      </a:r>
+                      <a:r>
+                        <a:rPr lang="ko-KR" altLang="en-US" sz="1100" b="0" i="0" u="none" strike="noStrike" kern="1200" dirty="0">
+                          <a:solidFill>
+                            <a:schemeClr val="tx1"/>
+                          </a:solidFill>
+                          <a:effectLst/>
+                          <a:latin typeface="+mn-ea"/>
+                          <a:ea typeface="+mn-ea"/>
+                          <a:cs typeface="+mn-cs"/>
+                        </a:rPr>
+                        <a:t>모임 정보를 수정하겠습니까</a:t>
+                      </a:r>
+                      <a:r>
+                        <a:rPr lang="en-US" altLang="ko-KR" sz="1100" b="0" i="0" u="none" strike="noStrike" kern="1200" dirty="0">
+                          <a:solidFill>
+                            <a:schemeClr val="tx1"/>
+                          </a:solidFill>
+                          <a:effectLst/>
+                          <a:latin typeface="+mn-ea"/>
+                          <a:ea typeface="+mn-ea"/>
+                          <a:cs typeface="+mn-cs"/>
+                        </a:rPr>
+                        <a:t>?”</a:t>
+                      </a:r>
+                      <a:r>
+                        <a:rPr lang="ko-KR" altLang="en-US" sz="1100" b="0" i="0" u="none" strike="noStrike" kern="1200" dirty="0">
+                          <a:solidFill>
+                            <a:schemeClr val="tx1"/>
+                          </a:solidFill>
+                          <a:effectLst/>
+                          <a:latin typeface="+mn-ea"/>
+                          <a:ea typeface="+mn-ea"/>
+                          <a:cs typeface="+mn-cs"/>
+                        </a:rPr>
+                        <a:t>라는 </a:t>
+                      </a:r>
+                      <a:r>
+                        <a:rPr lang="ko-KR" altLang="en-US" sz="1100" b="0" i="0" u="none" strike="noStrike" kern="1200" dirty="0" err="1">
+                          <a:solidFill>
+                            <a:schemeClr val="tx1"/>
+                          </a:solidFill>
+                          <a:effectLst/>
+                          <a:latin typeface="+mn-ea"/>
+                          <a:ea typeface="+mn-ea"/>
+                          <a:cs typeface="+mn-cs"/>
+                        </a:rPr>
+                        <a:t>알림창을</a:t>
+                      </a:r>
+                      <a:r>
+                        <a:rPr lang="ko-KR" altLang="en-US" sz="1100" b="0" i="0" u="none" strike="noStrike" kern="1200" dirty="0">
+                          <a:solidFill>
+                            <a:schemeClr val="tx1"/>
+                          </a:solidFill>
+                          <a:effectLst/>
+                          <a:latin typeface="+mn-ea"/>
+                          <a:ea typeface="+mn-ea"/>
+                          <a:cs typeface="+mn-cs"/>
+                        </a:rPr>
+                        <a:t> 화면에 출력한다</a:t>
+                      </a:r>
+                      <a:r>
+                        <a:rPr lang="en-US" altLang="ko-KR" sz="1100" b="0" i="0" u="none" strike="noStrike" kern="1200" dirty="0">
+                          <a:solidFill>
+                            <a:schemeClr val="tx1"/>
+                          </a:solidFill>
+                          <a:effectLst/>
+                          <a:latin typeface="+mn-ea"/>
+                          <a:ea typeface="+mn-ea"/>
+                          <a:cs typeface="+mn-cs"/>
+                        </a:rPr>
+                        <a:t>. </a:t>
+                      </a:r>
+                      <a:r>
+                        <a:rPr lang="ko-KR" altLang="en-US" sz="1100" b="0" i="0" u="none" strike="noStrike" kern="1200" dirty="0">
+                          <a:solidFill>
+                            <a:schemeClr val="tx1"/>
+                          </a:solidFill>
+                          <a:effectLst/>
+                          <a:latin typeface="+mn-ea"/>
+                          <a:ea typeface="+mn-ea"/>
+                          <a:cs typeface="+mn-cs"/>
+                        </a:rPr>
+                        <a:t>사용자가 </a:t>
+                      </a:r>
+                      <a:r>
+                        <a:rPr lang="en-US" altLang="ko-KR" sz="1100" b="0" i="0" u="none" strike="noStrike" kern="1200" dirty="0">
+                          <a:solidFill>
+                            <a:schemeClr val="tx1"/>
+                          </a:solidFill>
+                          <a:effectLst/>
+                          <a:latin typeface="+mn-ea"/>
+                          <a:ea typeface="+mn-ea"/>
+                          <a:cs typeface="+mn-cs"/>
+                        </a:rPr>
                         <a:t>‘</a:t>
                       </a:r>
                       <a:r>
@@ -12389,7 +12496,7 @@
                           <a:ea typeface="+mn-ea"/>
                           <a:cs typeface="+mn-cs"/>
                         </a:rPr>
-                        <a:t>모임 수정이 완료되었습니다</a:t>
+                        <a:t>확인</a:t>
                       </a:r>
                       <a:r>
                         <a:rPr lang="en-US" altLang="ko-KR" sz="1100" b="0" i="0" u="none" strike="noStrike" kern="1200" dirty="0">
@@ -12401,7 +12508,7 @@
                           <a:ea typeface="+mn-ea"/>
                           <a:cs typeface="+mn-cs"/>
                         </a:rPr>
-                        <a:t>’</a:t>
+                        <a:t>’ </a:t>
                       </a:r>
                       <a:r>
                         <a:rPr lang="ko-KR" altLang="en-US" sz="1100" b="0" i="0" u="none" strike="noStrike" kern="1200" dirty="0">
@@ -12413,20 +12520,51 @@
                           <a:ea typeface="+mn-ea"/>
                           <a:cs typeface="+mn-cs"/>
                         </a:rPr>
-                        <a:t>라는 </a:t>
-                      </a:r>
-                      <a:r>
-                        <a:rPr lang="ko-KR" altLang="en-US" sz="1100" b="0" i="0" u="none" strike="noStrike" kern="1200" dirty="0" err="1">
-                          <a:solidFill>
-                            <a:schemeClr val="tx1"/>
+                        <a:t>버튼을 누르면</a:t>
+                      </a:r>
+                      <a:r>
+                        <a:rPr lang="en-US" altLang="ko-KR" sz="1100" b="0" i="0" u="none" strike="noStrike" kern="1200" dirty="0">
+                          <a:solidFill>
+                            <a:srgbClr val="FF0000"/>
                           </a:solidFill>
                           <a:effectLst/>
                           <a:latin typeface="+mn-ea"/>
                           <a:ea typeface="+mn-ea"/>
                           <a:cs typeface="+mn-cs"/>
                         </a:rPr>
-                        <a:t>알림창을</a:t>
-                      </a:r>
+                        <a:t>(AF3)</a:t>
+                      </a:r>
+                      <a:r>
+                        <a:rPr lang="en-US" altLang="ko-KR" sz="1100" b="0" i="0" u="none" strike="noStrike" kern="1200" dirty="0">
+                          <a:solidFill>
+                            <a:schemeClr val="tx1"/>
+                          </a:solidFill>
+                          <a:effectLst/>
+                          <a:latin typeface="+mn-ea"/>
+                          <a:ea typeface="+mn-ea"/>
+                          <a:cs typeface="+mn-cs"/>
+                        </a:rPr>
+                        <a:t>, </a:t>
+                      </a:r>
+                    </a:p>
+                    <a:p>
+                      <a:pPr marL="648000" marR="0" lvl="0" indent="0" algn="l" defTabSz="914400" rtl="0" eaLnBrk="1" fontAlgn="base" latinLnBrk="1" hangingPunct="1">
+                        <a:lnSpc>
+                          <a:spcPct val="100000"/>
+                        </a:lnSpc>
+                        <a:spcBef>
+                          <a:spcPts val="0"/>
+                        </a:spcBef>
+                        <a:spcAft>
+                          <a:spcPts val="0"/>
+                        </a:spcAft>
+                        <a:buClrTx/>
+                        <a:buSzTx/>
+                        <a:buFontTx/>
+                        <a:buNone/>
+                        <a:tabLst/>
+                        <a:defRPr/>
+                      </a:pPr>
                       <a:r>
                         <a:rPr lang="ko-KR" altLang="en-US" sz="1100" b="0" i="0" u="none" strike="noStrike" kern="1200" dirty="0">
                           <a:solidFill>
@@ -12437,31 +12575,7 @@
                           <a:ea typeface="+mn-ea"/>
                           <a:cs typeface="+mn-cs"/>
                         </a:rPr>
-                        <a:t> 화면에 출력한다</a:t>
-                      </a:r>
-                      <a:r>
-                        <a:rPr lang="en-US" altLang="ko-KR" sz="1100" b="0" i="0" u="none" strike="noStrike" kern="1200" dirty="0">
-                          <a:solidFill>
-                            <a:schemeClr val="tx1"/>
-                          </a:solidFill>
-                          <a:effectLst/>
-                          <a:latin typeface="+mn-ea"/>
-                          <a:ea typeface="+mn-ea"/>
-                          <a:cs typeface="+mn-cs"/>
-                        </a:rPr>
-                        <a:t>. </a:t>
-                      </a:r>
-                      <a:r>
-                        <a:rPr lang="ko-KR" altLang="en-US" sz="1100" b="0" i="0" u="none" strike="noStrike" kern="1200" dirty="0">
-                          <a:solidFill>
-                            <a:schemeClr val="tx1"/>
-                          </a:solidFill>
-                          <a:effectLst/>
-                          <a:latin typeface="+mn-ea"/>
-                          <a:ea typeface="+mn-ea"/>
-                          <a:cs typeface="+mn-cs"/>
-                        </a:rPr>
-                        <a:t>시스템은 변경된 내용을 시스템에 저장하고 본 </a:t>
+                        <a:t>시스템은 변경된 내용을 저장하고 본 </a:t>
                       </a:r>
                       <a:r>
                         <a:rPr lang="ko-KR" altLang="en-US" sz="1100" b="0" i="0" u="none" strike="noStrike" kern="1200" dirty="0" err="1">
@@ -12589,18 +12703,15 @@
                         </a:rPr>
                         <a:t> </a:t>
                       </a:r>
-                      <a:r>
-                        <a:rPr lang="en-US" altLang="ko-KR" sz="1100" b="0" i="0" u="none" strike="noStrike" kern="1200" dirty="0">
-                          <a:solidFill>
-                            <a:srgbClr val="FF0000"/>
-                          </a:solidFill>
-                          <a:effectLst/>
-                          <a:latin typeface="+mn-ea"/>
-                          <a:ea typeface="+mn-ea"/>
-                          <a:cs typeface="+mn-cs"/>
-                        </a:rPr>
-                        <a:t>(AF3)</a:t>
-                      </a:r>
+                      <a:endParaRPr lang="en-US" altLang="ko-KR" sz="1100" b="0" i="0" u="none" strike="noStrike" kern="1200" dirty="0">
+                        <a:solidFill>
+                          <a:srgbClr val="FF0000"/>
+                        </a:solidFill>
+                        <a:effectLst/>
+                        <a:latin typeface="+mn-ea"/>
+                        <a:ea typeface="+mn-ea"/>
+                        <a:cs typeface="+mn-cs"/>
+                      </a:endParaRPr>
                     </a:p>
                     <a:p>
                       <a:pPr marL="648000" indent="0" rtl="0" fontAlgn="base">
@@ -13497,14 +13608,14 @@
           <p:nvPr>
             <p:extLst>
               <p:ext uri="{D42A27DB-BD31-4B8C-83A1-F6EECF244321}">
-                <p14:modId xmlns:p14="http://schemas.microsoft.com/office/powerpoint/2010/main" val="3964584570"/>
+                <p14:modId xmlns:p14="http://schemas.microsoft.com/office/powerpoint/2010/main" val="1468134570"/>
               </p:ext>
             </p:extLst>
           </p:nvPr>
         </p:nvGraphicFramePr>
         <p:xfrm>
           <a:off x="341376" y="1097280"/>
-          <a:ext cx="8551104" cy="3286932"/>
+          <a:ext cx="8551104" cy="3865290"/>
         </p:xfrm>
         <a:graphic>
           <a:graphicData uri="http://schemas.openxmlformats.org/drawingml/2006/table">
@@ -13677,7 +13788,7 @@
                       </a:endParaRPr>
                     </a:p>
                     <a:p>
-                      <a:pPr marL="0" marR="0" lvl="0" indent="0" algn="just" defTabSz="914400" rtl="0" eaLnBrk="1" fontAlgn="auto" latinLnBrk="1" hangingPunct="1">
+                      <a:pPr marL="360000" marR="0" lvl="0" indent="0" algn="just" defTabSz="914400" rtl="0" eaLnBrk="1" fontAlgn="auto" latinLnBrk="1" hangingPunct="1">
                         <a:lnSpc>
                           <a:spcPct val="115000"/>
                         </a:lnSpc>
@@ -13695,6 +13806,17 @@
                         <a:defRPr/>
                       </a:pPr>
                       <a:r>
+                        <a:rPr lang="ko-KR" altLang="en-US" sz="1100" b="0" kern="100" baseline="0" dirty="0">
+                          <a:solidFill>
+                            <a:schemeClr val="tx1"/>
+                          </a:solidFill>
+                          <a:effectLst/>
+                          <a:latin typeface="+mn-ea"/>
+                          <a:ea typeface="+mn-ea"/>
+                        </a:rPr>
+                        <a:t>분기점</a:t>
+                      </a:r>
+                      <a:r>
                         <a:rPr lang="en-US" altLang="ko-KR" sz="1100" b="0" kern="100" baseline="0" dirty="0">
                           <a:solidFill>
                             <a:schemeClr val="tx1"/>
@@ -13703,8 +13825,27 @@
                           <a:latin typeface="+mn-ea"/>
                           <a:ea typeface="+mn-ea"/>
                         </a:rPr>
-                        <a:t>        </a:t>
-                      </a:r>
+                        <a:t>: Basic Flow 2.4, Basic Flow 3.2</a:t>
+                      </a:r>
+                    </a:p>
+                    <a:p>
+                      <a:pPr marL="648000" marR="0" lvl="0" indent="0" algn="just" defTabSz="914400" rtl="0" eaLnBrk="1" fontAlgn="auto" latinLnBrk="1" hangingPunct="1">
+                        <a:lnSpc>
+                          <a:spcPct val="115000"/>
+                        </a:lnSpc>
+                        <a:spcBef>
+                          <a:spcPts val="0"/>
+                        </a:spcBef>
+                        <a:spcAft>
+                          <a:spcPts val="0"/>
+                        </a:spcAft>
+                        <a:buClrTx/>
+                        <a:buSzTx/>
+                        <a:buFontTx/>
+                        <a:buNone/>
+                        <a:tabLst/>
+                        <a:defRPr/>
+                      </a:pPr>
                       <a:r>
                         <a:rPr lang="ko-KR" altLang="en-US" sz="1100" b="0" kern="100" baseline="0" dirty="0">
                           <a:solidFill>
@@ -13714,7 +13855,7 @@
                           <a:latin typeface="+mn-ea"/>
                           <a:ea typeface="+mn-ea"/>
                         </a:rPr>
-                        <a:t>분기점</a:t>
+                        <a:t>시스템은 새로 입력된 모임 이름이 기존에 존재하는 모임들의 이름들과 일치하는지를 체크한다</a:t>
                       </a:r>
                       <a:r>
                         <a:rPr lang="en-US" altLang="ko-KR" sz="1100" b="0" kern="100" baseline="0" dirty="0">
@@ -13725,7 +13866,243 @@
                           <a:latin typeface="+mn-ea"/>
                           <a:ea typeface="+mn-ea"/>
                         </a:rPr>
-                        <a:t>: Basic Flow 2.4, Basic Flow 3.2</a:t>
+                        <a:t>.  </a:t>
+                      </a:r>
+                      <a:r>
+                        <a:rPr lang="ko-KR" altLang="en-US" sz="1100" b="0" kern="100" baseline="0" dirty="0">
+                          <a:solidFill>
+                            <a:schemeClr val="tx1"/>
+                          </a:solidFill>
+                          <a:effectLst/>
+                          <a:latin typeface="+mn-ea"/>
+                          <a:ea typeface="+mn-ea"/>
+                        </a:rPr>
+                        <a:t>만약 일치하는 이름이 이미 </a:t>
+                      </a:r>
+                      <a:endParaRPr lang="en-US" altLang="ko-KR" sz="1100" b="0" kern="100" baseline="0" dirty="0">
+                        <a:solidFill>
+                          <a:schemeClr val="tx1"/>
+                        </a:solidFill>
+                        <a:effectLst/>
+                        <a:latin typeface="+mn-ea"/>
+                        <a:ea typeface="+mn-ea"/>
+                      </a:endParaRPr>
+                    </a:p>
+                    <a:p>
+                      <a:pPr marL="648000" marR="0" lvl="0" indent="0" algn="just" defTabSz="914400" rtl="0" eaLnBrk="1" fontAlgn="auto" latinLnBrk="1" hangingPunct="1">
+                        <a:lnSpc>
+                          <a:spcPct val="115000"/>
+                        </a:lnSpc>
+                        <a:spcBef>
+                          <a:spcPts val="0"/>
+                        </a:spcBef>
+                        <a:spcAft>
+                          <a:spcPts val="0"/>
+                        </a:spcAft>
+                        <a:buClrTx/>
+                        <a:buSzTx/>
+                        <a:buFontTx/>
+                        <a:buNone/>
+                        <a:tabLst/>
+                        <a:defRPr/>
+                      </a:pPr>
+                      <a:r>
+                        <a:rPr lang="ko-KR" altLang="en-US" sz="1100" b="0" kern="100" baseline="0" dirty="0">
+                          <a:solidFill>
+                            <a:schemeClr val="tx1"/>
+                          </a:solidFill>
+                          <a:effectLst/>
+                          <a:latin typeface="+mn-ea"/>
+                          <a:ea typeface="+mn-ea"/>
+                        </a:rPr>
+                        <a:t>존재한다면 </a:t>
+                      </a:r>
+                      <a:r>
+                        <a:rPr lang="en-US" altLang="ko-KR" sz="1100" b="0" kern="100" baseline="0" dirty="0">
+                          <a:solidFill>
+                            <a:schemeClr val="tx1"/>
+                          </a:solidFill>
+                          <a:effectLst/>
+                          <a:latin typeface="+mn-ea"/>
+                          <a:ea typeface="+mn-ea"/>
+                        </a:rPr>
+                        <a:t>‘</a:t>
+                      </a:r>
+                      <a:r>
+                        <a:rPr lang="ko-KR" altLang="en-US" sz="1100" b="0" kern="100" baseline="0" dirty="0">
+                          <a:solidFill>
+                            <a:schemeClr val="tx1"/>
+                          </a:solidFill>
+                          <a:effectLst/>
+                          <a:latin typeface="+mn-ea"/>
+                          <a:ea typeface="+mn-ea"/>
+                        </a:rPr>
+                        <a:t>이미 존재하는 모임 이름입니다</a:t>
+                      </a:r>
+                      <a:r>
+                        <a:rPr lang="en-US" altLang="ko-KR" sz="1100" b="0" kern="100" baseline="0" dirty="0">
+                          <a:solidFill>
+                            <a:schemeClr val="tx1"/>
+                          </a:solidFill>
+                          <a:effectLst/>
+                          <a:latin typeface="+mn-ea"/>
+                          <a:ea typeface="+mn-ea"/>
+                        </a:rPr>
+                        <a:t>.’</a:t>
+                      </a:r>
+                      <a:r>
+                        <a:rPr lang="ko-KR" altLang="en-US" sz="1100" b="0" kern="100" baseline="0" dirty="0">
+                          <a:solidFill>
+                            <a:schemeClr val="tx1"/>
+                          </a:solidFill>
+                          <a:effectLst/>
+                          <a:latin typeface="+mn-ea"/>
+                          <a:ea typeface="+mn-ea"/>
+                        </a:rPr>
+                        <a:t>라는 </a:t>
+                      </a:r>
+                      <a:r>
+                        <a:rPr lang="ko-KR" altLang="en-US" sz="1100" b="0" kern="100" baseline="0" dirty="0" err="1">
+                          <a:solidFill>
+                            <a:schemeClr val="tx1"/>
+                          </a:solidFill>
+                          <a:effectLst/>
+                          <a:latin typeface="+mn-ea"/>
+                          <a:ea typeface="+mn-ea"/>
+                        </a:rPr>
+                        <a:t>알림창을</a:t>
+                      </a:r>
+                      <a:r>
+                        <a:rPr lang="ko-KR" altLang="en-US" sz="1100" b="0" kern="100" baseline="0" dirty="0">
+                          <a:solidFill>
+                            <a:schemeClr val="tx1"/>
+                          </a:solidFill>
+                          <a:effectLst/>
+                          <a:latin typeface="+mn-ea"/>
+                          <a:ea typeface="+mn-ea"/>
+                        </a:rPr>
+                        <a:t> 화면에 출력한 후  </a:t>
+                      </a:r>
+                      <a:r>
+                        <a:rPr lang="en-US" altLang="ko-KR" sz="1100" b="0" kern="100" baseline="0" dirty="0">
+                          <a:solidFill>
+                            <a:schemeClr val="tx1"/>
+                          </a:solidFill>
+                          <a:effectLst/>
+                          <a:latin typeface="+mn-ea"/>
+                          <a:ea typeface="+mn-ea"/>
+                        </a:rPr>
+                        <a:t>Basic Flow 2.4</a:t>
+                      </a:r>
+                      <a:r>
+                        <a:rPr lang="ko-KR" altLang="en-US" sz="1100" b="0" kern="100" baseline="0" dirty="0">
+                          <a:solidFill>
+                            <a:schemeClr val="tx1"/>
+                          </a:solidFill>
+                          <a:effectLst/>
+                          <a:latin typeface="+mn-ea"/>
+                          <a:ea typeface="+mn-ea"/>
+                        </a:rPr>
+                        <a:t>가 실행 중이었다면 </a:t>
+                      </a:r>
+                      <a:r>
+                        <a:rPr lang="en-US" altLang="ko-KR" sz="1100" b="0" kern="100" baseline="0" dirty="0">
+                          <a:solidFill>
+                            <a:schemeClr val="tx1"/>
+                          </a:solidFill>
+                          <a:effectLst/>
+                          <a:latin typeface="+mn-ea"/>
+                          <a:ea typeface="+mn-ea"/>
+                        </a:rPr>
+                        <a:t>Basic Flow 2.4</a:t>
+                      </a:r>
+                      <a:r>
+                        <a:rPr lang="ko-KR" altLang="en-US" sz="1100" b="0" kern="100" baseline="0" dirty="0">
+                          <a:solidFill>
+                            <a:schemeClr val="tx1"/>
+                          </a:solidFill>
+                          <a:effectLst/>
+                          <a:latin typeface="+mn-ea"/>
+                          <a:ea typeface="+mn-ea"/>
+                        </a:rPr>
+                        <a:t>로</a:t>
+                      </a:r>
+                      <a:r>
+                        <a:rPr lang="en-US" altLang="ko-KR" sz="1100" b="0" kern="100" baseline="0" dirty="0">
+                          <a:solidFill>
+                            <a:schemeClr val="tx1"/>
+                          </a:solidFill>
+                          <a:effectLst/>
+                          <a:latin typeface="+mn-ea"/>
+                          <a:ea typeface="+mn-ea"/>
+                        </a:rPr>
+                        <a:t>,</a:t>
+                      </a:r>
+                      <a:r>
+                        <a:rPr lang="ko-KR" altLang="en-US" sz="1100" b="0" kern="100" baseline="0" dirty="0">
+                          <a:solidFill>
+                            <a:schemeClr val="tx1"/>
+                          </a:solidFill>
+                          <a:effectLst/>
+                          <a:latin typeface="+mn-ea"/>
+                          <a:ea typeface="+mn-ea"/>
+                        </a:rPr>
+                        <a:t> </a:t>
+                      </a:r>
+                      <a:r>
+                        <a:rPr lang="en-US" altLang="ko-KR" sz="1100" b="0" kern="100" baseline="0" dirty="0">
+                          <a:solidFill>
+                            <a:schemeClr val="tx1"/>
+                          </a:solidFill>
+                          <a:effectLst/>
+                          <a:latin typeface="+mn-ea"/>
+                          <a:ea typeface="+mn-ea"/>
+                        </a:rPr>
+                        <a:t>Basic Flow 3.2</a:t>
+                      </a:r>
+                      <a:r>
+                        <a:rPr lang="ko-KR" altLang="en-US" sz="1100" b="0" kern="100" baseline="0" dirty="0">
+                          <a:solidFill>
+                            <a:schemeClr val="tx1"/>
+                          </a:solidFill>
+                          <a:effectLst/>
+                          <a:latin typeface="+mn-ea"/>
+                          <a:ea typeface="+mn-ea"/>
+                        </a:rPr>
+                        <a:t>가 실행 중이었다면  </a:t>
+                      </a:r>
+                      <a:r>
+                        <a:rPr lang="en-US" altLang="ko-KR" sz="1100" b="0" kern="100" baseline="0" dirty="0">
+                          <a:solidFill>
+                            <a:schemeClr val="tx1"/>
+                          </a:solidFill>
+                          <a:effectLst/>
+                          <a:latin typeface="+mn-ea"/>
+                          <a:ea typeface="+mn-ea"/>
+                        </a:rPr>
+                        <a:t>Basic Flow 3.2</a:t>
+                      </a:r>
+                      <a:r>
+                        <a:rPr lang="ko-KR" altLang="en-US" sz="1100" b="0" kern="100" baseline="0" dirty="0">
+                          <a:solidFill>
+                            <a:schemeClr val="tx1"/>
+                          </a:solidFill>
+                          <a:effectLst/>
+                          <a:latin typeface="+mn-ea"/>
+                          <a:ea typeface="+mn-ea"/>
+                        </a:rPr>
+                        <a:t>로 돌아간다</a:t>
+                      </a:r>
+                      <a:r>
+                        <a:rPr lang="en-US" altLang="ko-KR" sz="1100" b="0" kern="100" baseline="0" dirty="0">
+                          <a:solidFill>
+                            <a:schemeClr val="tx1"/>
+                          </a:solidFill>
+                          <a:effectLst/>
+                          <a:latin typeface="+mn-ea"/>
+                          <a:ea typeface="+mn-ea"/>
+                        </a:rPr>
+                        <a:t>.</a:t>
                       </a:r>
                     </a:p>
                     <a:p>
@@ -13755,7 +14132,7 @@
                           <a:latin typeface="+mn-ea"/>
                           <a:ea typeface="+mn-ea"/>
                         </a:rPr>
-                        <a:t>          </a:t>
+                        <a:t>AF2. </a:t>
                       </a:r>
                       <a:r>
                         <a:rPr lang="ko-KR" altLang="en-US" sz="1100" b="0" kern="100" baseline="0" dirty="0">
@@ -13766,29 +14143,7 @@
                           <a:latin typeface="+mn-ea"/>
                           <a:ea typeface="+mn-ea"/>
                         </a:rPr>
-                        <a:t>시스템은 새로 입력된 모임 이름이 기존에 존재하는 모임들의 이름들과 일치하는지를 체크한다</a:t>
-                      </a:r>
-                      <a:r>
-                        <a:rPr lang="en-US" altLang="ko-KR" sz="1100" b="0" kern="100" baseline="0" dirty="0">
-                          <a:solidFill>
-                            <a:schemeClr val="tx1"/>
-                          </a:solidFill>
-                          <a:effectLst/>
-                          <a:latin typeface="+mn-ea"/>
-                          <a:ea typeface="+mn-ea"/>
-                        </a:rPr>
-                        <a:t>.  </a:t>
-                      </a:r>
-                      <a:r>
-                        <a:rPr lang="ko-KR" altLang="en-US" sz="1100" b="0" kern="100" baseline="0" dirty="0">
-                          <a:solidFill>
-                            <a:schemeClr val="tx1"/>
-                          </a:solidFill>
-                          <a:effectLst/>
-                          <a:latin typeface="+mn-ea"/>
-                          <a:ea typeface="+mn-ea"/>
-                        </a:rPr>
-                        <a:t>만약 일치하는 이름이 이미 </a:t>
+                        <a:t>변경 권한 없음</a:t>
                       </a:r>
                       <a:endParaRPr lang="en-US" altLang="ko-KR" sz="1100" b="0" kern="100" baseline="0" dirty="0">
                         <a:solidFill>
@@ -13798,6 +14153,330 @@
                         <a:latin typeface="+mn-ea"/>
                         <a:ea typeface="+mn-ea"/>
                       </a:endParaRPr>
+                    </a:p>
+                    <a:p>
+                      <a:pPr marL="360000" marR="0" lvl="0" indent="0" algn="just" defTabSz="914400" rtl="0" eaLnBrk="1" fontAlgn="auto" latinLnBrk="1" hangingPunct="1">
+                        <a:lnSpc>
+                          <a:spcPct val="115000"/>
+                        </a:lnSpc>
+                        <a:spcBef>
+                          <a:spcPts val="0"/>
+                        </a:spcBef>
+                        <a:spcAft>
+                          <a:spcPts val="0"/>
+                        </a:spcAft>
+                        <a:buClrTx/>
+                        <a:buSzTx/>
+                        <a:buFontTx/>
+                        <a:buNone/>
+                        <a:tabLst/>
+                        <a:defRPr/>
+                      </a:pPr>
+                      <a:r>
+                        <a:rPr lang="ko-KR" altLang="en-US" sz="1100" b="0" kern="100" baseline="0" dirty="0">
+                          <a:solidFill>
+                            <a:schemeClr val="tx1"/>
+                          </a:solidFill>
+                          <a:effectLst/>
+                          <a:latin typeface="+mn-ea"/>
+                          <a:ea typeface="+mn-ea"/>
+                        </a:rPr>
+                        <a:t>분기점</a:t>
+                      </a:r>
+                      <a:r>
+                        <a:rPr lang="en-US" altLang="ko-KR" sz="1100" b="0" kern="100" baseline="0" dirty="0">
+                          <a:solidFill>
+                            <a:schemeClr val="tx1"/>
+                          </a:solidFill>
+                          <a:effectLst/>
+                          <a:latin typeface="+mn-ea"/>
+                          <a:ea typeface="+mn-ea"/>
+                        </a:rPr>
+                        <a:t>: Basic Flow 3.1</a:t>
+                      </a:r>
+                    </a:p>
+                    <a:p>
+                      <a:pPr marL="648000" marR="0" lvl="0" indent="0" algn="just" defTabSz="914400" rtl="0" eaLnBrk="1" fontAlgn="auto" latinLnBrk="1" hangingPunct="1">
+                        <a:lnSpc>
+                          <a:spcPct val="115000"/>
+                        </a:lnSpc>
+                        <a:spcBef>
+                          <a:spcPts val="0"/>
+                        </a:spcBef>
+                        <a:spcAft>
+                          <a:spcPts val="0"/>
+                        </a:spcAft>
+                        <a:buClrTx/>
+                        <a:buSzTx/>
+                        <a:buFontTx/>
+                        <a:buNone/>
+                        <a:tabLst/>
+                        <a:defRPr/>
+                      </a:pPr>
+                      <a:r>
+                        <a:rPr lang="ko-KR" altLang="en-US" sz="1100" b="0" kern="100" baseline="0" dirty="0">
+                          <a:solidFill>
+                            <a:schemeClr val="tx1"/>
+                          </a:solidFill>
+                          <a:effectLst/>
+                          <a:latin typeface="+mn-ea"/>
+                          <a:ea typeface="+mn-ea"/>
+                        </a:rPr>
+                        <a:t>시스템은 </a:t>
+                      </a:r>
+                      <a:r>
+                        <a:rPr lang="en-US" altLang="ko-KR" sz="1100" b="0" kern="100" baseline="0" dirty="0">
+                          <a:solidFill>
+                            <a:schemeClr val="tx1"/>
+                          </a:solidFill>
+                          <a:effectLst/>
+                          <a:latin typeface="+mn-ea"/>
+                          <a:ea typeface="+mn-ea"/>
+                        </a:rPr>
+                        <a:t>‘</a:t>
+                      </a:r>
+                      <a:r>
+                        <a:rPr lang="ko-KR" altLang="en-US" sz="1100" b="0" kern="100" baseline="0" dirty="0">
+                          <a:solidFill>
+                            <a:schemeClr val="tx1"/>
+                          </a:solidFill>
+                          <a:effectLst/>
+                          <a:latin typeface="+mn-ea"/>
+                          <a:ea typeface="+mn-ea"/>
+                        </a:rPr>
+                        <a:t>모임 수정</a:t>
+                      </a:r>
+                      <a:r>
+                        <a:rPr lang="en-US" altLang="ko-KR" sz="1100" b="0" kern="100" baseline="0" dirty="0">
+                          <a:solidFill>
+                            <a:schemeClr val="tx1"/>
+                          </a:solidFill>
+                          <a:effectLst/>
+                          <a:latin typeface="+mn-ea"/>
+                          <a:ea typeface="+mn-ea"/>
+                        </a:rPr>
+                        <a:t>’</a:t>
+                      </a:r>
+                      <a:r>
+                        <a:rPr lang="ko-KR" altLang="en-US" sz="1100" b="0" kern="100" baseline="0" dirty="0">
+                          <a:solidFill>
+                            <a:schemeClr val="tx1"/>
+                          </a:solidFill>
+                          <a:effectLst/>
+                          <a:latin typeface="+mn-ea"/>
+                          <a:ea typeface="+mn-ea"/>
+                        </a:rPr>
+                        <a:t>명령을 요청한 회원의 직위가  </a:t>
+                      </a:r>
+                      <a:r>
+                        <a:rPr lang="en-US" altLang="ko-KR" sz="1100" b="0" kern="100" baseline="0" dirty="0">
+                          <a:solidFill>
+                            <a:schemeClr val="tx1"/>
+                          </a:solidFill>
+                          <a:effectLst/>
+                          <a:latin typeface="+mn-ea"/>
+                          <a:ea typeface="+mn-ea"/>
+                        </a:rPr>
+                        <a:t>‘</a:t>
+                      </a:r>
+                      <a:r>
+                        <a:rPr lang="ko-KR" altLang="en-US" sz="1100" b="0" kern="100" baseline="0" dirty="0">
+                          <a:solidFill>
+                            <a:schemeClr val="tx1"/>
+                          </a:solidFill>
+                          <a:effectLst/>
+                          <a:latin typeface="+mn-ea"/>
+                          <a:ea typeface="+mn-ea"/>
+                        </a:rPr>
+                        <a:t>팀장</a:t>
+                      </a:r>
+                      <a:r>
+                        <a:rPr lang="en-US" altLang="ko-KR" sz="1100" b="0" kern="100" baseline="0" dirty="0">
+                          <a:solidFill>
+                            <a:schemeClr val="tx1"/>
+                          </a:solidFill>
+                          <a:effectLst/>
+                          <a:latin typeface="+mn-ea"/>
+                          <a:ea typeface="+mn-ea"/>
+                        </a:rPr>
+                        <a:t>’</a:t>
+                      </a:r>
+                      <a:r>
+                        <a:rPr lang="ko-KR" altLang="en-US" sz="1100" b="0" kern="100" baseline="0" dirty="0">
+                          <a:solidFill>
+                            <a:schemeClr val="tx1"/>
+                          </a:solidFill>
+                          <a:effectLst/>
+                          <a:latin typeface="+mn-ea"/>
+                          <a:ea typeface="+mn-ea"/>
+                        </a:rPr>
+                        <a:t>으로 설정되어 있는지를 체크한다</a:t>
+                      </a:r>
+                      <a:r>
+                        <a:rPr lang="en-US" altLang="ko-KR" sz="1100" b="0" kern="100" baseline="0" dirty="0">
+                          <a:solidFill>
+                            <a:schemeClr val="tx1"/>
+                          </a:solidFill>
+                          <a:effectLst/>
+                          <a:latin typeface="+mn-ea"/>
+                          <a:ea typeface="+mn-ea"/>
+                        </a:rPr>
+                        <a:t>. </a:t>
+                      </a:r>
+                      <a:r>
+                        <a:rPr lang="ko-KR" altLang="en-US" sz="1100" b="0" kern="100" baseline="0" dirty="0">
+                          <a:solidFill>
+                            <a:schemeClr val="tx1"/>
+                          </a:solidFill>
+                          <a:effectLst/>
+                          <a:latin typeface="+mn-ea"/>
+                          <a:ea typeface="+mn-ea"/>
+                        </a:rPr>
+                        <a:t>만약  해당 사용자가 </a:t>
+                      </a:r>
+                      <a:r>
+                        <a:rPr lang="en-US" altLang="ko-KR" sz="1100" b="0" kern="100" baseline="0" dirty="0">
+                          <a:solidFill>
+                            <a:schemeClr val="tx1"/>
+                          </a:solidFill>
+                          <a:effectLst/>
+                          <a:latin typeface="+mn-ea"/>
+                          <a:ea typeface="+mn-ea"/>
+                        </a:rPr>
+                        <a:t>‘</a:t>
+                      </a:r>
+                      <a:r>
+                        <a:rPr lang="ko-KR" altLang="en-US" sz="1100" b="0" kern="100" baseline="0" dirty="0">
+                          <a:solidFill>
+                            <a:schemeClr val="tx1"/>
+                          </a:solidFill>
+                          <a:effectLst/>
+                          <a:latin typeface="+mn-ea"/>
+                          <a:ea typeface="+mn-ea"/>
+                        </a:rPr>
+                        <a:t>팀장</a:t>
+                      </a:r>
+                      <a:r>
+                        <a:rPr lang="en-US" altLang="ko-KR" sz="1100" b="0" kern="100" baseline="0" dirty="0">
+                          <a:solidFill>
+                            <a:schemeClr val="tx1"/>
+                          </a:solidFill>
+                          <a:effectLst/>
+                          <a:latin typeface="+mn-ea"/>
+                          <a:ea typeface="+mn-ea"/>
+                        </a:rPr>
+                        <a:t>’</a:t>
+                      </a:r>
+                      <a:r>
+                        <a:rPr lang="ko-KR" altLang="en-US" sz="1100" b="0" kern="100" baseline="0" dirty="0">
+                          <a:solidFill>
+                            <a:schemeClr val="tx1"/>
+                          </a:solidFill>
+                          <a:effectLst/>
+                          <a:latin typeface="+mn-ea"/>
+                          <a:ea typeface="+mn-ea"/>
+                        </a:rPr>
+                        <a:t>이 아니라면 </a:t>
+                      </a:r>
+                      <a:r>
+                        <a:rPr lang="en-US" altLang="ko-KR" sz="1100" b="0" kern="100" baseline="0" dirty="0">
+                          <a:solidFill>
+                            <a:schemeClr val="tx1"/>
+                          </a:solidFill>
+                          <a:effectLst/>
+                          <a:latin typeface="+mn-ea"/>
+                          <a:ea typeface="+mn-ea"/>
+                        </a:rPr>
+                        <a:t>‘</a:t>
+                      </a:r>
+                      <a:r>
+                        <a:rPr lang="ko-KR" altLang="en-US" sz="1100" b="0" kern="100" baseline="0" dirty="0">
+                          <a:solidFill>
+                            <a:schemeClr val="tx1"/>
+                          </a:solidFill>
+                          <a:effectLst/>
+                          <a:latin typeface="+mn-ea"/>
+                          <a:ea typeface="+mn-ea"/>
+                        </a:rPr>
+                        <a:t>해당 권한이 없습니다</a:t>
+                      </a:r>
+                      <a:r>
+                        <a:rPr lang="en-US" altLang="ko-KR" sz="1100" b="0" kern="100" baseline="0" dirty="0">
+                          <a:solidFill>
+                            <a:schemeClr val="tx1"/>
+                          </a:solidFill>
+                          <a:effectLst/>
+                          <a:latin typeface="+mn-ea"/>
+                          <a:ea typeface="+mn-ea"/>
+                        </a:rPr>
+                        <a:t>’</a:t>
+                      </a:r>
+                      <a:r>
+                        <a:rPr lang="ko-KR" altLang="en-US" sz="1100" b="0" kern="100" baseline="0" dirty="0">
+                          <a:solidFill>
+                            <a:schemeClr val="tx1"/>
+                          </a:solidFill>
+                          <a:effectLst/>
+                          <a:latin typeface="+mn-ea"/>
+                          <a:ea typeface="+mn-ea"/>
+                        </a:rPr>
+                        <a:t>라는 </a:t>
+                      </a:r>
+                      <a:r>
+                        <a:rPr lang="ko-KR" altLang="en-US" sz="1100" b="0" kern="100" baseline="0" dirty="0" err="1">
+                          <a:solidFill>
+                            <a:schemeClr val="tx1"/>
+                          </a:solidFill>
+                          <a:effectLst/>
+                          <a:latin typeface="+mn-ea"/>
+                          <a:ea typeface="+mn-ea"/>
+                        </a:rPr>
+                        <a:t>알림창을</a:t>
+                      </a:r>
+                      <a:r>
+                        <a:rPr lang="ko-KR" altLang="en-US" sz="1100" b="0" kern="100" baseline="0" dirty="0">
+                          <a:solidFill>
+                            <a:schemeClr val="tx1"/>
+                          </a:solidFill>
+                          <a:effectLst/>
+                          <a:latin typeface="+mn-ea"/>
+                          <a:ea typeface="+mn-ea"/>
+                        </a:rPr>
+                        <a:t> 화면에 출력한 후</a:t>
+                      </a:r>
+                      <a:r>
+                        <a:rPr lang="en-US" altLang="ko-KR" sz="1100" b="0" kern="100" baseline="0" dirty="0">
+                          <a:solidFill>
+                            <a:schemeClr val="tx1"/>
+                          </a:solidFill>
+                          <a:effectLst/>
+                          <a:latin typeface="+mn-ea"/>
+                          <a:ea typeface="+mn-ea"/>
+                        </a:rPr>
+                        <a:t> Basic Flow 3.1</a:t>
+                      </a:r>
+                      <a:r>
+                        <a:rPr lang="ko-KR" altLang="en-US" sz="1100" b="0" kern="100" baseline="0" dirty="0">
+                          <a:solidFill>
+                            <a:schemeClr val="tx1"/>
+                          </a:solidFill>
+                          <a:effectLst/>
+                          <a:latin typeface="+mn-ea"/>
+                          <a:ea typeface="+mn-ea"/>
+                        </a:rPr>
+                        <a:t>로 돌아간다</a:t>
+                      </a:r>
+                      <a:r>
+                        <a:rPr lang="en-US" altLang="ko-KR" sz="1100" b="0" kern="100" baseline="0" dirty="0">
+                          <a:solidFill>
+                            <a:schemeClr val="tx1"/>
+                          </a:solidFill>
+                          <a:effectLst/>
+                          <a:latin typeface="+mn-ea"/>
+                          <a:ea typeface="+mn-ea"/>
+                        </a:rPr>
+                        <a:t>.</a:t>
+                      </a:r>
                     </a:p>
                     <a:p>
                       <a:pPr marL="0" marR="0" lvl="0" indent="0" algn="just" defTabSz="914400" rtl="0" eaLnBrk="1" fontAlgn="auto" latinLnBrk="1" hangingPunct="1">
@@ -13826,7 +14505,7 @@
                           <a:latin typeface="+mn-ea"/>
                           <a:ea typeface="+mn-ea"/>
                         </a:rPr>
-                        <a:t>          </a:t>
+                        <a:t>AF3. </a:t>
                       </a:r>
                       <a:r>
                         <a:rPr lang="ko-KR" altLang="en-US" sz="1100" b="0" kern="100" baseline="0" dirty="0">
@@ -13837,139 +14516,7 @@
                           <a:latin typeface="+mn-ea"/>
                           <a:ea typeface="+mn-ea"/>
                         </a:rPr>
-                        <a:t>존재한다면 </a:t>
-                      </a:r>
-                      <a:r>
-                        <a:rPr lang="en-US" altLang="ko-KR" sz="1100" b="0" kern="100" baseline="0" dirty="0">
-                          <a:solidFill>
-                            <a:schemeClr val="tx1"/>
-                          </a:solidFill>
-                          <a:effectLst/>
-                          <a:latin typeface="+mn-ea"/>
-                          <a:ea typeface="+mn-ea"/>
-                        </a:rPr>
-                        <a:t>‘</a:t>
-                      </a:r>
-                      <a:r>
-                        <a:rPr lang="ko-KR" altLang="en-US" sz="1100" b="0" kern="100" baseline="0" dirty="0">
-                          <a:solidFill>
-                            <a:schemeClr val="tx1"/>
-                          </a:solidFill>
-                          <a:effectLst/>
-                          <a:latin typeface="+mn-ea"/>
-                          <a:ea typeface="+mn-ea"/>
-                        </a:rPr>
-                        <a:t>이미 존재하는 이름입니다</a:t>
-                      </a:r>
-                      <a:r>
-                        <a:rPr lang="en-US" altLang="ko-KR" sz="1100" b="0" kern="100" baseline="0" dirty="0">
-                          <a:solidFill>
-                            <a:schemeClr val="tx1"/>
-                          </a:solidFill>
-                          <a:effectLst/>
-                          <a:latin typeface="+mn-ea"/>
-                          <a:ea typeface="+mn-ea"/>
-                        </a:rPr>
-                        <a:t>.’</a:t>
-                      </a:r>
-                      <a:r>
-                        <a:rPr lang="ko-KR" altLang="en-US" sz="1100" b="0" kern="100" baseline="0" dirty="0">
-                          <a:solidFill>
-                            <a:schemeClr val="tx1"/>
-                          </a:solidFill>
-                          <a:effectLst/>
-                          <a:latin typeface="+mn-ea"/>
-                          <a:ea typeface="+mn-ea"/>
-                        </a:rPr>
-                        <a:t>라는 </a:t>
-                      </a:r>
-                      <a:r>
-                        <a:rPr lang="ko-KR" altLang="en-US" sz="1100" b="0" kern="100" baseline="0" dirty="0" err="1">
-                          <a:solidFill>
-                            <a:schemeClr val="tx1"/>
-                          </a:solidFill>
-                          <a:effectLst/>
-                          <a:latin typeface="+mn-ea"/>
-                          <a:ea typeface="+mn-ea"/>
-                        </a:rPr>
-                        <a:t>알림창을</a:t>
-                      </a:r>
-                      <a:r>
-                        <a:rPr lang="ko-KR" altLang="en-US" sz="1100" b="0" kern="100" baseline="0" dirty="0">
-                          <a:solidFill>
-                            <a:schemeClr val="tx1"/>
-                          </a:solidFill>
-                          <a:effectLst/>
-                          <a:latin typeface="+mn-ea"/>
-                          <a:ea typeface="+mn-ea"/>
-                        </a:rPr>
-                        <a:t> 화면에 출력한 후  </a:t>
-                      </a:r>
-                      <a:r>
-                        <a:rPr lang="en-US" altLang="ko-KR" sz="1100" b="0" kern="100" baseline="0" dirty="0">
-                          <a:solidFill>
-                            <a:schemeClr val="tx1"/>
-                          </a:solidFill>
-                          <a:effectLst/>
-                          <a:latin typeface="+mn-ea"/>
-                          <a:ea typeface="+mn-ea"/>
-                        </a:rPr>
-                        <a:t>Basic Flow 2.4</a:t>
-                      </a:r>
-                      <a:r>
-                        <a:rPr lang="ko-KR" altLang="en-US" sz="1100" b="0" kern="100" baseline="0" dirty="0">
-                          <a:solidFill>
-                            <a:schemeClr val="tx1"/>
-                          </a:solidFill>
-                          <a:effectLst/>
-                          <a:latin typeface="+mn-ea"/>
-                          <a:ea typeface="+mn-ea"/>
-                        </a:rPr>
-                        <a:t>가 실행 중이었다면 </a:t>
-                      </a:r>
-                      <a:r>
-                        <a:rPr lang="en-US" altLang="ko-KR" sz="1100" b="0" kern="100" baseline="0" dirty="0">
-                          <a:solidFill>
-                            <a:schemeClr val="tx1"/>
-                          </a:solidFill>
-                          <a:effectLst/>
-                          <a:latin typeface="+mn-ea"/>
-                          <a:ea typeface="+mn-ea"/>
-                        </a:rPr>
-                        <a:t>Basic Flow 2.4</a:t>
-                      </a:r>
-                      <a:r>
-                        <a:rPr lang="ko-KR" altLang="en-US" sz="1100" b="0" kern="100" baseline="0" dirty="0">
-                          <a:solidFill>
-                            <a:schemeClr val="tx1"/>
-                          </a:solidFill>
-                          <a:effectLst/>
-                          <a:latin typeface="+mn-ea"/>
-                          <a:ea typeface="+mn-ea"/>
-                        </a:rPr>
-                        <a:t>로</a:t>
-                      </a:r>
-                      <a:r>
-                        <a:rPr lang="en-US" altLang="ko-KR" sz="1100" b="0" kern="100" baseline="0" dirty="0">
-                          <a:solidFill>
-                            <a:schemeClr val="tx1"/>
-                          </a:solidFill>
-                          <a:effectLst/>
-                          <a:latin typeface="+mn-ea"/>
-                          <a:ea typeface="+mn-ea"/>
-                        </a:rPr>
-                        <a:t>,</a:t>
-                      </a:r>
-                      <a:r>
-                        <a:rPr lang="ko-KR" altLang="en-US" sz="1100" b="0" kern="100" baseline="0" dirty="0">
-                          <a:solidFill>
-                            <a:schemeClr val="tx1"/>
-                          </a:solidFill>
-                          <a:effectLst/>
-                          <a:latin typeface="+mn-ea"/>
-                          <a:ea typeface="+mn-ea"/>
-                        </a:rPr>
-                        <a:t> </a:t>
+                        <a:t>모임 수정 취소</a:t>
                       </a:r>
                       <a:endParaRPr lang="en-US" altLang="ko-KR" sz="1100" b="0" kern="100" baseline="0" dirty="0">
                         <a:solidFill>
@@ -13979,6 +14526,154 @@
                         <a:latin typeface="+mn-ea"/>
                         <a:ea typeface="+mn-ea"/>
                       </a:endParaRPr>
+                    </a:p>
+                    <a:p>
+                      <a:pPr marL="360000" marR="0" lvl="0" indent="0" algn="just" defTabSz="914400" rtl="0" eaLnBrk="1" fontAlgn="auto" latinLnBrk="1" hangingPunct="1">
+                        <a:lnSpc>
+                          <a:spcPct val="115000"/>
+                        </a:lnSpc>
+                        <a:spcBef>
+                          <a:spcPts val="0"/>
+                        </a:spcBef>
+                        <a:spcAft>
+                          <a:spcPts val="0"/>
+                        </a:spcAft>
+                        <a:buClrTx/>
+                        <a:buSzTx/>
+                        <a:buFontTx/>
+                        <a:buNone/>
+                        <a:tabLst/>
+                        <a:defRPr/>
+                      </a:pPr>
+                      <a:r>
+                        <a:rPr lang="ko-KR" altLang="en-US" sz="1100" b="0" kern="100" baseline="0" dirty="0">
+                          <a:solidFill>
+                            <a:schemeClr val="tx1"/>
+                          </a:solidFill>
+                          <a:effectLst/>
+                          <a:latin typeface="+mn-ea"/>
+                          <a:ea typeface="+mn-ea"/>
+                        </a:rPr>
+                        <a:t>분기점</a:t>
+                      </a:r>
+                      <a:r>
+                        <a:rPr lang="en-US" altLang="ko-KR" sz="1100" b="0" kern="100" baseline="0" dirty="0">
+                          <a:solidFill>
+                            <a:schemeClr val="tx1"/>
+                          </a:solidFill>
+                          <a:effectLst/>
+                          <a:latin typeface="+mn-ea"/>
+                          <a:ea typeface="+mn-ea"/>
+                        </a:rPr>
+                        <a:t>: Basic Flow 3.5</a:t>
+                      </a:r>
+                    </a:p>
+                    <a:p>
+                      <a:pPr marL="648000" marR="0" lvl="0" indent="0" algn="just" defTabSz="914400" rtl="0" eaLnBrk="1" fontAlgn="auto" latinLnBrk="1" hangingPunct="1">
+                        <a:lnSpc>
+                          <a:spcPct val="115000"/>
+                        </a:lnSpc>
+                        <a:spcBef>
+                          <a:spcPts val="0"/>
+                        </a:spcBef>
+                        <a:spcAft>
+                          <a:spcPts val="0"/>
+                        </a:spcAft>
+                        <a:buClrTx/>
+                        <a:buSzTx/>
+                        <a:buFontTx/>
+                        <a:buNone/>
+                        <a:tabLst/>
+                        <a:defRPr/>
+                      </a:pPr>
+                      <a:r>
+                        <a:rPr lang="ko-KR" altLang="en-US" sz="1100" b="0" kern="100" baseline="0" dirty="0">
+                          <a:solidFill>
+                            <a:schemeClr val="tx1"/>
+                          </a:solidFill>
+                          <a:effectLst/>
+                          <a:latin typeface="+mn-ea"/>
+                          <a:ea typeface="+mn-ea"/>
+                        </a:rPr>
+                        <a:t>사용자가 ‘취소‘ 버튼을 클릭한 경우</a:t>
+                      </a:r>
+                      <a:r>
+                        <a:rPr lang="en-US" altLang="ko-KR" sz="1100" b="0" kern="100" baseline="0" dirty="0">
+                          <a:solidFill>
+                            <a:schemeClr val="tx1"/>
+                          </a:solidFill>
+                          <a:effectLst/>
+                          <a:latin typeface="+mn-ea"/>
+                          <a:ea typeface="+mn-ea"/>
+                        </a:rPr>
+                        <a:t>, </a:t>
+                      </a:r>
+                      <a:r>
+                        <a:rPr lang="ko-KR" altLang="en-US" sz="1100" b="0" kern="100" baseline="0" dirty="0">
+                          <a:solidFill>
+                            <a:schemeClr val="tx1"/>
+                          </a:solidFill>
+                          <a:effectLst/>
+                          <a:latin typeface="+mn-ea"/>
+                          <a:ea typeface="+mn-ea"/>
+                        </a:rPr>
+                        <a:t>시스템은 수정된 모임 정보를 저장하지 않고</a:t>
+                      </a:r>
+                      <a:r>
+                        <a:rPr lang="en-US" altLang="ko-KR" sz="1100" b="0" kern="100" baseline="0" dirty="0">
+                          <a:solidFill>
+                            <a:schemeClr val="tx1"/>
+                          </a:solidFill>
+                          <a:effectLst/>
+                          <a:latin typeface="+mn-ea"/>
+                          <a:ea typeface="+mn-ea"/>
+                        </a:rPr>
+                        <a:t> </a:t>
+                      </a:r>
+                      <a:r>
+                        <a:rPr lang="ko-KR" altLang="en-US" sz="1100" b="0" kern="100" baseline="0" dirty="0">
+                          <a:solidFill>
+                            <a:schemeClr val="tx1"/>
+                          </a:solidFill>
+                          <a:effectLst/>
+                          <a:latin typeface="+mn-ea"/>
+                          <a:ea typeface="+mn-ea"/>
+                        </a:rPr>
+                        <a:t>본 </a:t>
+                      </a:r>
+                      <a:r>
+                        <a:rPr lang="ko-KR" altLang="en-US" sz="1100" b="0" kern="100" baseline="0" dirty="0" err="1">
+                          <a:solidFill>
+                            <a:schemeClr val="tx1"/>
+                          </a:solidFill>
+                          <a:effectLst/>
+                          <a:latin typeface="+mn-ea"/>
+                          <a:ea typeface="+mn-ea"/>
+                        </a:rPr>
+                        <a:t>유스케이스를</a:t>
+                      </a:r>
+                      <a:r>
+                        <a:rPr lang="ko-KR" altLang="en-US" sz="1100" b="0" kern="100" baseline="0" dirty="0">
+                          <a:solidFill>
+                            <a:schemeClr val="tx1"/>
+                          </a:solidFill>
+                          <a:effectLst/>
+                          <a:latin typeface="+mn-ea"/>
+                          <a:ea typeface="+mn-ea"/>
+                        </a:rPr>
+                        <a:t> 종료한다</a:t>
+                      </a:r>
+                      <a:r>
+                        <a:rPr lang="en-US" altLang="ko-KR" sz="1100" b="0" kern="100" baseline="0" dirty="0">
+                          <a:solidFill>
+                            <a:schemeClr val="tx1"/>
+                          </a:solidFill>
+                          <a:effectLst/>
+                          <a:latin typeface="+mn-ea"/>
+                          <a:ea typeface="+mn-ea"/>
+                        </a:rPr>
+                        <a:t>.</a:t>
+                      </a:r>
                     </a:p>
                     <a:p>
                       <a:pPr marL="0" marR="0" lvl="0" indent="0" algn="just" defTabSz="914400" rtl="0" eaLnBrk="1" fontAlgn="auto" latinLnBrk="1" hangingPunct="1">
@@ -14007,7 +14702,7 @@
                           <a:latin typeface="+mn-ea"/>
                           <a:ea typeface="+mn-ea"/>
                         </a:rPr>
-                        <a:t>          Basic Flow 3.2</a:t>
+                        <a:t>AF4. </a:t>
                       </a:r>
                       <a:r>
                         <a:rPr lang="ko-KR" altLang="en-US" sz="1100" b="0" kern="100" baseline="0" dirty="0">
@@ -14018,44 +14713,19 @@
                           <a:latin typeface="+mn-ea"/>
                           <a:ea typeface="+mn-ea"/>
                         </a:rPr>
-                        <a:t>가 실행 중이었다면  </a:t>
-                      </a:r>
-                      <a:r>
-                        <a:rPr lang="en-US" altLang="ko-KR" sz="1100" b="0" kern="100" baseline="0" dirty="0">
-                          <a:solidFill>
-                            <a:schemeClr val="tx1"/>
-                          </a:solidFill>
-                          <a:effectLst/>
-                          <a:latin typeface="+mn-ea"/>
-                          <a:ea typeface="+mn-ea"/>
-                        </a:rPr>
-                        <a:t>Basic Flow 3.2</a:t>
-                      </a:r>
-                      <a:r>
-                        <a:rPr lang="ko-KR" altLang="en-US" sz="1100" b="0" kern="100" baseline="0" dirty="0">
-                          <a:solidFill>
-                            <a:schemeClr val="tx1"/>
-                          </a:solidFill>
-                          <a:effectLst/>
-                          <a:latin typeface="+mn-ea"/>
-                          <a:ea typeface="+mn-ea"/>
-                        </a:rPr>
-                        <a:t>로 돌아간다</a:t>
-                      </a:r>
-                      <a:r>
-                        <a:rPr lang="en-US" altLang="ko-KR" sz="1100" b="0" kern="100" baseline="0" dirty="0">
-                          <a:solidFill>
-                            <a:schemeClr val="tx1"/>
-                          </a:solidFill>
-                          <a:effectLst/>
-                          <a:latin typeface="+mn-ea"/>
-                          <a:ea typeface="+mn-ea"/>
-                        </a:rPr>
-                        <a:t>.</a:t>
-                      </a:r>
+                        <a:t>모임 삭제 취소</a:t>
+                      </a:r>
+                      <a:endParaRPr lang="en-US" altLang="ko-KR" sz="1100" b="0" kern="100" baseline="0" dirty="0">
+                        <a:solidFill>
+                          <a:schemeClr val="tx1"/>
+                        </a:solidFill>
+                        <a:effectLst/>
+                        <a:latin typeface="+mn-ea"/>
+                        <a:ea typeface="+mn-ea"/>
+                      </a:endParaRPr>
                     </a:p>
                     <a:p>
-                      <a:pPr marL="0" marR="0" lvl="0" indent="0" algn="just" defTabSz="914400" rtl="0" eaLnBrk="1" fontAlgn="auto" latinLnBrk="1" hangingPunct="1">
+                      <a:pPr marL="360000" marR="0" lvl="0" indent="0" algn="just" defTabSz="914400" rtl="0" eaLnBrk="1" fontAlgn="auto" latinLnBrk="1" hangingPunct="1">
                         <a:lnSpc>
                           <a:spcPct val="115000"/>
                         </a:lnSpc>
@@ -14073,6 +14743,17 @@
                         <a:defRPr/>
                       </a:pPr>
                       <a:r>
+                        <a:rPr lang="ko-KR" altLang="en-US" sz="1100" b="0" kern="100" baseline="0" dirty="0">
+                          <a:solidFill>
+                            <a:schemeClr val="tx1"/>
+                          </a:solidFill>
+                          <a:effectLst/>
+                          <a:latin typeface="+mn-ea"/>
+                          <a:ea typeface="+mn-ea"/>
+                        </a:rPr>
+                        <a:t>분기점</a:t>
+                      </a:r>
+                      <a:r>
                         <a:rPr lang="en-US" altLang="ko-KR" sz="1100" b="0" kern="100" baseline="0" dirty="0">
                           <a:solidFill>
                             <a:schemeClr val="tx1"/>
@@ -14081,30 +14762,11 @@
                           <a:latin typeface="+mn-ea"/>
                           <a:ea typeface="+mn-ea"/>
                         </a:rPr>
-                        <a:t>AF2. </a:t>
-                      </a:r>
-                      <a:r>
-                        <a:rPr lang="ko-KR" altLang="en-US" sz="1100" b="0" kern="100" baseline="0" dirty="0">
-                          <a:solidFill>
-                            <a:schemeClr val="tx1"/>
-                          </a:solidFill>
-                          <a:effectLst/>
-                          <a:latin typeface="+mn-ea"/>
-                          <a:ea typeface="+mn-ea"/>
-                        </a:rPr>
-                        <a:t>변경 권한 없음</a:t>
-                      </a:r>
-                      <a:endParaRPr lang="en-US" altLang="ko-KR" sz="1100" b="0" kern="100" baseline="0" dirty="0">
-                        <a:solidFill>
-                          <a:schemeClr val="tx1"/>
-                        </a:solidFill>
-                        <a:effectLst/>
-                        <a:latin typeface="+mn-ea"/>
-                        <a:ea typeface="+mn-ea"/>
-                      </a:endParaRPr>
+                        <a:t>: Basic Flow 4.3</a:t>
+                      </a:r>
                     </a:p>
                     <a:p>
-                      <a:pPr marL="0" marR="0" lvl="0" indent="0" algn="just" defTabSz="914400" rtl="0" eaLnBrk="1" fontAlgn="auto" latinLnBrk="1" hangingPunct="1">
+                      <a:pPr marL="648000" marR="0" lvl="0" indent="0" algn="just" defTabSz="914400" rtl="0" eaLnBrk="1" fontAlgn="auto" latinLnBrk="1" hangingPunct="1">
                         <a:lnSpc>
                           <a:spcPct val="115000"/>
                         </a:lnSpc>
@@ -14122,6 +14784,17 @@
                         <a:defRPr/>
                       </a:pPr>
                       <a:r>
+                        <a:rPr lang="ko-KR" altLang="en-US" sz="1100" b="0" kern="100" baseline="0" dirty="0">
+                          <a:solidFill>
+                            <a:schemeClr val="tx1"/>
+                          </a:solidFill>
+                          <a:effectLst/>
+                          <a:latin typeface="+mn-ea"/>
+                          <a:ea typeface="+mn-ea"/>
+                        </a:rPr>
+                        <a:t>사용자가 ‘취소‘ 버튼을 클릭한 경우</a:t>
+                      </a:r>
+                      <a:r>
                         <a:rPr lang="en-US" altLang="ko-KR" sz="1100" b="0" kern="100" baseline="0" dirty="0">
                           <a:solidFill>
                             <a:schemeClr val="tx1"/>
@@ -14130,7 +14803,7 @@
                           <a:latin typeface="+mn-ea"/>
                           <a:ea typeface="+mn-ea"/>
                         </a:rPr>
-                        <a:t>         </a:t>
+                        <a:t>, </a:t>
                       </a:r>
                       <a:r>
                         <a:rPr lang="ko-KR" altLang="en-US" sz="1100" b="0" kern="100" baseline="0" dirty="0">
@@ -14141,7 +14814,7 @@
                           <a:latin typeface="+mn-ea"/>
                           <a:ea typeface="+mn-ea"/>
                         </a:rPr>
-                        <a:t>분기점</a:t>
+                        <a:t>시스템은 선택된 모임 정보를 그대로 둔 채</a:t>
                       </a:r>
                       <a:r>
                         <a:rPr lang="en-US" altLang="ko-KR" sz="1100" b="0" kern="100" baseline="0" dirty="0">
@@ -14152,11 +14825,55 @@
                           <a:latin typeface="+mn-ea"/>
                           <a:ea typeface="+mn-ea"/>
                         </a:rPr>
-                        <a:t>: Basic Flow 3.1</a:t>
+                        <a:t> </a:t>
+                      </a:r>
+                      <a:r>
+                        <a:rPr lang="ko-KR" altLang="en-US" sz="1100" b="0" kern="100" baseline="0" dirty="0">
+                          <a:solidFill>
+                            <a:schemeClr val="tx1"/>
+                          </a:solidFill>
+                          <a:effectLst/>
+                          <a:latin typeface="+mn-ea"/>
+                          <a:ea typeface="+mn-ea"/>
+                        </a:rPr>
+                        <a:t>본 </a:t>
+                      </a:r>
+                      <a:r>
+                        <a:rPr lang="ko-KR" altLang="en-US" sz="1100" b="0" kern="100" baseline="0" dirty="0" err="1">
+                          <a:solidFill>
+                            <a:schemeClr val="tx1"/>
+                          </a:solidFill>
+                          <a:effectLst/>
+                          <a:latin typeface="+mn-ea"/>
+                          <a:ea typeface="+mn-ea"/>
+                        </a:rPr>
+                        <a:t>유스케이스를</a:t>
+                      </a:r>
+                      <a:r>
+                        <a:rPr lang="ko-KR" altLang="en-US" sz="1100" b="0" kern="100" baseline="0" dirty="0">
+                          <a:solidFill>
+                            <a:schemeClr val="tx1"/>
+                          </a:solidFill>
+                          <a:effectLst/>
+                          <a:latin typeface="+mn-ea"/>
+                          <a:ea typeface="+mn-ea"/>
+                        </a:rPr>
+                        <a:t> 종료한다</a:t>
+                      </a:r>
+                      <a:r>
+                        <a:rPr lang="en-US" altLang="ko-KR" sz="1100" b="0" kern="100" baseline="0" dirty="0">
+                          <a:solidFill>
+                            <a:schemeClr val="tx1"/>
+                          </a:solidFill>
+                          <a:effectLst/>
+                          <a:latin typeface="+mn-ea"/>
+                          <a:ea typeface="+mn-ea"/>
+                        </a:rPr>
+                        <a:t>.</a:t>
                       </a:r>
                     </a:p>
                     <a:p>
-                      <a:pPr marL="0" marR="0" lvl="0" indent="0" algn="just" defTabSz="914400" rtl="0" eaLnBrk="1" fontAlgn="auto" latinLnBrk="1" hangingPunct="1">
+                      <a:pPr marL="648000" marR="0" lvl="0" indent="0" algn="just" defTabSz="914400" rtl="0" eaLnBrk="1" fontAlgn="auto" latinLnBrk="1" hangingPunct="1">
                         <a:lnSpc>
                           <a:spcPct val="115000"/>
                         </a:lnSpc>
@@ -14173,182 +14890,6 @@
                         <a:tabLst/>
                         <a:defRPr/>
                       </a:pPr>
-                      <a:r>
-                        <a:rPr lang="en-US" altLang="ko-KR" sz="1100" b="0" kern="100" baseline="0" dirty="0">
-                          <a:solidFill>
-                            <a:schemeClr val="tx1"/>
-                          </a:solidFill>
-                          <a:effectLst/>
-                          <a:latin typeface="+mn-ea"/>
-                          <a:ea typeface="+mn-ea"/>
-                        </a:rPr>
-                        <a:t>          </a:t>
-                      </a:r>
-                      <a:r>
-                        <a:rPr lang="ko-KR" altLang="en-US" sz="1100" b="0" kern="100" baseline="0" dirty="0">
-                          <a:solidFill>
-                            <a:schemeClr val="tx1"/>
-                          </a:solidFill>
-                          <a:effectLst/>
-                          <a:latin typeface="+mn-ea"/>
-                          <a:ea typeface="+mn-ea"/>
-                        </a:rPr>
-                        <a:t>시스템은 </a:t>
-                      </a:r>
-                      <a:r>
-                        <a:rPr lang="en-US" altLang="ko-KR" sz="1100" b="0" kern="100" baseline="0" dirty="0">
-                          <a:solidFill>
-                            <a:schemeClr val="tx1"/>
-                          </a:solidFill>
-                          <a:effectLst/>
-                          <a:latin typeface="+mn-ea"/>
-                          <a:ea typeface="+mn-ea"/>
-                        </a:rPr>
-                        <a:t>‘</a:t>
-                      </a:r>
-                      <a:r>
-                        <a:rPr lang="ko-KR" altLang="en-US" sz="1100" b="0" kern="100" baseline="0" dirty="0">
-                          <a:solidFill>
-                            <a:schemeClr val="tx1"/>
-                          </a:solidFill>
-                          <a:effectLst/>
-                          <a:latin typeface="+mn-ea"/>
-                          <a:ea typeface="+mn-ea"/>
-                        </a:rPr>
-                        <a:t>모임 수정</a:t>
-                      </a:r>
-                      <a:r>
-                        <a:rPr lang="en-US" altLang="ko-KR" sz="1100" b="0" kern="100" baseline="0" dirty="0">
-                          <a:solidFill>
-                            <a:schemeClr val="tx1"/>
-                          </a:solidFill>
-                          <a:effectLst/>
-                          <a:latin typeface="+mn-ea"/>
-                          <a:ea typeface="+mn-ea"/>
-                        </a:rPr>
-                        <a:t>’</a:t>
-                      </a:r>
-                      <a:r>
-                        <a:rPr lang="ko-KR" altLang="en-US" sz="1100" b="0" kern="100" baseline="0" dirty="0">
-                          <a:solidFill>
-                            <a:schemeClr val="tx1"/>
-                          </a:solidFill>
-                          <a:effectLst/>
-                          <a:latin typeface="+mn-ea"/>
-                          <a:ea typeface="+mn-ea"/>
-                        </a:rPr>
-                        <a:t>명령을 요청한 회원의 직위가  </a:t>
-                      </a:r>
-                      <a:r>
-                        <a:rPr lang="en-US" altLang="ko-KR" sz="1100" b="0" kern="100" baseline="0" dirty="0">
-                          <a:solidFill>
-                            <a:schemeClr val="tx1"/>
-                          </a:solidFill>
-                          <a:effectLst/>
-                          <a:latin typeface="+mn-ea"/>
-                          <a:ea typeface="+mn-ea"/>
-                        </a:rPr>
-                        <a:t>‘</a:t>
-                      </a:r>
-                      <a:r>
-                        <a:rPr lang="ko-KR" altLang="en-US" sz="1100" b="0" kern="100" baseline="0" dirty="0">
-                          <a:solidFill>
-                            <a:schemeClr val="tx1"/>
-                          </a:solidFill>
-                          <a:effectLst/>
-                          <a:latin typeface="+mn-ea"/>
-                          <a:ea typeface="+mn-ea"/>
-                        </a:rPr>
-                        <a:t>팀장</a:t>
-                      </a:r>
-                      <a:r>
-                        <a:rPr lang="en-US" altLang="ko-KR" sz="1100" b="0" kern="100" baseline="0" dirty="0">
-                          <a:solidFill>
-                            <a:schemeClr val="tx1"/>
-                          </a:solidFill>
-                          <a:effectLst/>
-                          <a:latin typeface="+mn-ea"/>
-                          <a:ea typeface="+mn-ea"/>
-                        </a:rPr>
-                        <a:t>’</a:t>
-                      </a:r>
-                      <a:r>
-                        <a:rPr lang="ko-KR" altLang="en-US" sz="1100" b="0" kern="100" baseline="0" dirty="0">
-                          <a:solidFill>
-                            <a:schemeClr val="tx1"/>
-                          </a:solidFill>
-                          <a:effectLst/>
-                          <a:latin typeface="+mn-ea"/>
-                          <a:ea typeface="+mn-ea"/>
-                        </a:rPr>
-                        <a:t>으로 설정되어 있는지를 체크한다</a:t>
-                      </a:r>
-                      <a:r>
-                        <a:rPr lang="en-US" altLang="ko-KR" sz="1100" b="0" kern="100" baseline="0" dirty="0">
-                          <a:solidFill>
-                            <a:schemeClr val="tx1"/>
-                          </a:solidFill>
-                          <a:effectLst/>
-                          <a:latin typeface="+mn-ea"/>
-                          <a:ea typeface="+mn-ea"/>
-                        </a:rPr>
-                        <a:t>. </a:t>
-                      </a:r>
-                      <a:r>
-                        <a:rPr lang="ko-KR" altLang="en-US" sz="1100" b="0" kern="100" baseline="0" dirty="0">
-                          <a:solidFill>
-                            <a:schemeClr val="tx1"/>
-                          </a:solidFill>
-                          <a:effectLst/>
-                          <a:latin typeface="+mn-ea"/>
-                          <a:ea typeface="+mn-ea"/>
-                        </a:rPr>
-                        <a:t>만약  해당 사용자가 </a:t>
-                      </a:r>
-                      <a:r>
-                        <a:rPr lang="en-US" altLang="ko-KR" sz="1100" b="0" kern="100" baseline="0" dirty="0">
-                          <a:solidFill>
-                            <a:schemeClr val="tx1"/>
-                          </a:solidFill>
-                          <a:effectLst/>
-                          <a:latin typeface="+mn-ea"/>
-                          <a:ea typeface="+mn-ea"/>
-                        </a:rPr>
-                        <a:t>‘</a:t>
-                      </a:r>
-                      <a:r>
-                        <a:rPr lang="ko-KR" altLang="en-US" sz="1100" b="0" kern="100" baseline="0" dirty="0">
-                          <a:solidFill>
-                            <a:schemeClr val="tx1"/>
-                          </a:solidFill>
-                          <a:effectLst/>
-                          <a:latin typeface="+mn-ea"/>
-                          <a:ea typeface="+mn-ea"/>
-                        </a:rPr>
-                        <a:t>팀장</a:t>
-                      </a:r>
-                      <a:r>
-                        <a:rPr lang="en-US" altLang="ko-KR" sz="1100" b="0" kern="100" baseline="0" dirty="0">
-                          <a:solidFill>
-                            <a:schemeClr val="tx1"/>
-                          </a:solidFill>
-                          <a:effectLst/>
-                          <a:latin typeface="+mn-ea"/>
-                          <a:ea typeface="+mn-ea"/>
-                        </a:rPr>
-                        <a:t>’</a:t>
-                      </a:r>
-                      <a:r>
-                        <a:rPr lang="ko-KR" altLang="en-US" sz="1100" b="0" kern="100" baseline="0" dirty="0">
-                          <a:solidFill>
-                            <a:schemeClr val="tx1"/>
-                          </a:solidFill>
-                          <a:effectLst/>
-                          <a:latin typeface="+mn-ea"/>
-                          <a:ea typeface="+mn-ea"/>
-                        </a:rPr>
-                        <a:t>이 아니</a:t>
-                      </a:r>
                       <a:endParaRPr lang="en-US" altLang="ko-KR" sz="1100" b="0" kern="100" baseline="0" dirty="0">
                         <a:solidFill>
                           <a:schemeClr val="tx1"/>
@@ -14357,590 +14898,6 @@
                         <a:latin typeface="+mn-ea"/>
                         <a:ea typeface="+mn-ea"/>
                       </a:endParaRPr>
-                    </a:p>
-                    <a:p>
-                      <a:pPr marL="0" marR="0" lvl="0" indent="0" algn="just" defTabSz="914400" rtl="0" eaLnBrk="1" fontAlgn="auto" latinLnBrk="1" hangingPunct="1">
-                        <a:lnSpc>
-                          <a:spcPct val="115000"/>
-                        </a:lnSpc>
-                        <a:spcBef>
-                          <a:spcPts val="0"/>
-                        </a:spcBef>
-                        <a:spcAft>
-                          <a:spcPts val="0"/>
-                        </a:spcAft>
-                        <a:buClrTx/>
-                        <a:buSzTx/>
-                        <a:buFontTx/>
-                        <a:buNone/>
-                        <a:tabLst/>
-                        <a:defRPr/>
-                      </a:pPr>
-                      <a:r>
-                        <a:rPr lang="en-US" altLang="ko-KR" sz="1100" b="0" kern="100" baseline="0" dirty="0">
-                          <a:solidFill>
-                            <a:schemeClr val="tx1"/>
-                          </a:solidFill>
-                          <a:effectLst/>
-                          <a:latin typeface="+mn-ea"/>
-                          <a:ea typeface="+mn-ea"/>
-                        </a:rPr>
-                        <a:t>          </a:t>
-                      </a:r>
-                      <a:r>
-                        <a:rPr lang="ko-KR" altLang="en-US" sz="1100" b="0" kern="100" baseline="0" dirty="0">
-                          <a:solidFill>
-                            <a:schemeClr val="tx1"/>
-                          </a:solidFill>
-                          <a:effectLst/>
-                          <a:latin typeface="+mn-ea"/>
-                          <a:ea typeface="+mn-ea"/>
-                        </a:rPr>
-                        <a:t>라면 </a:t>
-                      </a:r>
-                      <a:r>
-                        <a:rPr lang="en-US" altLang="ko-KR" sz="1100" b="0" kern="100" baseline="0" dirty="0">
-                          <a:solidFill>
-                            <a:schemeClr val="tx1"/>
-                          </a:solidFill>
-                          <a:effectLst/>
-                          <a:latin typeface="+mn-ea"/>
-                          <a:ea typeface="+mn-ea"/>
-                        </a:rPr>
-                        <a:t>‘</a:t>
-                      </a:r>
-                      <a:r>
-                        <a:rPr lang="ko-KR" altLang="en-US" sz="1100" b="0" kern="100" baseline="0" dirty="0">
-                          <a:solidFill>
-                            <a:schemeClr val="tx1"/>
-                          </a:solidFill>
-                          <a:effectLst/>
-                          <a:latin typeface="+mn-ea"/>
-                          <a:ea typeface="+mn-ea"/>
-                        </a:rPr>
-                        <a:t>해당 권한이 없습니다</a:t>
-                      </a:r>
-                      <a:r>
-                        <a:rPr lang="en-US" altLang="ko-KR" sz="1100" b="0" kern="100" baseline="0" dirty="0">
-                          <a:solidFill>
-                            <a:schemeClr val="tx1"/>
-                          </a:solidFill>
-                          <a:effectLst/>
-                          <a:latin typeface="+mn-ea"/>
-                          <a:ea typeface="+mn-ea"/>
-                        </a:rPr>
-                        <a:t>’</a:t>
-                      </a:r>
-                      <a:r>
-                        <a:rPr lang="ko-KR" altLang="en-US" sz="1100" b="0" kern="100" baseline="0" dirty="0">
-                          <a:solidFill>
-                            <a:schemeClr val="tx1"/>
-                          </a:solidFill>
-                          <a:effectLst/>
-                          <a:latin typeface="+mn-ea"/>
-                          <a:ea typeface="+mn-ea"/>
-                        </a:rPr>
-                        <a:t>라는 </a:t>
-                      </a:r>
-                      <a:r>
-                        <a:rPr lang="ko-KR" altLang="en-US" sz="1100" b="0" kern="100" baseline="0" dirty="0" err="1">
-                          <a:solidFill>
-                            <a:schemeClr val="tx1"/>
-                          </a:solidFill>
-                          <a:effectLst/>
-                          <a:latin typeface="+mn-ea"/>
-                          <a:ea typeface="+mn-ea"/>
-                        </a:rPr>
-                        <a:t>알림창을</a:t>
-                      </a:r>
-                      <a:r>
-                        <a:rPr lang="ko-KR" altLang="en-US" sz="1100" b="0" kern="100" baseline="0" dirty="0">
-                          <a:solidFill>
-                            <a:schemeClr val="tx1"/>
-                          </a:solidFill>
-                          <a:effectLst/>
-                          <a:latin typeface="+mn-ea"/>
-                          <a:ea typeface="+mn-ea"/>
-                        </a:rPr>
-                        <a:t> 화면에 출력한 후</a:t>
-                      </a:r>
-                      <a:r>
-                        <a:rPr lang="en-US" altLang="ko-KR" sz="1100" b="0" kern="100" baseline="0" dirty="0">
-                          <a:solidFill>
-                            <a:schemeClr val="tx1"/>
-                          </a:solidFill>
-                          <a:effectLst/>
-                          <a:latin typeface="+mn-ea"/>
-                          <a:ea typeface="+mn-ea"/>
-                        </a:rPr>
-                        <a:t> Basic Flow 3.1</a:t>
-                      </a:r>
-                      <a:r>
-                        <a:rPr lang="ko-KR" altLang="en-US" sz="1100" b="0" kern="100" baseline="0" dirty="0">
-                          <a:solidFill>
-                            <a:schemeClr val="tx1"/>
-                          </a:solidFill>
-                          <a:effectLst/>
-                          <a:latin typeface="+mn-ea"/>
-                          <a:ea typeface="+mn-ea"/>
-                        </a:rPr>
-                        <a:t>로 돌아간다</a:t>
-                      </a:r>
-                      <a:r>
-                        <a:rPr lang="en-US" altLang="ko-KR" sz="1100" b="0" kern="100" baseline="0" dirty="0">
-                          <a:solidFill>
-                            <a:schemeClr val="tx1"/>
-                          </a:solidFill>
-                          <a:effectLst/>
-                          <a:latin typeface="+mn-ea"/>
-                          <a:ea typeface="+mn-ea"/>
-                        </a:rPr>
-                        <a:t>.</a:t>
-                      </a:r>
-                    </a:p>
-                    <a:p>
-                      <a:pPr marL="0" marR="0" lvl="0" indent="0" algn="just" defTabSz="914400" rtl="0" eaLnBrk="1" fontAlgn="auto" latinLnBrk="1" hangingPunct="1">
-                        <a:lnSpc>
-                          <a:spcPct val="115000"/>
-                        </a:lnSpc>
-                        <a:spcBef>
-                          <a:spcPts val="0"/>
-                        </a:spcBef>
-                        <a:spcAft>
-                          <a:spcPts val="0"/>
-                        </a:spcAft>
-                        <a:buClrTx/>
-                        <a:buSzTx/>
-                        <a:buFontTx/>
-                        <a:buNone/>
-                        <a:tabLst/>
-                        <a:defRPr/>
-                      </a:pPr>
-                      <a:r>
-                        <a:rPr lang="en-US" altLang="ko-KR" sz="1100" b="0" kern="100" baseline="0" dirty="0">
-                          <a:solidFill>
-                            <a:schemeClr val="tx1"/>
-                          </a:solidFill>
-                          <a:effectLst/>
-                          <a:latin typeface="+mn-ea"/>
-                          <a:ea typeface="+mn-ea"/>
-                        </a:rPr>
-                        <a:t>AF3. </a:t>
-                      </a:r>
-                      <a:r>
-                        <a:rPr lang="ko-KR" altLang="en-US" sz="1100" b="0" kern="100" baseline="0" dirty="0">
-                          <a:solidFill>
-                            <a:schemeClr val="tx1"/>
-                          </a:solidFill>
-                          <a:effectLst/>
-                          <a:latin typeface="+mn-ea"/>
-                          <a:ea typeface="+mn-ea"/>
-                        </a:rPr>
-                        <a:t>변경 사항 저장하지 않음</a:t>
-                      </a:r>
-                      <a:endParaRPr lang="en-US" altLang="ko-KR" sz="1100" b="0" kern="100" baseline="0" dirty="0">
-                        <a:solidFill>
-                          <a:schemeClr val="tx1"/>
-                        </a:solidFill>
-                        <a:effectLst/>
-                        <a:latin typeface="+mn-ea"/>
-                        <a:ea typeface="+mn-ea"/>
-                      </a:endParaRPr>
-                    </a:p>
-                    <a:p>
-                      <a:pPr marL="0" marR="0" lvl="0" indent="0" algn="just" defTabSz="914400" rtl="0" eaLnBrk="1" fontAlgn="auto" latinLnBrk="1" hangingPunct="1">
-                        <a:lnSpc>
-                          <a:spcPct val="115000"/>
-                        </a:lnSpc>
-                        <a:spcBef>
-                          <a:spcPts val="0"/>
-                        </a:spcBef>
-                        <a:spcAft>
-                          <a:spcPts val="0"/>
-                        </a:spcAft>
-                        <a:buClrTx/>
-                        <a:buSzTx/>
-                        <a:buFontTx/>
-                        <a:buNone/>
-                        <a:tabLst/>
-                        <a:defRPr/>
-                      </a:pPr>
-                      <a:r>
-                        <a:rPr lang="en-US" altLang="ko-KR" sz="1100" b="0" kern="100" baseline="0" dirty="0">
-                          <a:solidFill>
-                            <a:schemeClr val="tx1"/>
-                          </a:solidFill>
-                          <a:effectLst/>
-                          <a:latin typeface="+mn-ea"/>
-                          <a:ea typeface="+mn-ea"/>
-                        </a:rPr>
-                        <a:t>         </a:t>
-                      </a:r>
-                      <a:r>
-                        <a:rPr lang="ko-KR" altLang="en-US" sz="1100" b="0" kern="100" baseline="0" dirty="0">
-                          <a:solidFill>
-                            <a:schemeClr val="tx1"/>
-                          </a:solidFill>
-                          <a:effectLst/>
-                          <a:latin typeface="+mn-ea"/>
-                          <a:ea typeface="+mn-ea"/>
-                        </a:rPr>
-                        <a:t>분기점</a:t>
-                      </a:r>
-                      <a:r>
-                        <a:rPr lang="en-US" altLang="ko-KR" sz="1100" b="0" kern="100" baseline="0" dirty="0">
-                          <a:solidFill>
-                            <a:schemeClr val="tx1"/>
-                          </a:solidFill>
-                          <a:effectLst/>
-                          <a:latin typeface="+mn-ea"/>
-                          <a:ea typeface="+mn-ea"/>
-                        </a:rPr>
-                        <a:t>: Basic Flow 3.4</a:t>
-                      </a:r>
-                    </a:p>
-                    <a:p>
-                      <a:pPr marL="0" marR="0" lvl="0" indent="0" algn="just" defTabSz="914400" rtl="0" eaLnBrk="1" fontAlgn="auto" latinLnBrk="1" hangingPunct="1">
-                        <a:lnSpc>
-                          <a:spcPct val="115000"/>
-                        </a:lnSpc>
-                        <a:spcBef>
-                          <a:spcPts val="0"/>
-                        </a:spcBef>
-                        <a:spcAft>
-                          <a:spcPts val="0"/>
-                        </a:spcAft>
-                        <a:buClrTx/>
-                        <a:buSzTx/>
-                        <a:buFontTx/>
-                        <a:buNone/>
-                        <a:tabLst/>
-                        <a:defRPr/>
-                      </a:pPr>
-                      <a:r>
-                        <a:rPr lang="en-US" altLang="ko-KR" sz="1100" b="0" kern="100" baseline="0" dirty="0">
-                          <a:solidFill>
-                            <a:schemeClr val="tx1"/>
-                          </a:solidFill>
-                          <a:effectLst/>
-                          <a:latin typeface="+mn-ea"/>
-                          <a:ea typeface="+mn-ea"/>
-                        </a:rPr>
-                        <a:t>           </a:t>
-                      </a:r>
-                      <a:r>
-                        <a:rPr lang="ko-KR" altLang="en-US" sz="1100" b="0" kern="100" baseline="0" dirty="0">
-                          <a:solidFill>
-                            <a:schemeClr val="tx1"/>
-                          </a:solidFill>
-                          <a:effectLst/>
-                          <a:latin typeface="+mn-ea"/>
-                          <a:ea typeface="+mn-ea"/>
-                        </a:rPr>
-                        <a:t>사용자가  </a:t>
-                      </a:r>
-                      <a:r>
-                        <a:rPr lang="en-US" altLang="ko-KR" sz="1100" b="0" kern="100" baseline="0" dirty="0">
-                          <a:solidFill>
-                            <a:schemeClr val="tx1"/>
-                          </a:solidFill>
-                          <a:effectLst/>
-                          <a:latin typeface="+mn-ea"/>
-                          <a:ea typeface="+mn-ea"/>
-                        </a:rPr>
-                        <a:t>‘</a:t>
-                      </a:r>
-                      <a:r>
-                        <a:rPr lang="ko-KR" altLang="en-US" sz="1100" b="0" kern="100" baseline="0" dirty="0">
-                          <a:solidFill>
-                            <a:schemeClr val="tx1"/>
-                          </a:solidFill>
-                          <a:effectLst/>
-                          <a:latin typeface="+mn-ea"/>
-                          <a:ea typeface="+mn-ea"/>
-                        </a:rPr>
-                        <a:t>수정완료</a:t>
-                      </a:r>
-                      <a:r>
-                        <a:rPr lang="en-US" altLang="ko-KR" sz="1100" b="0" kern="100" baseline="0" dirty="0">
-                          <a:solidFill>
-                            <a:schemeClr val="tx1"/>
-                          </a:solidFill>
-                          <a:effectLst/>
-                          <a:latin typeface="+mn-ea"/>
-                          <a:ea typeface="+mn-ea"/>
-                        </a:rPr>
-                        <a:t>’</a:t>
-                      </a:r>
-                      <a:r>
-                        <a:rPr lang="ko-KR" altLang="en-US" sz="1100" b="0" kern="100" baseline="0" dirty="0">
-                          <a:solidFill>
-                            <a:schemeClr val="tx1"/>
-                          </a:solidFill>
-                          <a:effectLst/>
-                          <a:latin typeface="+mn-ea"/>
-                          <a:ea typeface="+mn-ea"/>
-                        </a:rPr>
-                        <a:t>버튼을 클릭하지 않고 </a:t>
-                      </a:r>
-                      <a:r>
-                        <a:rPr lang="en-US" altLang="ko-KR" sz="1100" b="0" kern="100" baseline="0" dirty="0">
-                          <a:solidFill>
-                            <a:schemeClr val="tx1"/>
-                          </a:solidFill>
-                          <a:effectLst/>
-                          <a:latin typeface="+mn-ea"/>
-                          <a:ea typeface="+mn-ea"/>
-                        </a:rPr>
-                        <a:t>‘</a:t>
-                      </a:r>
-                      <a:r>
-                        <a:rPr lang="ko-KR" altLang="en-US" sz="1100" b="0" kern="100" baseline="0" dirty="0">
-                          <a:solidFill>
-                            <a:schemeClr val="tx1"/>
-                          </a:solidFill>
-                          <a:effectLst/>
-                          <a:latin typeface="+mn-ea"/>
-                          <a:ea typeface="+mn-ea"/>
-                        </a:rPr>
-                        <a:t>모임 수정</a:t>
-                      </a:r>
-                      <a:r>
-                        <a:rPr lang="en-US" altLang="ko-KR" sz="1100" b="0" kern="100" baseline="0" dirty="0">
-                          <a:solidFill>
-                            <a:schemeClr val="tx1"/>
-                          </a:solidFill>
-                          <a:effectLst/>
-                          <a:latin typeface="+mn-ea"/>
-                          <a:ea typeface="+mn-ea"/>
-                        </a:rPr>
-                        <a:t>’</a:t>
-                      </a:r>
-                      <a:r>
-                        <a:rPr lang="ko-KR" altLang="en-US" sz="1100" b="0" kern="100" baseline="0" dirty="0">
-                          <a:solidFill>
-                            <a:schemeClr val="tx1"/>
-                          </a:solidFill>
-                          <a:effectLst/>
-                          <a:latin typeface="+mn-ea"/>
-                          <a:ea typeface="+mn-ea"/>
-                        </a:rPr>
-                        <a:t>화면에서 나가려고 할 경우</a:t>
-                      </a:r>
-                      <a:r>
-                        <a:rPr lang="en-US" altLang="ko-KR" sz="1100" b="0" kern="100" baseline="0" dirty="0">
-                          <a:solidFill>
-                            <a:schemeClr val="tx1"/>
-                          </a:solidFill>
-                          <a:effectLst/>
-                          <a:latin typeface="+mn-ea"/>
-                          <a:ea typeface="+mn-ea"/>
-                        </a:rPr>
-                        <a:t>, ‘</a:t>
-                      </a:r>
-                      <a:r>
-                        <a:rPr lang="ko-KR" altLang="en-US" sz="1100" b="0" kern="100" baseline="0" dirty="0">
-                          <a:solidFill>
-                            <a:schemeClr val="tx1"/>
-                          </a:solidFill>
-                          <a:effectLst/>
-                          <a:latin typeface="+mn-ea"/>
-                          <a:ea typeface="+mn-ea"/>
-                        </a:rPr>
-                        <a:t>변경된 내용이  저장되지 않았습니다</a:t>
-                      </a:r>
-                      <a:r>
-                        <a:rPr lang="en-US" altLang="ko-KR" sz="1100" b="0" kern="100" baseline="0" dirty="0">
-                          <a:solidFill>
-                            <a:schemeClr val="tx1"/>
-                          </a:solidFill>
-                          <a:effectLst/>
-                          <a:latin typeface="+mn-ea"/>
-                          <a:ea typeface="+mn-ea"/>
-                        </a:rPr>
-                        <a:t>. </a:t>
-                      </a:r>
-                      <a:r>
-                        <a:rPr lang="ko-KR" altLang="en-US" sz="1100" b="0" kern="100" baseline="0" dirty="0">
-                          <a:solidFill>
-                            <a:schemeClr val="tx1"/>
-                          </a:solidFill>
-                          <a:effectLst/>
-                          <a:latin typeface="+mn-ea"/>
-                          <a:ea typeface="+mn-ea"/>
-                        </a:rPr>
-                        <a:t>그대</a:t>
-                      </a:r>
-                      <a:endParaRPr lang="en-US" altLang="ko-KR" sz="1100" b="0" kern="100" baseline="0" dirty="0">
-                        <a:solidFill>
-                          <a:schemeClr val="tx1"/>
-                        </a:solidFill>
-                        <a:effectLst/>
-                        <a:latin typeface="+mn-ea"/>
-                        <a:ea typeface="+mn-ea"/>
-                      </a:endParaRPr>
-                    </a:p>
-                    <a:p>
-                      <a:pPr marL="0" marR="0" lvl="0" indent="0" algn="just" defTabSz="914400" rtl="0" eaLnBrk="1" fontAlgn="auto" latinLnBrk="1" hangingPunct="1">
-                        <a:lnSpc>
-                          <a:spcPct val="115000"/>
-                        </a:lnSpc>
-                        <a:spcBef>
-                          <a:spcPts val="0"/>
-                        </a:spcBef>
-                        <a:spcAft>
-                          <a:spcPts val="0"/>
-                        </a:spcAft>
-                        <a:buClrTx/>
-                        <a:buSzTx/>
-                        <a:buFontTx/>
-                        <a:buNone/>
-                        <a:tabLst/>
-                        <a:defRPr/>
-                      </a:pPr>
-                      <a:r>
-                        <a:rPr lang="en-US" altLang="ko-KR" sz="1100" b="0" kern="100" baseline="0" dirty="0">
-                          <a:solidFill>
-                            <a:schemeClr val="tx1"/>
-                          </a:solidFill>
-                          <a:effectLst/>
-                          <a:latin typeface="+mn-ea"/>
-                          <a:ea typeface="+mn-ea"/>
-                        </a:rPr>
-                        <a:t>           </a:t>
-                      </a:r>
-                      <a:r>
-                        <a:rPr lang="ko-KR" altLang="en-US" sz="1100" b="0" kern="100" baseline="0" dirty="0">
-                          <a:solidFill>
-                            <a:schemeClr val="tx1"/>
-                          </a:solidFill>
-                          <a:effectLst/>
-                          <a:latin typeface="+mn-ea"/>
-                          <a:ea typeface="+mn-ea"/>
-                        </a:rPr>
-                        <a:t>로 진행하시겠습니까</a:t>
-                      </a:r>
-                      <a:r>
-                        <a:rPr lang="en-US" altLang="ko-KR" sz="1100" b="0" kern="100" baseline="0" dirty="0">
-                          <a:solidFill>
-                            <a:schemeClr val="tx1"/>
-                          </a:solidFill>
-                          <a:effectLst/>
-                          <a:latin typeface="+mn-ea"/>
-                          <a:ea typeface="+mn-ea"/>
-                        </a:rPr>
-                        <a:t>?’</a:t>
-                      </a:r>
-                      <a:r>
-                        <a:rPr lang="ko-KR" altLang="en-US" sz="1100" b="0" kern="100" baseline="0" dirty="0">
-                          <a:solidFill>
-                            <a:schemeClr val="tx1"/>
-                          </a:solidFill>
-                          <a:effectLst/>
-                          <a:latin typeface="+mn-ea"/>
-                          <a:ea typeface="+mn-ea"/>
-                        </a:rPr>
-                        <a:t>라는 </a:t>
-                      </a:r>
-                      <a:r>
-                        <a:rPr lang="ko-KR" altLang="en-US" sz="1100" b="0" kern="100" baseline="0" dirty="0" err="1">
-                          <a:solidFill>
-                            <a:schemeClr val="tx1"/>
-                          </a:solidFill>
-                          <a:effectLst/>
-                          <a:latin typeface="+mn-ea"/>
-                          <a:ea typeface="+mn-ea"/>
-                        </a:rPr>
-                        <a:t>알림창을</a:t>
-                      </a:r>
-                      <a:r>
-                        <a:rPr lang="ko-KR" altLang="en-US" sz="1100" b="0" kern="100" baseline="0" dirty="0">
-                          <a:solidFill>
-                            <a:schemeClr val="tx1"/>
-                          </a:solidFill>
-                          <a:effectLst/>
-                          <a:latin typeface="+mn-ea"/>
-                          <a:ea typeface="+mn-ea"/>
-                        </a:rPr>
-                        <a:t> 화면에 출력한 후 사용자가 </a:t>
-                      </a:r>
-                      <a:r>
-                        <a:rPr lang="en-US" altLang="ko-KR" sz="1100" b="0" kern="100" baseline="0" dirty="0">
-                          <a:solidFill>
-                            <a:schemeClr val="tx1"/>
-                          </a:solidFill>
-                          <a:effectLst/>
-                          <a:latin typeface="+mn-ea"/>
-                          <a:ea typeface="+mn-ea"/>
-                        </a:rPr>
-                        <a:t>‘</a:t>
-                      </a:r>
-                      <a:r>
-                        <a:rPr lang="ko-KR" altLang="en-US" sz="1100" b="0" kern="100" baseline="0" dirty="0">
-                          <a:solidFill>
-                            <a:schemeClr val="tx1"/>
-                          </a:solidFill>
-                          <a:effectLst/>
-                          <a:latin typeface="+mn-ea"/>
-                          <a:ea typeface="+mn-ea"/>
-                        </a:rPr>
-                        <a:t>아니오</a:t>
-                      </a:r>
-                      <a:r>
-                        <a:rPr lang="en-US" altLang="ko-KR" sz="1100" b="0" kern="100" baseline="0" dirty="0">
-                          <a:solidFill>
-                            <a:schemeClr val="tx1"/>
-                          </a:solidFill>
-                          <a:effectLst/>
-                          <a:latin typeface="+mn-ea"/>
-                          <a:ea typeface="+mn-ea"/>
-                        </a:rPr>
-                        <a:t>’</a:t>
-                      </a:r>
-                      <a:r>
-                        <a:rPr lang="ko-KR" altLang="en-US" sz="1100" b="0" kern="100" baseline="0" dirty="0">
-                          <a:solidFill>
-                            <a:schemeClr val="tx1"/>
-                          </a:solidFill>
-                          <a:effectLst/>
-                          <a:latin typeface="+mn-ea"/>
-                          <a:ea typeface="+mn-ea"/>
-                        </a:rPr>
-                        <a:t>버튼을 입력하면 </a:t>
-                      </a:r>
-                      <a:r>
-                        <a:rPr lang="en-US" altLang="ko-KR" sz="1100" b="0" kern="100" baseline="0" dirty="0">
-                          <a:solidFill>
-                            <a:schemeClr val="tx1"/>
-                          </a:solidFill>
-                          <a:effectLst/>
-                          <a:latin typeface="+mn-ea"/>
-                          <a:ea typeface="+mn-ea"/>
-                        </a:rPr>
-                        <a:t>Basic Flow 3.4</a:t>
-                      </a:r>
-                      <a:r>
-                        <a:rPr lang="ko-KR" altLang="en-US" sz="1100" b="0" kern="100" baseline="0" dirty="0">
-                          <a:solidFill>
-                            <a:schemeClr val="tx1"/>
-                          </a:solidFill>
-                          <a:effectLst/>
-                          <a:latin typeface="+mn-ea"/>
-                          <a:ea typeface="+mn-ea"/>
-                        </a:rPr>
-                        <a:t>로 돌아간다</a:t>
-                      </a:r>
-                      <a:r>
-                        <a:rPr lang="en-US" altLang="ko-KR" sz="1100" b="0" kern="100" baseline="0" dirty="0">
-                          <a:solidFill>
-                            <a:schemeClr val="tx1"/>
-                          </a:solidFill>
-                          <a:effectLst/>
-                          <a:latin typeface="+mn-ea"/>
-                          <a:ea typeface="+mn-ea"/>
-                        </a:rPr>
-                        <a:t>.</a:t>
-                      </a:r>
                     </a:p>
                     <a:p>
                       <a:pPr marL="0" marR="0" lvl="0" indent="0" algn="just" defTabSz="914400" rtl="0" eaLnBrk="1" fontAlgn="auto" latinLnBrk="1" hangingPunct="1">
@@ -16167,7 +16124,7 @@
           <p:nvPr>
             <p:extLst>
               <p:ext uri="{D42A27DB-BD31-4B8C-83A1-F6EECF244321}">
-                <p14:modId xmlns:p14="http://schemas.microsoft.com/office/powerpoint/2010/main" val="2033503706"/>
+                <p14:modId xmlns:p14="http://schemas.microsoft.com/office/powerpoint/2010/main" val="4157626063"/>
               </p:ext>
             </p:extLst>
           </p:nvPr>
@@ -17659,7 +17616,7 @@
                         <a:rPr lang="ko-KR" altLang="en-US" sz="1100" b="0" kern="100" dirty="0">
                           <a:effectLst/>
                         </a:rPr>
-                        <a:t>일정을 등록하시겠습니까</a:t>
+                        <a:t>일정을 등록하겠습니까</a:t>
                       </a:r>
                       <a:r>
                         <a:rPr lang="en-US" altLang="ko-KR" sz="1100" b="0" kern="100" dirty="0">
@@ -18190,7 +18147,7 @@
           <p:nvPr>
             <p:extLst>
               <p:ext uri="{D42A27DB-BD31-4B8C-83A1-F6EECF244321}">
-                <p14:modId xmlns:p14="http://schemas.microsoft.com/office/powerpoint/2010/main" val="1844155602"/>
+                <p14:modId xmlns:p14="http://schemas.microsoft.com/office/powerpoint/2010/main" val="3978704637"/>
               </p:ext>
             </p:extLst>
           </p:nvPr>
@@ -19434,17 +19391,14 @@
                           </a:solidFill>
                           <a:effectLst/>
                         </a:rPr>
-                        <a:t>추천 된 시간 중 선택 및 확정 </a:t>
-                      </a:r>
-                      <a:r>
-                        <a:rPr lang="en-US" altLang="ko-KR" sz="1100" b="0" kern="100" dirty="0">
-                          <a:solidFill>
-                            <a:schemeClr val="accent3"/>
-                          </a:solidFill>
-                          <a:effectLst/>
-                        </a:rPr>
-                        <a:t>(AF4)</a:t>
-                      </a:r>
+                        <a:t>추천 된 시간 중 선택 및 확정</a:t>
+                      </a:r>
+                      <a:endParaRPr lang="en-US" altLang="ko-KR" sz="1100" b="0" kern="100" dirty="0">
+                        <a:solidFill>
+                          <a:schemeClr val="accent3"/>
+                        </a:solidFill>
+                        <a:effectLst/>
+                      </a:endParaRPr>
                     </a:p>
                     <a:p>
                       <a:pPr marL="648000" indent="0" algn="just" latinLnBrk="1">
@@ -19473,7 +19427,7 @@
                           </a:solidFill>
                           <a:effectLst/>
                         </a:rPr>
-                        <a:t> (AF4) , </a:t>
+                        <a:t> (AF4) , ‘</a:t>
                       </a:r>
                       <a:r>
                         <a:rPr lang="ko-KR" altLang="en-US" sz="1100" b="0" kern="100" dirty="0">
@@ -19482,7 +19436,7 @@
                           </a:solidFill>
                           <a:effectLst/>
                         </a:rPr>
-                        <a:t>확정 버튼을 누른다</a:t>
+                        <a:t>등록</a:t>
                       </a:r>
                       <a:r>
                         <a:rPr lang="en-US" altLang="ko-KR" sz="1100" b="0" kern="100" dirty="0">
@@ -19491,7 +19445,7 @@
                           </a:solidFill>
                           <a:effectLst/>
                         </a:rPr>
-                        <a:t>. </a:t>
+                        <a:t>’</a:t>
                       </a:r>
                       <a:r>
                         <a:rPr lang="ko-KR" altLang="en-US" sz="1100" b="0" kern="100" dirty="0">
@@ -19500,61 +19454,7 @@
                           </a:solidFill>
                           <a:effectLst/>
                         </a:rPr>
-                        <a:t>시스템은 </a:t>
-                      </a:r>
-                      <a:r>
-                        <a:rPr lang="en-US" altLang="ko-KR" sz="1100" b="0" kern="100" dirty="0">
-                          <a:solidFill>
-                            <a:schemeClr val="accent3"/>
-                          </a:solidFill>
-                          <a:effectLst/>
-                        </a:rPr>
-                        <a:t>‘</a:t>
-                      </a:r>
-                      <a:r>
-                        <a:rPr lang="ko-KR" altLang="en-US" sz="1100" b="0" kern="100" dirty="0">
-                          <a:solidFill>
-                            <a:schemeClr val="accent3"/>
-                          </a:solidFill>
-                          <a:effectLst/>
-                        </a:rPr>
-                        <a:t>모임 시간을 확정하시겠습니까</a:t>
-                      </a:r>
-                      <a:r>
-                        <a:rPr lang="en-US" altLang="ko-KR" sz="1100" b="0" kern="100" dirty="0">
-                          <a:solidFill>
-                            <a:schemeClr val="accent3"/>
-                          </a:solidFill>
-                          <a:effectLst/>
-                        </a:rPr>
-                        <a:t>?’ </a:t>
-                      </a:r>
-                      <a:r>
-                        <a:rPr lang="ko-KR" altLang="en-US" sz="1100" b="0" kern="100" dirty="0">
-                          <a:solidFill>
-                            <a:schemeClr val="accent3"/>
-                          </a:solidFill>
-                          <a:effectLst/>
-                        </a:rPr>
-                        <a:t>라는 메시지를 출력하고</a:t>
-                      </a:r>
-                      <a:r>
-                        <a:rPr lang="en-US" altLang="ko-KR" sz="1100" b="0" kern="100" dirty="0">
-                          <a:solidFill>
-                            <a:schemeClr val="accent3"/>
-                          </a:solidFill>
-                          <a:effectLst/>
-                        </a:rPr>
-                        <a:t>, </a:t>
-                      </a:r>
-                      <a:r>
-                        <a:rPr lang="ko-KR" altLang="en-US" sz="1100" b="0" kern="100" dirty="0">
-                          <a:solidFill>
-                            <a:schemeClr val="accent3"/>
-                          </a:solidFill>
-                          <a:effectLst/>
-                        </a:rPr>
-                        <a:t>사용자가 확인을 누르면 이를 확정한다</a:t>
+                        <a:t> 버튼을 눌러 선택한 시간을 확정한다</a:t>
                       </a:r>
                       <a:r>
                         <a:rPr lang="en-US" altLang="ko-KR" sz="1100" b="0" kern="100" dirty="0">
@@ -19567,7 +19467,7 @@
                       </a:r>
                     </a:p>
                     <a:p>
-                      <a:pPr marL="684000" indent="0" algn="just" latinLnBrk="1">
+                      <a:pPr marL="648000" indent="0" algn="just" latinLnBrk="1">
                         <a:lnSpc>
                           <a:spcPct val="115000"/>
                         </a:lnSpc>
@@ -23847,7 +23747,7 @@
           <p:nvPr>
             <p:extLst>
               <p:ext uri="{D42A27DB-BD31-4B8C-83A1-F6EECF244321}">
-                <p14:modId xmlns:p14="http://schemas.microsoft.com/office/powerpoint/2010/main" val="1185695352"/>
+                <p14:modId xmlns:p14="http://schemas.microsoft.com/office/powerpoint/2010/main" val="1865529224"/>
               </p:ext>
             </p:extLst>
           </p:nvPr>
@@ -24974,13 +24874,13 @@
                         <a:rPr lang="en-US" altLang="ko-KR" sz="1100" b="0" kern="100" dirty="0">
                           <a:effectLst/>
                         </a:rPr>
-                        <a:t> , </a:t>
+                        <a:t> , ‘</a:t>
                       </a:r>
                       <a:r>
                         <a:rPr lang="ko-KR" altLang="en-US" sz="1100" b="0" kern="100" dirty="0">
                           <a:effectLst/>
                         </a:rPr>
-                        <a:t>확정 버튼을 누른다</a:t>
+                        <a:t>등록’ 버튼을 눌러 선택한 장소를 확정한다</a:t>
                       </a:r>
                       <a:r>
                         <a:rPr lang="en-US" altLang="ko-KR" sz="1100" b="0" kern="100" dirty="0">
@@ -24992,43 +24892,19 @@
                         <a:rPr lang="ko-KR" altLang="en-US" sz="1100" b="0" kern="100" dirty="0">
                           <a:effectLst/>
                         </a:rPr>
-                        <a:t>시스템은 </a:t>
+                        <a:t>시스템은 해당 정보를 저장하고</a:t>
                       </a:r>
                       <a:r>
                         <a:rPr lang="en-US" altLang="ko-KR" sz="1100" b="0" kern="100" dirty="0">
                           <a:effectLst/>
                         </a:rPr>
-                        <a:t>‘</a:t>
+                        <a:t>, </a:t>
                       </a:r>
                       <a:r>
                         <a:rPr lang="ko-KR" altLang="en-US" sz="1100" b="0" kern="100" dirty="0">
                           <a:effectLst/>
                         </a:rPr>
-                        <a:t>모임 장소를 확정하시겠습니까</a:t>
-                      </a:r>
-                      <a:r>
-                        <a:rPr lang="en-US" altLang="ko-KR" sz="1100" b="0" kern="100" dirty="0">
-                          <a:effectLst/>
-                        </a:rPr>
-                        <a:t>?’ </a:t>
-                      </a:r>
-                      <a:r>
-                        <a:rPr lang="ko-KR" altLang="en-US" sz="1100" b="0" kern="100" dirty="0">
-                          <a:effectLst/>
-                        </a:rPr>
-                        <a:t>라는 메시지를 출력하고</a:t>
-                      </a:r>
-                      <a:r>
-                        <a:rPr lang="en-US" altLang="ko-KR" sz="1100" b="0" kern="100" dirty="0">
-                          <a:effectLst/>
-                        </a:rPr>
-                        <a:t>, </a:t>
-                      </a:r>
-                      <a:r>
-                        <a:rPr lang="ko-KR" altLang="en-US" sz="1100" b="0" kern="100" dirty="0">
-                          <a:effectLst/>
-                        </a:rPr>
-                        <a:t>사용자가 확인을 누르면 이를 확정하고 본 </a:t>
+                        <a:t>본 </a:t>
                       </a:r>
                       <a:r>
                         <a:rPr lang="ko-KR" altLang="en-US" sz="1100" b="0" kern="100" dirty="0" err="1">

</xml_diff>

<commit_message>
12.03 SRS 1.2 수정
</commit_message>
<xml_diff>
--- a/SRS/1.2/4팀_일정추천앱_UC_Spec_1.2.pptx
+++ b/SRS/1.2/4팀_일정추천앱_UC_Spec_1.2.pptx
@@ -240,7 +240,7 @@
           <a:p>
             <a:fld id="{8CEFE3E5-4A4F-4495-B869-560A55522401}" type="datetimeFigureOut">
               <a:rPr lang="ko-KR" altLang="en-US" smtClean="0"/>
-              <a:t>2019-12-02</a:t>
+              <a:t>2019-12-03</a:t>
             </a:fld>
             <a:endParaRPr lang="ko-KR" altLang="en-US"/>
           </a:p>
@@ -16124,7 +16124,7 @@
           <p:nvPr>
             <p:extLst>
               <p:ext uri="{D42A27DB-BD31-4B8C-83A1-F6EECF244321}">
-                <p14:modId xmlns:p14="http://schemas.microsoft.com/office/powerpoint/2010/main" val="4157626063"/>
+                <p14:modId xmlns:p14="http://schemas.microsoft.com/office/powerpoint/2010/main" val="3271393316"/>
               </p:ext>
             </p:extLst>
           </p:nvPr>
@@ -17733,7 +17733,19 @@
                         <a:rPr lang="ko-KR" altLang="en-US" sz="1100" b="0" kern="100" baseline="0" dirty="0">
                           <a:effectLst/>
                         </a:rPr>
-                        <a:t>시스템은 이전 모임 일정 등록 화면으로 이동한 뒤에 새롭게</a:t>
+                        <a:t>시스템은 이전 모임 일정 등록 화면으로 이동한 후</a:t>
+                      </a:r>
+                      <a:r>
+                        <a:rPr lang="en-US" altLang="ko-KR" sz="1100" b="0" kern="100" baseline="0" dirty="0">
+                          <a:effectLst/>
+                        </a:rPr>
+                        <a:t>,</a:t>
+                      </a:r>
+                      <a:r>
+                        <a:rPr lang="ko-KR" altLang="en-US" sz="1100" b="0" kern="100" baseline="0" dirty="0">
+                          <a:effectLst/>
+                        </a:rPr>
+                        <a:t> 새롭게</a:t>
                       </a:r>
                       <a:r>
                         <a:rPr lang="en-US" altLang="ko-KR" sz="1100" b="0" kern="100" baseline="0" dirty="0">
@@ -18147,14 +18159,14 @@
           <p:nvPr>
             <p:extLst>
               <p:ext uri="{D42A27DB-BD31-4B8C-83A1-F6EECF244321}">
-                <p14:modId xmlns:p14="http://schemas.microsoft.com/office/powerpoint/2010/main" val="3978704637"/>
+                <p14:modId xmlns:p14="http://schemas.microsoft.com/office/powerpoint/2010/main" val="4203619175"/>
               </p:ext>
             </p:extLst>
           </p:nvPr>
         </p:nvGraphicFramePr>
         <p:xfrm>
           <a:off x="251520" y="979752"/>
-          <a:ext cx="8640960" cy="5612237"/>
+          <a:ext cx="8640960" cy="5483580"/>
         </p:xfrm>
         <a:graphic>
           <a:graphicData uri="http://schemas.openxmlformats.org/drawingml/2006/table">
@@ -19391,7 +19403,7 @@
                           </a:solidFill>
                           <a:effectLst/>
                         </a:rPr>
-                        <a:t>추천 된 시간 중 선택 및 확정</a:t>
+                        <a:t>추천된 시간 중 선택 및 확정</a:t>
                       </a:r>
                       <a:endParaRPr lang="en-US" altLang="ko-KR" sz="1100" b="0" kern="100" dirty="0">
                         <a:solidFill>
@@ -19418,7 +19430,7 @@
                           </a:solidFill>
                           <a:effectLst/>
                         </a:rPr>
-                        <a:t>사용자는 추천 시간 목록에서 하나를 선택하거나 원하는 날짜 및 시간 직접 입력 메뉴를 클릭하고 입력한 뒤</a:t>
+                        <a:t>사용자는 추천 시간 목록에서 하나를 선택한 뒤</a:t>
                       </a:r>
                       <a:r>
                         <a:rPr lang="en-US" altLang="ko-KR" sz="1100" b="0" kern="100" dirty="0">
@@ -23747,7 +23759,7 @@
           <p:nvPr>
             <p:extLst>
               <p:ext uri="{D42A27DB-BD31-4B8C-83A1-F6EECF244321}">
-                <p14:modId xmlns:p14="http://schemas.microsoft.com/office/powerpoint/2010/main" val="1865529224"/>
+                <p14:modId xmlns:p14="http://schemas.microsoft.com/office/powerpoint/2010/main" val="3006461079"/>
               </p:ext>
             </p:extLst>
           </p:nvPr>
@@ -24859,7 +24871,7 @@
                         <a:rPr lang="ko-KR" altLang="en-US" sz="1100" b="0" kern="100" dirty="0">
                           <a:effectLst/>
                         </a:rPr>
-                        <a:t>추천 장소 목록에서 하나를 선택하거나 원하는 장소 직접 입력 메뉴를 클릭하고 입력한 뒤</a:t>
+                        <a:t>추천 장소 목록에서 하나를 선택한 뒤</a:t>
                       </a:r>
                       <a:r>
                         <a:rPr lang="en-US" altLang="ko-KR" sz="1100" b="0" kern="100" dirty="0">

</xml_diff>

<commit_message>
12.04 SRS 1.2 수정
</commit_message>
<xml_diff>
--- a/SRS/1.2/4팀_일정추천앱_UC_Spec_1.2.pptx
+++ b/SRS/1.2/4팀_일정추천앱_UC_Spec_1.2.pptx
@@ -240,7 +240,7 @@
           <a:p>
             <a:fld id="{8CEFE3E5-4A4F-4495-B869-560A55522401}" type="datetimeFigureOut">
               <a:rPr lang="ko-KR" altLang="en-US" smtClean="0"/>
-              <a:t>2019-12-03</a:t>
+              <a:t>2019-12-04</a:t>
             </a:fld>
             <a:endParaRPr lang="ko-KR" altLang="en-US"/>
           </a:p>
@@ -18159,7 +18159,7 @@
           <p:nvPr>
             <p:extLst>
               <p:ext uri="{D42A27DB-BD31-4B8C-83A1-F6EECF244321}">
-                <p14:modId xmlns:p14="http://schemas.microsoft.com/office/powerpoint/2010/main" val="4203619175"/>
+                <p14:modId xmlns:p14="http://schemas.microsoft.com/office/powerpoint/2010/main" val="2999367709"/>
               </p:ext>
             </p:extLst>
           </p:nvPr>
@@ -19390,7 +19390,7 @@
                       <a:r>
                         <a:rPr lang="en-US" altLang="ko-KR" sz="1100" b="0" kern="100" dirty="0">
                           <a:solidFill>
-                            <a:schemeClr val="accent3"/>
+                            <a:schemeClr val="tx1"/>
                           </a:solidFill>
                           <a:effectLst/>
                         </a:rPr>
@@ -19399,7 +19399,7 @@
                       <a:r>
                         <a:rPr lang="ko-KR" altLang="en-US" sz="1100" b="0" kern="100" dirty="0">
                           <a:solidFill>
-                            <a:schemeClr val="accent3"/>
+                            <a:schemeClr val="tx1"/>
                           </a:solidFill>
                           <a:effectLst/>
                         </a:rPr>
@@ -19407,7 +19407,7 @@
                       </a:r>
                       <a:endParaRPr lang="en-US" altLang="ko-KR" sz="1100" b="0" kern="100" dirty="0">
                         <a:solidFill>
-                          <a:schemeClr val="accent3"/>
+                          <a:schemeClr val="tx1"/>
                         </a:solidFill>
                         <a:effectLst/>
                       </a:endParaRPr>
@@ -19426,7 +19426,7 @@
                       <a:r>
                         <a:rPr lang="ko-KR" altLang="en-US" sz="1100" b="0" kern="100" dirty="0">
                           <a:solidFill>
-                            <a:schemeClr val="accent3"/>
+                            <a:schemeClr val="tx1"/>
                           </a:solidFill>
                           <a:effectLst/>
                         </a:rPr>
@@ -19435,7 +19435,7 @@
                       <a:r>
                         <a:rPr lang="en-US" altLang="ko-KR" sz="1100" b="0" kern="100" dirty="0">
                           <a:solidFill>
-                            <a:schemeClr val="accent3"/>
+                            <a:schemeClr val="tx1"/>
                           </a:solidFill>
                           <a:effectLst/>
                         </a:rPr>
@@ -19444,7 +19444,7 @@
                       <a:r>
                         <a:rPr lang="ko-KR" altLang="en-US" sz="1100" b="0" kern="100" dirty="0">
                           <a:solidFill>
-                            <a:schemeClr val="accent3"/>
+                            <a:schemeClr val="tx1"/>
                           </a:solidFill>
                           <a:effectLst/>
                         </a:rPr>
@@ -19453,7 +19453,7 @@
                       <a:r>
                         <a:rPr lang="en-US" altLang="ko-KR" sz="1100" b="0" kern="100" dirty="0">
                           <a:solidFill>
-                            <a:schemeClr val="accent3"/>
+                            <a:schemeClr val="tx1"/>
                           </a:solidFill>
                           <a:effectLst/>
                         </a:rPr>
@@ -19462,7 +19462,7 @@
                       <a:r>
                         <a:rPr lang="ko-KR" altLang="en-US" sz="1100" b="0" kern="100" dirty="0">
                           <a:solidFill>
-                            <a:schemeClr val="accent3"/>
+                            <a:schemeClr val="tx1"/>
                           </a:solidFill>
                           <a:effectLst/>
                         </a:rPr>
@@ -19471,139 +19471,7 @@
                       <a:r>
                         <a:rPr lang="en-US" altLang="ko-KR" sz="1100" b="0" kern="100" dirty="0">
                           <a:solidFill>
-                            <a:schemeClr val="accent3"/>
-                          </a:solidFill>
-                          <a:effectLst/>
-                        </a:rPr>
-                        <a:t>.</a:t>
-                      </a:r>
-                    </a:p>
-                    <a:p>
-                      <a:pPr marL="648000" indent="0" algn="just" latinLnBrk="1">
-                        <a:lnSpc>
-                          <a:spcPct val="115000"/>
-                        </a:lnSpc>
-                        <a:spcAft>
-                          <a:spcPts val="0"/>
-                        </a:spcAft>
-                        <a:buFontTx/>
-                        <a:buNone/>
-                      </a:pPr>
-                      <a:r>
-                        <a:rPr lang="en-US" altLang="ko-KR" sz="1100" b="0" kern="100" dirty="0">
-                          <a:solidFill>
-                            <a:schemeClr val="accent3"/>
-                          </a:solidFill>
-                          <a:effectLst/>
-                        </a:rPr>
-                        <a:t>- </a:t>
-                      </a:r>
-                      <a:r>
-                        <a:rPr lang="ko-KR" altLang="en-US" sz="1100" b="0" kern="100" dirty="0">
-                          <a:solidFill>
-                            <a:schemeClr val="accent3"/>
-                          </a:solidFill>
-                          <a:effectLst/>
-                        </a:rPr>
-                        <a:t>장소 추천을 받을 경우 모임 장소 추천</a:t>
-                      </a:r>
-                      <a:r>
-                        <a:rPr lang="en-US" altLang="ko-KR" sz="1100" b="0" kern="100" dirty="0">
-                          <a:solidFill>
-                            <a:schemeClr val="accent3"/>
-                          </a:solidFill>
-                          <a:effectLst/>
-                        </a:rPr>
-                        <a:t>(step3) </a:t>
-                      </a:r>
-                      <a:r>
-                        <a:rPr lang="ko-KR" altLang="en-US" sz="1100" b="0" kern="100" dirty="0" err="1">
-                          <a:solidFill>
-                            <a:schemeClr val="accent3"/>
-                          </a:solidFill>
-                          <a:effectLst/>
-                        </a:rPr>
-                        <a:t>서브플로우를</a:t>
-                      </a:r>
-                      <a:r>
-                        <a:rPr lang="ko-KR" altLang="en-US" sz="1100" b="0" kern="100" dirty="0">
-                          <a:solidFill>
-                            <a:schemeClr val="accent3"/>
-                          </a:solidFill>
-                          <a:effectLst/>
-                        </a:rPr>
-                        <a:t> 실행한다</a:t>
-                      </a:r>
-                      <a:r>
-                        <a:rPr lang="en-US" altLang="ko-KR" sz="1100" b="0" kern="100" dirty="0">
-                          <a:solidFill>
-                            <a:schemeClr val="accent3"/>
-                          </a:solidFill>
-                          <a:effectLst/>
-                        </a:rPr>
-                        <a:t>.</a:t>
-                      </a:r>
-                    </a:p>
-                    <a:p>
-                      <a:pPr marL="684000" indent="0" algn="just" latinLnBrk="1">
-                        <a:lnSpc>
-                          <a:spcPct val="115000"/>
-                        </a:lnSpc>
-                        <a:spcAft>
-                          <a:spcPts val="0"/>
-                        </a:spcAft>
-                        <a:buFontTx/>
-                        <a:buNone/>
-                      </a:pPr>
-                      <a:r>
-                        <a:rPr lang="en-US" altLang="ko-KR" sz="1100" b="0" kern="100" dirty="0">
-                          <a:solidFill>
-                            <a:schemeClr val="accent3"/>
-                          </a:solidFill>
-                          <a:effectLst/>
-                        </a:rPr>
-                        <a:t>- </a:t>
-                      </a:r>
-                      <a:r>
-                        <a:rPr lang="ko-KR" altLang="en-US" sz="1100" b="0" kern="100" dirty="0">
-                          <a:solidFill>
-                            <a:schemeClr val="accent3"/>
-                          </a:solidFill>
-                          <a:effectLst/>
-                        </a:rPr>
-                        <a:t>장소 추천을 받지 않을 경우 선택한 추천에 대한 우선순위 조정</a:t>
-                      </a:r>
-                      <a:r>
-                        <a:rPr lang="en-US" altLang="ko-KR" sz="1100" b="0" kern="100" dirty="0">
-                          <a:solidFill>
-                            <a:schemeClr val="accent3"/>
-                          </a:solidFill>
-                          <a:effectLst/>
-                        </a:rPr>
-                        <a:t>(step4) </a:t>
-                      </a:r>
-                      <a:r>
-                        <a:rPr lang="ko-KR" altLang="en-US" sz="1100" b="0" kern="100" dirty="0" err="1">
-                          <a:solidFill>
-                            <a:schemeClr val="accent3"/>
-                          </a:solidFill>
-                          <a:effectLst/>
-                        </a:rPr>
-                        <a:t>서브플로우를</a:t>
-                      </a:r>
-                      <a:r>
-                        <a:rPr lang="ko-KR" altLang="en-US" sz="1100" b="0" kern="100" dirty="0">
-                          <a:solidFill>
-                            <a:schemeClr val="accent3"/>
-                          </a:solidFill>
-                          <a:effectLst/>
-                        </a:rPr>
-                        <a:t> 실행한다</a:t>
-                      </a:r>
-                      <a:r>
-                        <a:rPr lang="en-US" altLang="ko-KR" sz="1100" b="0" kern="100" dirty="0">
-                          <a:solidFill>
-                            <a:schemeClr val="accent3"/>
+                            <a:schemeClr val="tx1"/>
                           </a:solidFill>
                           <a:effectLst/>
                         </a:rPr>

</xml_diff>